<commit_message>
Oppdaterte presentasjon om ARM templates
</commit_message>
<xml_diff>
--- a/Workshop_2/Presentasjon/Azureskolen-Workshop#2.pptx
+++ b/Workshop_2/Presentasjon/Azureskolen-Workshop#2.pptx
@@ -7,16 +7,20 @@
     <p:sldMasterId id="2147483705" r:id="rId6"/>
   </p:sldMasterIdLst>
   <p:notesMasterIdLst>
-    <p:notesMasterId r:id="rId11"/>
+    <p:notesMasterId r:id="rId15"/>
   </p:notesMasterIdLst>
   <p:handoutMasterIdLst>
-    <p:handoutMasterId r:id="rId12"/>
+    <p:handoutMasterId r:id="rId16"/>
   </p:handoutMasterIdLst>
   <p:sldIdLst>
     <p:sldId id="256" r:id="rId7"/>
     <p:sldId id="257" r:id="rId8"/>
     <p:sldId id="259" r:id="rId9"/>
     <p:sldId id="260" r:id="rId10"/>
+    <p:sldId id="264" r:id="rId11"/>
+    <p:sldId id="261" r:id="rId12"/>
+    <p:sldId id="262" r:id="rId13"/>
+    <p:sldId id="263" r:id="rId14"/>
   </p:sldIdLst>
   <p:sldSz cx="12192000" cy="6858000"/>
   <p:notesSz cx="6858000" cy="9144000"/>
@@ -182,7 +186,7 @@
         </pc:sldMkLst>
       </pc:sldChg>
       <pc:sldMasterChg chg="modSp modSldLayout">
-        <pc:chgData name="Linda Sunde" userId="9874fc63-94a6-4a42-b0b7-9db82e3dfe4b" providerId="ADAL" clId="{C4F18A38-A09A-4FCB-859C-72C5E3DBF7D1}" dt="2018-01-12T14:40:18.497" v="44"/>
+        <pc:chgData name="Linda Sunde" userId="9874fc63-94a6-4a42-b0b7-9db82e3dfe4b" providerId="ADAL" clId="{C4F18A38-A09A-4FCB-859C-72C5E3DBF7D1}" dt="2018-01-12T14:40:18.497" v="44" actId="2696"/>
         <pc:sldMasterMkLst>
           <pc:docMk/>
           <pc:sldMasterMk cId="2433956660" sldId="2147483660"/>
@@ -196,14 +200,14 @@
           </ac:grpSpMkLst>
         </pc:grpChg>
         <pc:sldLayoutChg chg="addSp delSp">
-          <pc:chgData name="Linda Sunde" userId="9874fc63-94a6-4a42-b0b7-9db82e3dfe4b" providerId="ADAL" clId="{C4F18A38-A09A-4FCB-859C-72C5E3DBF7D1}" dt="2018-01-12T14:37:14.390" v="17"/>
+          <pc:chgData name="Linda Sunde" userId="9874fc63-94a6-4a42-b0b7-9db82e3dfe4b" providerId="ADAL" clId="{C4F18A38-A09A-4FCB-859C-72C5E3DBF7D1}" dt="2018-01-12T14:37:14.390" v="17" actId="2696"/>
           <pc:sldLayoutMkLst>
             <pc:docMk/>
             <pc:sldMasterMk cId="2433956660" sldId="2147483660"/>
             <pc:sldLayoutMk cId="1874232010" sldId="2147483665"/>
           </pc:sldLayoutMkLst>
           <pc:grpChg chg="add">
-            <ac:chgData name="Linda Sunde" userId="9874fc63-94a6-4a42-b0b7-9db82e3dfe4b" providerId="ADAL" clId="{C4F18A38-A09A-4FCB-859C-72C5E3DBF7D1}" dt="2018-01-12T14:37:14.390" v="17"/>
+            <ac:chgData name="Linda Sunde" userId="9874fc63-94a6-4a42-b0b7-9db82e3dfe4b" providerId="ADAL" clId="{C4F18A38-A09A-4FCB-859C-72C5E3DBF7D1}" dt="2018-01-12T14:37:14.390" v="17" actId="2696"/>
             <ac:grpSpMkLst>
               <pc:docMk/>
               <pc:sldMasterMk cId="2433956660" sldId="2147483660"/>
@@ -222,7 +226,7 @@
           </pc:grpChg>
         </pc:sldLayoutChg>
         <pc:sldLayoutChg chg="setBg">
-          <pc:chgData name="Linda Sunde" userId="9874fc63-94a6-4a42-b0b7-9db82e3dfe4b" providerId="ADAL" clId="{C4F18A38-A09A-4FCB-859C-72C5E3DBF7D1}" dt="2018-01-12T14:40:18.497" v="44"/>
+          <pc:chgData name="Linda Sunde" userId="9874fc63-94a6-4a42-b0b7-9db82e3dfe4b" providerId="ADAL" clId="{C4F18A38-A09A-4FCB-859C-72C5E3DBF7D1}" dt="2018-01-12T14:40:18.497" v="44" actId="2696"/>
           <pc:sldLayoutMkLst>
             <pc:docMk/>
             <pc:sldMasterMk cId="2433956660" sldId="2147483660"/>
@@ -230,7 +234,7 @@
           </pc:sldLayoutMkLst>
         </pc:sldLayoutChg>
         <pc:sldLayoutChg chg="addSp delSp">
-          <pc:chgData name="Linda Sunde" userId="9874fc63-94a6-4a42-b0b7-9db82e3dfe4b" providerId="ADAL" clId="{C4F18A38-A09A-4FCB-859C-72C5E3DBF7D1}" dt="2018-01-12T14:37:27.391" v="19"/>
+          <pc:chgData name="Linda Sunde" userId="9874fc63-94a6-4a42-b0b7-9db82e3dfe4b" providerId="ADAL" clId="{C4F18A38-A09A-4FCB-859C-72C5E3DBF7D1}" dt="2018-01-12T14:37:27.391" v="19" actId="2696"/>
           <pc:sldLayoutMkLst>
             <pc:docMk/>
             <pc:sldMasterMk cId="2433956660" sldId="2147483660"/>
@@ -246,7 +250,7 @@
             </ac:grpSpMkLst>
           </pc:grpChg>
           <pc:grpChg chg="add">
-            <ac:chgData name="Linda Sunde" userId="9874fc63-94a6-4a42-b0b7-9db82e3dfe4b" providerId="ADAL" clId="{C4F18A38-A09A-4FCB-859C-72C5E3DBF7D1}" dt="2018-01-12T14:37:27.391" v="19"/>
+            <ac:chgData name="Linda Sunde" userId="9874fc63-94a6-4a42-b0b7-9db82e3dfe4b" providerId="ADAL" clId="{C4F18A38-A09A-4FCB-859C-72C5E3DBF7D1}" dt="2018-01-12T14:37:27.391" v="19" actId="2696"/>
             <ac:grpSpMkLst>
               <pc:docMk/>
               <pc:sldMasterMk cId="2433956660" sldId="2147483660"/>
@@ -257,7 +261,7 @@
         </pc:sldLayoutChg>
       </pc:sldMasterChg>
       <pc:sldMasterChg chg="addSp delSp modSldLayout">
-        <pc:chgData name="Linda Sunde" userId="9874fc63-94a6-4a42-b0b7-9db82e3dfe4b" providerId="ADAL" clId="{C4F18A38-A09A-4FCB-859C-72C5E3DBF7D1}" dt="2018-01-12T14:38:04.671" v="29"/>
+        <pc:chgData name="Linda Sunde" userId="9874fc63-94a6-4a42-b0b7-9db82e3dfe4b" providerId="ADAL" clId="{C4F18A38-A09A-4FCB-859C-72C5E3DBF7D1}" dt="2018-01-12T14:38:04.671" v="29" actId="2696"/>
         <pc:sldMasterMkLst>
           <pc:docMk/>
           <pc:sldMasterMk cId="1515736299" sldId="2147483687"/>
@@ -271,7 +275,7 @@
           </ac:grpSpMkLst>
         </pc:grpChg>
         <pc:grpChg chg="add">
-          <ac:chgData name="Linda Sunde" userId="9874fc63-94a6-4a42-b0b7-9db82e3dfe4b" providerId="ADAL" clId="{C4F18A38-A09A-4FCB-859C-72C5E3DBF7D1}" dt="2018-01-12T14:37:31.906" v="21"/>
+          <ac:chgData name="Linda Sunde" userId="9874fc63-94a6-4a42-b0b7-9db82e3dfe4b" providerId="ADAL" clId="{C4F18A38-A09A-4FCB-859C-72C5E3DBF7D1}" dt="2018-01-12T14:37:31.906" v="21" actId="2696"/>
           <ac:grpSpMkLst>
             <pc:docMk/>
             <pc:sldMasterMk cId="1515736299" sldId="2147483687"/>
@@ -279,7 +283,7 @@
           </ac:grpSpMkLst>
         </pc:grpChg>
         <pc:sldLayoutChg chg="addSp delSp modSp">
-          <pc:chgData name="Linda Sunde" userId="9874fc63-94a6-4a42-b0b7-9db82e3dfe4b" providerId="ADAL" clId="{C4F18A38-A09A-4FCB-859C-72C5E3DBF7D1}" dt="2018-01-12T14:35:07.205" v="14"/>
+          <pc:chgData name="Linda Sunde" userId="9874fc63-94a6-4a42-b0b7-9db82e3dfe4b" providerId="ADAL" clId="{C4F18A38-A09A-4FCB-859C-72C5E3DBF7D1}" dt="2018-01-12T14:35:07.205" v="14" actId="2696"/>
           <pc:sldLayoutMkLst>
             <pc:docMk/>
             <pc:sldMasterMk cId="1515736299" sldId="2147483687"/>
@@ -304,7 +308,7 @@
             </ac:spMkLst>
           </pc:spChg>
           <pc:spChg chg="add del mod">
-            <ac:chgData name="Linda Sunde" userId="9874fc63-94a6-4a42-b0b7-9db82e3dfe4b" providerId="ADAL" clId="{C4F18A38-A09A-4FCB-859C-72C5E3DBF7D1}" dt="2018-01-12T14:35:02.581" v="12"/>
+            <ac:chgData name="Linda Sunde" userId="9874fc63-94a6-4a42-b0b7-9db82e3dfe4b" providerId="ADAL" clId="{C4F18A38-A09A-4FCB-859C-72C5E3DBF7D1}" dt="2018-01-12T14:35:02.581" v="12" actId="2696"/>
             <ac:spMkLst>
               <pc:docMk/>
               <pc:sldMasterMk cId="1515736299" sldId="2147483687"/>
@@ -313,7 +317,7 @@
             </ac:spMkLst>
           </pc:spChg>
           <pc:spChg chg="add">
-            <ac:chgData name="Linda Sunde" userId="9874fc63-94a6-4a42-b0b7-9db82e3dfe4b" providerId="ADAL" clId="{C4F18A38-A09A-4FCB-859C-72C5E3DBF7D1}" dt="2018-01-12T14:35:07.205" v="14"/>
+            <ac:chgData name="Linda Sunde" userId="9874fc63-94a6-4a42-b0b7-9db82e3dfe4b" providerId="ADAL" clId="{C4F18A38-A09A-4FCB-859C-72C5E3DBF7D1}" dt="2018-01-12T14:35:07.205" v="14" actId="2696"/>
             <ac:spMkLst>
               <pc:docMk/>
               <pc:sldMasterMk cId="1515736299" sldId="2147483687"/>
@@ -323,14 +327,14 @@
           </pc:spChg>
         </pc:sldLayoutChg>
         <pc:sldLayoutChg chg="addSp delSp">
-          <pc:chgData name="Linda Sunde" userId="9874fc63-94a6-4a42-b0b7-9db82e3dfe4b" providerId="ADAL" clId="{C4F18A38-A09A-4FCB-859C-72C5E3DBF7D1}" dt="2018-01-12T14:37:56.218" v="25"/>
+          <pc:chgData name="Linda Sunde" userId="9874fc63-94a6-4a42-b0b7-9db82e3dfe4b" providerId="ADAL" clId="{C4F18A38-A09A-4FCB-859C-72C5E3DBF7D1}" dt="2018-01-12T14:37:56.218" v="25" actId="2696"/>
           <pc:sldLayoutMkLst>
             <pc:docMk/>
             <pc:sldMasterMk cId="1515736299" sldId="2147483687"/>
             <pc:sldLayoutMk cId="3899887035" sldId="2147483697"/>
           </pc:sldLayoutMkLst>
           <pc:grpChg chg="add">
-            <ac:chgData name="Linda Sunde" userId="9874fc63-94a6-4a42-b0b7-9db82e3dfe4b" providerId="ADAL" clId="{C4F18A38-A09A-4FCB-859C-72C5E3DBF7D1}" dt="2018-01-12T14:37:56.218" v="25"/>
+            <ac:chgData name="Linda Sunde" userId="9874fc63-94a6-4a42-b0b7-9db82e3dfe4b" providerId="ADAL" clId="{C4F18A38-A09A-4FCB-859C-72C5E3DBF7D1}" dt="2018-01-12T14:37:56.218" v="25" actId="2696"/>
             <ac:grpSpMkLst>
               <pc:docMk/>
               <pc:sldMasterMk cId="1515736299" sldId="2147483687"/>
@@ -349,7 +353,7 @@
           </pc:grpChg>
         </pc:sldLayoutChg>
         <pc:sldLayoutChg chg="addSp delSp">
-          <pc:chgData name="Linda Sunde" userId="9874fc63-94a6-4a42-b0b7-9db82e3dfe4b" providerId="ADAL" clId="{C4F18A38-A09A-4FCB-859C-72C5E3DBF7D1}" dt="2018-01-12T14:37:50.937" v="23"/>
+          <pc:chgData name="Linda Sunde" userId="9874fc63-94a6-4a42-b0b7-9db82e3dfe4b" providerId="ADAL" clId="{C4F18A38-A09A-4FCB-859C-72C5E3DBF7D1}" dt="2018-01-12T14:37:50.937" v="23" actId="2696"/>
           <pc:sldLayoutMkLst>
             <pc:docMk/>
             <pc:sldMasterMk cId="1515736299" sldId="2147483687"/>
@@ -365,7 +369,7 @@
             </ac:grpSpMkLst>
           </pc:grpChg>
           <pc:grpChg chg="add">
-            <ac:chgData name="Linda Sunde" userId="9874fc63-94a6-4a42-b0b7-9db82e3dfe4b" providerId="ADAL" clId="{C4F18A38-A09A-4FCB-859C-72C5E3DBF7D1}" dt="2018-01-12T14:37:50.937" v="23"/>
+            <ac:chgData name="Linda Sunde" userId="9874fc63-94a6-4a42-b0b7-9db82e3dfe4b" providerId="ADAL" clId="{C4F18A38-A09A-4FCB-859C-72C5E3DBF7D1}" dt="2018-01-12T14:37:50.937" v="23" actId="2696"/>
             <ac:grpSpMkLst>
               <pc:docMk/>
               <pc:sldMasterMk cId="1515736299" sldId="2147483687"/>
@@ -375,7 +379,7 @@
           </pc:grpChg>
         </pc:sldLayoutChg>
         <pc:sldLayoutChg chg="addSp delSp">
-          <pc:chgData name="Linda Sunde" userId="9874fc63-94a6-4a42-b0b7-9db82e3dfe4b" providerId="ADAL" clId="{C4F18A38-A09A-4FCB-859C-72C5E3DBF7D1}" dt="2018-01-12T14:38:00.296" v="27"/>
+          <pc:chgData name="Linda Sunde" userId="9874fc63-94a6-4a42-b0b7-9db82e3dfe4b" providerId="ADAL" clId="{C4F18A38-A09A-4FCB-859C-72C5E3DBF7D1}" dt="2018-01-12T14:38:00.296" v="27" actId="2696"/>
           <pc:sldLayoutMkLst>
             <pc:docMk/>
             <pc:sldMasterMk cId="1515736299" sldId="2147483687"/>
@@ -391,7 +395,7 @@
             </ac:grpSpMkLst>
           </pc:grpChg>
           <pc:grpChg chg="add">
-            <ac:chgData name="Linda Sunde" userId="9874fc63-94a6-4a42-b0b7-9db82e3dfe4b" providerId="ADAL" clId="{C4F18A38-A09A-4FCB-859C-72C5E3DBF7D1}" dt="2018-01-12T14:38:00.296" v="27"/>
+            <ac:chgData name="Linda Sunde" userId="9874fc63-94a6-4a42-b0b7-9db82e3dfe4b" providerId="ADAL" clId="{C4F18A38-A09A-4FCB-859C-72C5E3DBF7D1}" dt="2018-01-12T14:38:00.296" v="27" actId="2696"/>
             <ac:grpSpMkLst>
               <pc:docMk/>
               <pc:sldMasterMk cId="1515736299" sldId="2147483687"/>
@@ -401,7 +405,7 @@
           </pc:grpChg>
         </pc:sldLayoutChg>
         <pc:sldLayoutChg chg="addSp delSp">
-          <pc:chgData name="Linda Sunde" userId="9874fc63-94a6-4a42-b0b7-9db82e3dfe4b" providerId="ADAL" clId="{C4F18A38-A09A-4FCB-859C-72C5E3DBF7D1}" dt="2018-01-12T14:38:04.671" v="29"/>
+          <pc:chgData name="Linda Sunde" userId="9874fc63-94a6-4a42-b0b7-9db82e3dfe4b" providerId="ADAL" clId="{C4F18A38-A09A-4FCB-859C-72C5E3DBF7D1}" dt="2018-01-12T14:38:04.671" v="29" actId="2696"/>
           <pc:sldLayoutMkLst>
             <pc:docMk/>
             <pc:sldMasterMk cId="1515736299" sldId="2147483687"/>
@@ -417,7 +421,7 @@
             </ac:grpSpMkLst>
           </pc:grpChg>
           <pc:grpChg chg="add">
-            <ac:chgData name="Linda Sunde" userId="9874fc63-94a6-4a42-b0b7-9db82e3dfe4b" providerId="ADAL" clId="{C4F18A38-A09A-4FCB-859C-72C5E3DBF7D1}" dt="2018-01-12T14:38:04.671" v="29"/>
+            <ac:chgData name="Linda Sunde" userId="9874fc63-94a6-4a42-b0b7-9db82e3dfe4b" providerId="ADAL" clId="{C4F18A38-A09A-4FCB-859C-72C5E3DBF7D1}" dt="2018-01-12T14:38:04.671" v="29" actId="2696"/>
             <ac:grpSpMkLst>
               <pc:docMk/>
               <pc:sldMasterMk cId="1515736299" sldId="2147483687"/>
@@ -428,7 +432,7 @@
         </pc:sldLayoutChg>
       </pc:sldMasterChg>
       <pc:sldMasterChg chg="addSp delSp modSldLayout">
-        <pc:chgData name="Linda Sunde" userId="9874fc63-94a6-4a42-b0b7-9db82e3dfe4b" providerId="ADAL" clId="{C4F18A38-A09A-4FCB-859C-72C5E3DBF7D1}" dt="2018-01-12T14:38:15.499" v="31"/>
+        <pc:chgData name="Linda Sunde" userId="9874fc63-94a6-4a42-b0b7-9db82e3dfe4b" providerId="ADAL" clId="{C4F18A38-A09A-4FCB-859C-72C5E3DBF7D1}" dt="2018-01-12T14:38:15.499" v="31" actId="2696"/>
         <pc:sldMasterMkLst>
           <pc:docMk/>
           <pc:sldMasterMk cId="3846142285" sldId="2147483705"/>
@@ -450,7 +454,7 @@
           </ac:grpSpMkLst>
         </pc:grpChg>
         <pc:grpChg chg="add">
-          <ac:chgData name="Linda Sunde" userId="9874fc63-94a6-4a42-b0b7-9db82e3dfe4b" providerId="ADAL" clId="{C4F18A38-A09A-4FCB-859C-72C5E3DBF7D1}" dt="2018-01-12T14:38:15.499" v="31"/>
+          <ac:chgData name="Linda Sunde" userId="9874fc63-94a6-4a42-b0b7-9db82e3dfe4b" providerId="ADAL" clId="{C4F18A38-A09A-4FCB-859C-72C5E3DBF7D1}" dt="2018-01-12T14:38:15.499" v="31" actId="2696"/>
           <ac:grpSpMkLst>
             <pc:docMk/>
             <pc:sldMasterMk cId="3846142285" sldId="2147483705"/>
@@ -458,14 +462,14 @@
           </ac:grpSpMkLst>
         </pc:grpChg>
         <pc:sldLayoutChg chg="modSp">
-          <pc:chgData name="Linda Sunde" userId="9874fc63-94a6-4a42-b0b7-9db82e3dfe4b" providerId="ADAL" clId="{C4F18A38-A09A-4FCB-859C-72C5E3DBF7D1}" dt="2018-01-12T14:29:02.679" v="0"/>
+          <pc:chgData name="Linda Sunde" userId="9874fc63-94a6-4a42-b0b7-9db82e3dfe4b" providerId="ADAL" clId="{C4F18A38-A09A-4FCB-859C-72C5E3DBF7D1}" dt="2018-01-12T14:29:02.679" v="0" actId="2696"/>
           <pc:sldLayoutMkLst>
             <pc:docMk/>
             <pc:sldMasterMk cId="3846142285" sldId="2147483705"/>
             <pc:sldLayoutMk cId="4024990185" sldId="2147483706"/>
           </pc:sldLayoutMkLst>
           <pc:spChg chg="mod">
-            <ac:chgData name="Linda Sunde" userId="9874fc63-94a6-4a42-b0b7-9db82e3dfe4b" providerId="ADAL" clId="{C4F18A38-A09A-4FCB-859C-72C5E3DBF7D1}" dt="2018-01-12T14:29:02.679" v="0"/>
+            <ac:chgData name="Linda Sunde" userId="9874fc63-94a6-4a42-b0b7-9db82e3dfe4b" providerId="ADAL" clId="{C4F18A38-A09A-4FCB-859C-72C5E3DBF7D1}" dt="2018-01-12T14:29:02.679" v="0" actId="2696"/>
             <ac:spMkLst>
               <pc:docMk/>
               <pc:sldMasterMk cId="3846142285" sldId="2147483705"/>
@@ -475,14 +479,14 @@
           </pc:spChg>
         </pc:sldLayoutChg>
         <pc:sldLayoutChg chg="modSp">
-          <pc:chgData name="Linda Sunde" userId="9874fc63-94a6-4a42-b0b7-9db82e3dfe4b" providerId="ADAL" clId="{C4F18A38-A09A-4FCB-859C-72C5E3DBF7D1}" dt="2018-01-12T14:29:14.943" v="1"/>
+          <pc:chgData name="Linda Sunde" userId="9874fc63-94a6-4a42-b0b7-9db82e3dfe4b" providerId="ADAL" clId="{C4F18A38-A09A-4FCB-859C-72C5E3DBF7D1}" dt="2018-01-12T14:29:14.943" v="1" actId="2696"/>
           <pc:sldLayoutMkLst>
             <pc:docMk/>
             <pc:sldMasterMk cId="3846142285" sldId="2147483705"/>
             <pc:sldLayoutMk cId="4103475003" sldId="2147483707"/>
           </pc:sldLayoutMkLst>
           <pc:spChg chg="mod">
-            <ac:chgData name="Linda Sunde" userId="9874fc63-94a6-4a42-b0b7-9db82e3dfe4b" providerId="ADAL" clId="{C4F18A38-A09A-4FCB-859C-72C5E3DBF7D1}" dt="2018-01-12T14:29:14.943" v="1"/>
+            <ac:chgData name="Linda Sunde" userId="9874fc63-94a6-4a42-b0b7-9db82e3dfe4b" providerId="ADAL" clId="{C4F18A38-A09A-4FCB-859C-72C5E3DBF7D1}" dt="2018-01-12T14:29:14.943" v="1" actId="2696"/>
             <ac:spMkLst>
               <pc:docMk/>
               <pc:sldMasterMk cId="3846142285" sldId="2147483705"/>
@@ -579,7 +583,7 @@
           <a:p>
             <a:fld id="{54C52192-B826-4AE0-9CD6-BEA9467D12B3}" type="datetimeFigureOut">
               <a:rPr lang="nb-NO" smtClean="0"/>
-              <a:t>13.11.2018</a:t>
+              <a:t>22.11.2018</a:t>
             </a:fld>
             <a:endParaRPr lang="nb-NO"/>
           </a:p>
@@ -744,7 +748,7 @@
           <a:p>
             <a:fld id="{2696BCB2-2760-41B1-A1BE-7886EF110FCB}" type="datetimeFigureOut">
               <a:rPr lang="nb-NO" smtClean="0"/>
-              <a:t>13.11.2018</a:t>
+              <a:t>22.11.2018</a:t>
             </a:fld>
             <a:endParaRPr lang="nb-NO"/>
           </a:p>
@@ -10452,7 +10456,6 @@
               <a:rPr lang="nb-NO" dirty="0"/>
               <a:t> – Workshop #2</a:t>
             </a:r>
-            <a:endParaRPr lang="nb-NO" dirty="0"/>
           </a:p>
         </p:txBody>
       </p:sp>
@@ -10772,6 +10775,632 @@
     <p:extLst>
       <p:ext uri="{BB962C8B-B14F-4D97-AF65-F5344CB8AC3E}">
         <p14:creationId xmlns:p14="http://schemas.microsoft.com/office/powerpoint/2010/main" val="2714028187"/>
+      </p:ext>
+    </p:extLst>
+  </p:cSld>
+  <p:clrMapOvr>
+    <a:masterClrMapping/>
+  </p:clrMapOvr>
+</p:sld>
+</file>
+
+<file path=ppt/slides/slide5.xml><?xml version="1.0" encoding="utf-8"?>
+<p:sld xmlns:a="http://schemas.openxmlformats.org/drawingml/2006/main" xmlns:r="http://schemas.openxmlformats.org/officeDocument/2006/relationships" xmlns:p="http://schemas.openxmlformats.org/presentationml/2006/main">
+  <p:cSld>
+    <p:spTree>
+      <p:nvGrpSpPr>
+        <p:cNvPr id="1" name=""/>
+        <p:cNvGrpSpPr/>
+        <p:nvPr/>
+      </p:nvGrpSpPr>
+      <p:grpSpPr>
+        <a:xfrm>
+          <a:off x="0" y="0"/>
+          <a:ext cx="0" cy="0"/>
+          <a:chOff x="0" y="0"/>
+          <a:chExt cx="0" cy="0"/>
+        </a:xfrm>
+      </p:grpSpPr>
+      <p:sp>
+        <p:nvSpPr>
+          <p:cNvPr id="2" name="Content Placeholder 1">
+            <a:extLst>
+              <a:ext uri="{FF2B5EF4-FFF2-40B4-BE49-F238E27FC236}">
+                <a16:creationId xmlns:a16="http://schemas.microsoft.com/office/drawing/2014/main" id="{13200DE8-44F3-48A3-BBC9-63173A6CF0B0}"/>
+              </a:ext>
+            </a:extLst>
+          </p:cNvPr>
+          <p:cNvSpPr>
+            <a:spLocks noGrp="1"/>
+          </p:cNvSpPr>
+          <p:nvPr>
+            <p:ph idx="1"/>
+          </p:nvPr>
+        </p:nvSpPr>
+        <p:spPr/>
+        <p:txBody>
+          <a:bodyPr/>
+          <a:lstStyle/>
+          <a:p>
+            <a:r>
+              <a:rPr lang="nb-NO" dirty="0"/>
+              <a:t>Forutsigbarhet</a:t>
+            </a:r>
+          </a:p>
+          <a:p>
+            <a:endParaRPr lang="nb-NO" dirty="0"/>
+          </a:p>
+          <a:p>
+            <a:r>
+              <a:rPr lang="nb-NO" dirty="0"/>
+              <a:t>Mulighet til å opprette konsistente miljøer</a:t>
+            </a:r>
+          </a:p>
+          <a:p>
+            <a:endParaRPr lang="nb-NO" dirty="0"/>
+          </a:p>
+          <a:p>
+            <a:r>
+              <a:rPr lang="nb-NO" dirty="0"/>
+              <a:t>God dokumentasjon av infrastrukturen.</a:t>
+            </a:r>
+          </a:p>
+          <a:p>
+            <a:endParaRPr lang="nb-NO" dirty="0"/>
+          </a:p>
+          <a:p>
+            <a:endParaRPr lang="nb-NO" dirty="0"/>
+          </a:p>
+          <a:p>
+            <a:endParaRPr lang="nb-NO" dirty="0"/>
+          </a:p>
+        </p:txBody>
+      </p:sp>
+      <p:sp>
+        <p:nvSpPr>
+          <p:cNvPr id="3" name="Title 2">
+            <a:extLst>
+              <a:ext uri="{FF2B5EF4-FFF2-40B4-BE49-F238E27FC236}">
+                <a16:creationId xmlns:a16="http://schemas.microsoft.com/office/drawing/2014/main" id="{1B6B6ACF-EB8D-4510-A862-5848A8884C84}"/>
+              </a:ext>
+            </a:extLst>
+          </p:cNvPr>
+          <p:cNvSpPr>
+            <a:spLocks noGrp="1"/>
+          </p:cNvSpPr>
+          <p:nvPr>
+            <p:ph type="title"/>
+          </p:nvPr>
+        </p:nvSpPr>
+        <p:spPr/>
+        <p:txBody>
+          <a:bodyPr/>
+          <a:lstStyle/>
+          <a:p>
+            <a:r>
+              <a:rPr lang="nb-NO" dirty="0" err="1"/>
+              <a:t>Infrastructure</a:t>
+            </a:r>
+            <a:r>
+              <a:rPr lang="nb-NO" dirty="0"/>
+              <a:t> as Code</a:t>
+            </a:r>
+          </a:p>
+        </p:txBody>
+      </p:sp>
+    </p:spTree>
+    <p:extLst>
+      <p:ext uri="{BB962C8B-B14F-4D97-AF65-F5344CB8AC3E}">
+        <p14:creationId xmlns:p14="http://schemas.microsoft.com/office/powerpoint/2010/main" val="2750714282"/>
+      </p:ext>
+    </p:extLst>
+  </p:cSld>
+  <p:clrMapOvr>
+    <a:masterClrMapping/>
+  </p:clrMapOvr>
+</p:sld>
+</file>
+
+<file path=ppt/slides/slide6.xml><?xml version="1.0" encoding="utf-8"?>
+<p:sld xmlns:a="http://schemas.openxmlformats.org/drawingml/2006/main" xmlns:r="http://schemas.openxmlformats.org/officeDocument/2006/relationships" xmlns:p="http://schemas.openxmlformats.org/presentationml/2006/main">
+  <p:cSld>
+    <p:spTree>
+      <p:nvGrpSpPr>
+        <p:cNvPr id="1" name=""/>
+        <p:cNvGrpSpPr/>
+        <p:nvPr/>
+      </p:nvGrpSpPr>
+      <p:grpSpPr>
+        <a:xfrm>
+          <a:off x="0" y="0"/>
+          <a:ext cx="0" cy="0"/>
+          <a:chOff x="0" y="0"/>
+          <a:chExt cx="0" cy="0"/>
+        </a:xfrm>
+      </p:grpSpPr>
+      <p:sp>
+        <p:nvSpPr>
+          <p:cNvPr id="2" name="Content Placeholder 1">
+            <a:extLst>
+              <a:ext uri="{FF2B5EF4-FFF2-40B4-BE49-F238E27FC236}">
+                <a16:creationId xmlns:a16="http://schemas.microsoft.com/office/drawing/2014/main" id="{31783B1B-5095-4966-B826-4F541467D784}"/>
+              </a:ext>
+            </a:extLst>
+          </p:cNvPr>
+          <p:cNvSpPr>
+            <a:spLocks noGrp="1"/>
+          </p:cNvSpPr>
+          <p:nvPr>
+            <p:ph idx="1"/>
+          </p:nvPr>
+        </p:nvSpPr>
+        <p:spPr>
+          <a:xfrm>
+            <a:off x="1193237" y="1841211"/>
+            <a:ext cx="8382613" cy="4351338"/>
+          </a:xfrm>
+        </p:spPr>
+        <p:txBody>
+          <a:bodyPr/>
+          <a:lstStyle/>
+          <a:p>
+            <a:r>
+              <a:rPr lang="nb-NO" dirty="0"/>
+              <a:t>Deklarativ beskrivelse av infrastruktur i Azure</a:t>
+            </a:r>
+          </a:p>
+          <a:p>
+            <a:pPr marL="0" indent="0">
+              <a:buNone/>
+            </a:pPr>
+            <a:endParaRPr lang="nb-NO" dirty="0"/>
+          </a:p>
+          <a:p>
+            <a:r>
+              <a:rPr lang="nb-NO" dirty="0"/>
+              <a:t>JSON-struktur</a:t>
+            </a:r>
+          </a:p>
+          <a:p>
+            <a:endParaRPr lang="nb-NO" dirty="0"/>
+          </a:p>
+          <a:p>
+            <a:r>
+              <a:rPr lang="nb-NO" dirty="0"/>
+              <a:t>Filer</a:t>
+            </a:r>
+          </a:p>
+          <a:p>
+            <a:pPr lvl="1"/>
+            <a:r>
+              <a:rPr lang="nb-NO" dirty="0" err="1">
+                <a:latin typeface="Courier New" panose="02070309020205020404" pitchFamily="49" charset="0"/>
+                <a:cs typeface="Courier New" panose="02070309020205020404" pitchFamily="49" charset="0"/>
+              </a:rPr>
+              <a:t>azuredeploy.json</a:t>
+            </a:r>
+            <a:endParaRPr lang="nb-NO" dirty="0">
+              <a:latin typeface="Courier New" panose="02070309020205020404" pitchFamily="49" charset="0"/>
+              <a:cs typeface="Courier New" panose="02070309020205020404" pitchFamily="49" charset="0"/>
+            </a:endParaRPr>
+          </a:p>
+          <a:p>
+            <a:pPr lvl="1"/>
+            <a:r>
+              <a:rPr lang="nb-NO" dirty="0" err="1">
+                <a:latin typeface="Courier New" panose="02070309020205020404" pitchFamily="49" charset="0"/>
+                <a:cs typeface="Courier New" panose="02070309020205020404" pitchFamily="49" charset="0"/>
+              </a:rPr>
+              <a:t>azuredeploy.parameters.json</a:t>
+            </a:r>
+            <a:endParaRPr lang="nb-NO" dirty="0"/>
+          </a:p>
+          <a:p>
+            <a:pPr lvl="1"/>
+            <a:endParaRPr lang="nb-NO" dirty="0"/>
+          </a:p>
+          <a:p>
+            <a:pPr lvl="1"/>
+            <a:endParaRPr lang="nb-NO" dirty="0"/>
+          </a:p>
+          <a:p>
+            <a:r>
+              <a:rPr lang="nb-NO" dirty="0"/>
+              <a:t>To moduser:</a:t>
+            </a:r>
+          </a:p>
+          <a:p>
+            <a:pPr lvl="1"/>
+            <a:r>
+              <a:rPr lang="nb-NO" dirty="0"/>
+              <a:t>Inkrementell – oppretter kun det som er endret</a:t>
+            </a:r>
+          </a:p>
+          <a:p>
+            <a:pPr lvl="1"/>
+            <a:r>
+              <a:rPr lang="nb-NO" dirty="0"/>
+              <a:t>Komplett – sletter alt og oppretter alt på nytt</a:t>
+            </a:r>
+          </a:p>
+        </p:txBody>
+      </p:sp>
+      <p:sp>
+        <p:nvSpPr>
+          <p:cNvPr id="3" name="Title 2">
+            <a:extLst>
+              <a:ext uri="{FF2B5EF4-FFF2-40B4-BE49-F238E27FC236}">
+                <a16:creationId xmlns:a16="http://schemas.microsoft.com/office/drawing/2014/main" id="{3D15BAEB-1545-45BA-9496-F3F45C1F50EB}"/>
+              </a:ext>
+            </a:extLst>
+          </p:cNvPr>
+          <p:cNvSpPr>
+            <a:spLocks noGrp="1"/>
+          </p:cNvSpPr>
+          <p:nvPr>
+            <p:ph type="title"/>
+          </p:nvPr>
+        </p:nvSpPr>
+        <p:spPr/>
+        <p:txBody>
+          <a:bodyPr/>
+          <a:lstStyle/>
+          <a:p>
+            <a:r>
+              <a:rPr lang="nb-NO" dirty="0"/>
+              <a:t>ARM-</a:t>
+            </a:r>
+            <a:r>
+              <a:rPr lang="nb-NO" dirty="0" err="1"/>
+              <a:t>templates</a:t>
+            </a:r>
+            <a:endParaRPr lang="nb-NO" dirty="0"/>
+          </a:p>
+        </p:txBody>
+      </p:sp>
+    </p:spTree>
+    <p:extLst>
+      <p:ext uri="{BB962C8B-B14F-4D97-AF65-F5344CB8AC3E}">
+        <p14:creationId xmlns:p14="http://schemas.microsoft.com/office/powerpoint/2010/main" val="2548185199"/>
+      </p:ext>
+    </p:extLst>
+  </p:cSld>
+  <p:clrMapOvr>
+    <a:masterClrMapping/>
+  </p:clrMapOvr>
+</p:sld>
+</file>
+
+<file path=ppt/slides/slide7.xml><?xml version="1.0" encoding="utf-8"?>
+<p:sld xmlns:a="http://schemas.openxmlformats.org/drawingml/2006/main" xmlns:r="http://schemas.openxmlformats.org/officeDocument/2006/relationships" xmlns:p="http://schemas.openxmlformats.org/presentationml/2006/main">
+  <p:cSld>
+    <p:spTree>
+      <p:nvGrpSpPr>
+        <p:cNvPr id="1" name=""/>
+        <p:cNvGrpSpPr/>
+        <p:nvPr/>
+      </p:nvGrpSpPr>
+      <p:grpSpPr>
+        <a:xfrm>
+          <a:off x="0" y="0"/>
+          <a:ext cx="0" cy="0"/>
+          <a:chOff x="0" y="0"/>
+          <a:chExt cx="0" cy="0"/>
+        </a:xfrm>
+      </p:grpSpPr>
+      <p:sp>
+        <p:nvSpPr>
+          <p:cNvPr id="2" name="Content Placeholder 1">
+            <a:extLst>
+              <a:ext uri="{FF2B5EF4-FFF2-40B4-BE49-F238E27FC236}">
+                <a16:creationId xmlns:a16="http://schemas.microsoft.com/office/drawing/2014/main" id="{787ACE07-237C-4EEF-A335-325E5DEAFB8A}"/>
+              </a:ext>
+            </a:extLst>
+          </p:cNvPr>
+          <p:cNvSpPr>
+            <a:spLocks noGrp="1"/>
+          </p:cNvSpPr>
+          <p:nvPr>
+            <p:ph idx="1"/>
+          </p:nvPr>
+        </p:nvSpPr>
+        <p:spPr/>
+        <p:txBody>
+          <a:bodyPr/>
+          <a:lstStyle/>
+          <a:p>
+            <a:pPr marL="0" indent="0">
+              <a:buNone/>
+            </a:pPr>
+            <a:r>
+              <a:rPr lang="nb-NO" sz="1600" dirty="0">
+                <a:latin typeface="Courier New" panose="02070309020205020404" pitchFamily="49" charset="0"/>
+                <a:cs typeface="Courier New" panose="02070309020205020404" pitchFamily="49" charset="0"/>
+              </a:rPr>
+              <a:t>{ </a:t>
+            </a:r>
+          </a:p>
+          <a:p>
+            <a:pPr marL="0" indent="0">
+              <a:buNone/>
+            </a:pPr>
+            <a:r>
+              <a:rPr lang="nb-NO" sz="1600" dirty="0">
+                <a:latin typeface="Courier New" panose="02070309020205020404" pitchFamily="49" charset="0"/>
+                <a:cs typeface="Courier New" panose="02070309020205020404" pitchFamily="49" charset="0"/>
+              </a:rPr>
+              <a:t>	"$</a:t>
+            </a:r>
+            <a:r>
+              <a:rPr lang="nb-NO" sz="1600" dirty="0" err="1">
+                <a:latin typeface="Courier New" panose="02070309020205020404" pitchFamily="49" charset="0"/>
+                <a:cs typeface="Courier New" panose="02070309020205020404" pitchFamily="49" charset="0"/>
+              </a:rPr>
+              <a:t>schema</a:t>
+            </a:r>
+            <a:r>
+              <a:rPr lang="nb-NO" sz="1600" dirty="0">
+                <a:latin typeface="Courier New" panose="02070309020205020404" pitchFamily="49" charset="0"/>
+                <a:cs typeface="Courier New" panose="02070309020205020404" pitchFamily="49" charset="0"/>
+              </a:rPr>
+              <a:t>": "", </a:t>
+            </a:r>
+          </a:p>
+          <a:p>
+            <a:pPr marL="0" indent="0">
+              <a:buNone/>
+            </a:pPr>
+            <a:r>
+              <a:rPr lang="nb-NO" sz="1600" dirty="0">
+                <a:latin typeface="Courier New" panose="02070309020205020404" pitchFamily="49" charset="0"/>
+                <a:cs typeface="Courier New" panose="02070309020205020404" pitchFamily="49" charset="0"/>
+              </a:rPr>
+              <a:t>	"contentVersion": "", </a:t>
+            </a:r>
+          </a:p>
+          <a:p>
+            <a:pPr marL="0" indent="0">
+              <a:buNone/>
+            </a:pPr>
+            <a:r>
+              <a:rPr lang="nb-NO" sz="1600" dirty="0">
+                <a:latin typeface="Courier New" panose="02070309020205020404" pitchFamily="49" charset="0"/>
+                <a:cs typeface="Courier New" panose="02070309020205020404" pitchFamily="49" charset="0"/>
+              </a:rPr>
+              <a:t>	"parameters": { }, </a:t>
+            </a:r>
+          </a:p>
+          <a:p>
+            <a:pPr marL="0" indent="0">
+              <a:buNone/>
+            </a:pPr>
+            <a:r>
+              <a:rPr lang="nb-NO" sz="1600" dirty="0">
+                <a:latin typeface="Courier New" panose="02070309020205020404" pitchFamily="49" charset="0"/>
+                <a:cs typeface="Courier New" panose="02070309020205020404" pitchFamily="49" charset="0"/>
+              </a:rPr>
+              <a:t>	"variables": { }, </a:t>
+            </a:r>
+          </a:p>
+          <a:p>
+            <a:pPr marL="0" indent="0">
+              <a:buNone/>
+            </a:pPr>
+            <a:r>
+              <a:rPr lang="nb-NO" sz="1600" dirty="0">
+                <a:latin typeface="Courier New" panose="02070309020205020404" pitchFamily="49" charset="0"/>
+                <a:cs typeface="Courier New" panose="02070309020205020404" pitchFamily="49" charset="0"/>
+              </a:rPr>
+              <a:t>	"functions": [ ], </a:t>
+            </a:r>
+          </a:p>
+          <a:p>
+            <a:pPr marL="0" indent="0">
+              <a:buNone/>
+            </a:pPr>
+            <a:r>
+              <a:rPr lang="nb-NO" sz="1600" dirty="0">
+                <a:latin typeface="Courier New" panose="02070309020205020404" pitchFamily="49" charset="0"/>
+                <a:cs typeface="Courier New" panose="02070309020205020404" pitchFamily="49" charset="0"/>
+              </a:rPr>
+              <a:t>	"resources": [ ], </a:t>
+            </a:r>
+          </a:p>
+          <a:p>
+            <a:pPr marL="0" indent="0">
+              <a:buNone/>
+            </a:pPr>
+            <a:r>
+              <a:rPr lang="nb-NO" sz="1600" dirty="0">
+                <a:latin typeface="Courier New" panose="02070309020205020404" pitchFamily="49" charset="0"/>
+                <a:cs typeface="Courier New" panose="02070309020205020404" pitchFamily="49" charset="0"/>
+              </a:rPr>
+              <a:t>	"outputs": { } </a:t>
+            </a:r>
+          </a:p>
+          <a:p>
+            <a:pPr marL="0" indent="0">
+              <a:buNone/>
+            </a:pPr>
+            <a:r>
+              <a:rPr lang="nb-NO" sz="1600" dirty="0">
+                <a:latin typeface="Courier New" panose="02070309020205020404" pitchFamily="49" charset="0"/>
+                <a:cs typeface="Courier New" panose="02070309020205020404" pitchFamily="49" charset="0"/>
+              </a:rPr>
+              <a:t>}</a:t>
+            </a:r>
+          </a:p>
+          <a:p>
+            <a:pPr marL="0" indent="0">
+              <a:buNone/>
+            </a:pPr>
+            <a:endParaRPr lang="nb-NO" sz="1600" dirty="0">
+              <a:latin typeface="Courier New" panose="02070309020205020404" pitchFamily="49" charset="0"/>
+              <a:cs typeface="Courier New" panose="02070309020205020404" pitchFamily="49" charset="0"/>
+            </a:endParaRPr>
+          </a:p>
+          <a:p>
+            <a:r>
+              <a:rPr lang="nb-NO" sz="2000" dirty="0">
+                <a:cs typeface="Courier New" panose="02070309020205020404" pitchFamily="49" charset="0"/>
+                <a:hlinkClick r:id="rId2"/>
+              </a:rPr>
+              <a:t>https://docs.microsoft.com/en-us/azure/azure-resource-manager/resource-group-authoring-templates</a:t>
+            </a:r>
+            <a:endParaRPr lang="nb-NO" sz="2000" dirty="0">
+              <a:cs typeface="Courier New" panose="02070309020205020404" pitchFamily="49" charset="0"/>
+            </a:endParaRPr>
+          </a:p>
+          <a:p>
+            <a:endParaRPr lang="nb-NO" sz="2000" dirty="0">
+              <a:cs typeface="Courier New" panose="02070309020205020404" pitchFamily="49" charset="0"/>
+            </a:endParaRPr>
+          </a:p>
+        </p:txBody>
+      </p:sp>
+      <p:sp>
+        <p:nvSpPr>
+          <p:cNvPr id="3" name="Title 2">
+            <a:extLst>
+              <a:ext uri="{FF2B5EF4-FFF2-40B4-BE49-F238E27FC236}">
+                <a16:creationId xmlns:a16="http://schemas.microsoft.com/office/drawing/2014/main" id="{CCF727E1-176E-4A6B-8896-92949B40C349}"/>
+              </a:ext>
+            </a:extLst>
+          </p:cNvPr>
+          <p:cNvSpPr>
+            <a:spLocks noGrp="1"/>
+          </p:cNvSpPr>
+          <p:nvPr>
+            <p:ph type="title"/>
+          </p:nvPr>
+        </p:nvSpPr>
+        <p:spPr/>
+        <p:txBody>
+          <a:bodyPr/>
+          <a:lstStyle/>
+          <a:p>
+            <a:r>
+              <a:rPr lang="nb-NO" dirty="0"/>
+              <a:t>ARM-</a:t>
+            </a:r>
+            <a:r>
+              <a:rPr lang="nb-NO" dirty="0" err="1"/>
+              <a:t>templates</a:t>
+            </a:r>
+            <a:r>
+              <a:rPr lang="nb-NO" dirty="0"/>
+              <a:t> struktur </a:t>
+            </a:r>
+          </a:p>
+        </p:txBody>
+      </p:sp>
+    </p:spTree>
+    <p:extLst>
+      <p:ext uri="{BB962C8B-B14F-4D97-AF65-F5344CB8AC3E}">
+        <p14:creationId xmlns:p14="http://schemas.microsoft.com/office/powerpoint/2010/main" val="1060301785"/>
+      </p:ext>
+    </p:extLst>
+  </p:cSld>
+  <p:clrMapOvr>
+    <a:masterClrMapping/>
+  </p:clrMapOvr>
+</p:sld>
+</file>
+
+<file path=ppt/slides/slide8.xml><?xml version="1.0" encoding="utf-8"?>
+<p:sld xmlns:a="http://schemas.openxmlformats.org/drawingml/2006/main" xmlns:r="http://schemas.openxmlformats.org/officeDocument/2006/relationships" xmlns:p="http://schemas.openxmlformats.org/presentationml/2006/main">
+  <p:cSld>
+    <p:spTree>
+      <p:nvGrpSpPr>
+        <p:cNvPr id="1" name=""/>
+        <p:cNvGrpSpPr/>
+        <p:nvPr/>
+      </p:nvGrpSpPr>
+      <p:grpSpPr>
+        <a:xfrm>
+          <a:off x="0" y="0"/>
+          <a:ext cx="0" cy="0"/>
+          <a:chOff x="0" y="0"/>
+          <a:chExt cx="0" cy="0"/>
+        </a:xfrm>
+      </p:grpSpPr>
+      <p:sp>
+        <p:nvSpPr>
+          <p:cNvPr id="2" name="Content Placeholder 1">
+            <a:extLst>
+              <a:ext uri="{FF2B5EF4-FFF2-40B4-BE49-F238E27FC236}">
+                <a16:creationId xmlns:a16="http://schemas.microsoft.com/office/drawing/2014/main" id="{9ACC7AD5-9759-4794-8447-7D74D11ADA52}"/>
+              </a:ext>
+            </a:extLst>
+          </p:cNvPr>
+          <p:cNvSpPr>
+            <a:spLocks noGrp="1"/>
+          </p:cNvSpPr>
+          <p:nvPr>
+            <p:ph idx="1"/>
+          </p:nvPr>
+        </p:nvSpPr>
+        <p:spPr/>
+        <p:txBody>
+          <a:bodyPr/>
+          <a:lstStyle/>
+          <a:p>
+            <a:r>
+              <a:rPr lang="nb-NO" dirty="0">
+                <a:hlinkClick r:id="rId2"/>
+              </a:rPr>
+              <a:t>https://github.com/Azure/azure-quickstart-templates</a:t>
+            </a:r>
+            <a:endParaRPr lang="nb-NO" dirty="0"/>
+          </a:p>
+          <a:p>
+            <a:endParaRPr lang="nb-NO" dirty="0"/>
+          </a:p>
+          <a:p>
+            <a:endParaRPr lang="nb-NO" dirty="0"/>
+          </a:p>
+        </p:txBody>
+      </p:sp>
+      <p:sp>
+        <p:nvSpPr>
+          <p:cNvPr id="3" name="Title 2">
+            <a:extLst>
+              <a:ext uri="{FF2B5EF4-FFF2-40B4-BE49-F238E27FC236}">
+                <a16:creationId xmlns:a16="http://schemas.microsoft.com/office/drawing/2014/main" id="{6DF109DB-F753-405D-BE67-C0E56871CE35}"/>
+              </a:ext>
+            </a:extLst>
+          </p:cNvPr>
+          <p:cNvSpPr>
+            <a:spLocks noGrp="1"/>
+          </p:cNvSpPr>
+          <p:nvPr>
+            <p:ph type="title"/>
+          </p:nvPr>
+        </p:nvSpPr>
+        <p:spPr/>
+        <p:txBody>
+          <a:bodyPr/>
+          <a:lstStyle/>
+          <a:p>
+            <a:r>
+              <a:rPr lang="nb-NO" dirty="0"/>
+              <a:t>ARM-</a:t>
+            </a:r>
+            <a:r>
+              <a:rPr lang="nb-NO" dirty="0" err="1"/>
+              <a:t>templates</a:t>
+            </a:r>
+            <a:r>
+              <a:rPr lang="nb-NO" dirty="0"/>
+              <a:t> ressurser</a:t>
+            </a:r>
+          </a:p>
+        </p:txBody>
+      </p:sp>
+    </p:spTree>
+    <p:extLst>
+      <p:ext uri="{BB962C8B-B14F-4D97-AF65-F5344CB8AC3E}">
+        <p14:creationId xmlns:p14="http://schemas.microsoft.com/office/powerpoint/2010/main" val="72647585"/>
       </p:ext>
     </p:extLst>
   </p:cSld>
@@ -12313,12 +12942,9 @@
 </file>
 
 <file path=customXml/item1.xml><?xml version="1.0" encoding="utf-8"?>
-<?mso-contentType ?>
-<FormTemplates xmlns="http://schemas.microsoft.com/sharepoint/v3/contenttype/forms">
-  <Display>DocumentLibraryForm</Display>
-  <Edit>DocumentLibraryForm</Edit>
-  <New>DocumentLibraryForm</New>
-</FormTemplates>
+<p:properties xmlns:p="http://schemas.microsoft.com/office/2006/metadata/properties" xmlns:xsi="http://www.w3.org/2001/XMLSchema-instance" xmlns:pc="http://schemas.microsoft.com/office/infopath/2007/PartnerControls">
+  <documentManagement/>
+</p:properties>
 </file>
 
 <file path=customXml/item2.xml><?xml version="1.0" encoding="utf-8"?>
@@ -12454,15 +13080,27 @@
 </file>
 
 <file path=customXml/item3.xml><?xml version="1.0" encoding="utf-8"?>
-<p:properties xmlns:p="http://schemas.microsoft.com/office/2006/metadata/properties" xmlns:xsi="http://www.w3.org/2001/XMLSchema-instance" xmlns:pc="http://schemas.microsoft.com/office/infopath/2007/PartnerControls">
-  <documentManagement/>
-</p:properties>
+<?mso-contentType ?>
+<FormTemplates xmlns="http://schemas.microsoft.com/sharepoint/v3/contenttype/forms">
+  <Display>DocumentLibraryForm</Display>
+  <Edit>DocumentLibraryForm</Edit>
+  <New>DocumentLibraryForm</New>
+</FormTemplates>
 </file>
 
 <file path=customXml/itemProps1.xml><?xml version="1.0" encoding="utf-8"?>
-<ds:datastoreItem xmlns:ds="http://schemas.openxmlformats.org/officeDocument/2006/customXml" ds:itemID="{BB82CC63-55FC-4D22-9ED3-DB88AF6228E1}">
+<ds:datastoreItem xmlns:ds="http://schemas.openxmlformats.org/officeDocument/2006/customXml" ds:itemID="{9D2CB842-18D5-4EEF-9009-B0CAFCE7AC3E}">
   <ds:schemaRefs>
-    <ds:schemaRef ds:uri="http://schemas.microsoft.com/sharepoint/v3/contenttype/forms"/>
+    <ds:schemaRef ds:uri="http://schemas.microsoft.com/office/2006/documentManagement/types"/>
+    <ds:schemaRef ds:uri="http://schemas.microsoft.com/office/infopath/2007/PartnerControls"/>
+    <ds:schemaRef ds:uri="cd7095a3-97f1-4663-a71f-a762e9d8a5de"/>
+    <ds:schemaRef ds:uri="http://purl.org/dc/elements/1.1/"/>
+    <ds:schemaRef ds:uri="http://schemas.microsoft.com/office/2006/metadata/properties"/>
+    <ds:schemaRef ds:uri="http://schemas.microsoft.com/sharepoint/v3"/>
+    <ds:schemaRef ds:uri="http://purl.org/dc/terms/"/>
+    <ds:schemaRef ds:uri="http://schemas.openxmlformats.org/package/2006/metadata/core-properties"/>
+    <ds:schemaRef ds:uri="http://www.w3.org/XML/1998/namespace"/>
+    <ds:schemaRef ds:uri="http://purl.org/dc/dcmitype/"/>
   </ds:schemaRefs>
 </ds:datastoreItem>
 </file>
@@ -12486,18 +13124,9 @@
 </file>
 
 <file path=customXml/itemProps3.xml><?xml version="1.0" encoding="utf-8"?>
-<ds:datastoreItem xmlns:ds="http://schemas.openxmlformats.org/officeDocument/2006/customXml" ds:itemID="{9D2CB842-18D5-4EEF-9009-B0CAFCE7AC3E}">
+<ds:datastoreItem xmlns:ds="http://schemas.openxmlformats.org/officeDocument/2006/customXml" ds:itemID="{BB82CC63-55FC-4D22-9ED3-DB88AF6228E1}">
   <ds:schemaRefs>
-    <ds:schemaRef ds:uri="http://schemas.microsoft.com/office/2006/documentManagement/types"/>
-    <ds:schemaRef ds:uri="http://schemas.microsoft.com/office/infopath/2007/PartnerControls"/>
-    <ds:schemaRef ds:uri="cd7095a3-97f1-4663-a71f-a762e9d8a5de"/>
-    <ds:schemaRef ds:uri="http://purl.org/dc/elements/1.1/"/>
-    <ds:schemaRef ds:uri="http://schemas.microsoft.com/office/2006/metadata/properties"/>
-    <ds:schemaRef ds:uri="http://schemas.microsoft.com/sharepoint/v3"/>
-    <ds:schemaRef ds:uri="http://purl.org/dc/terms/"/>
-    <ds:schemaRef ds:uri="http://schemas.openxmlformats.org/package/2006/metadata/core-properties"/>
-    <ds:schemaRef ds:uri="http://www.w3.org/XML/1998/namespace"/>
-    <ds:schemaRef ds:uri="http://purl.org/dc/dcmitype/"/>
+    <ds:schemaRef ds:uri="http://schemas.microsoft.com/sharepoint/v3/contenttype/forms"/>
   </ds:schemaRefs>
 </ds:datastoreItem>
 </file>
</xml_diff>

<commit_message>
lagt til slides om devops
</commit_message>
<xml_diff>
--- a/Workshop_2/Presentasjon/Azureskolen-Workshop#2.pptx
+++ b/Workshop_2/Presentasjon/Azureskolen-Workshop#2.pptx
@@ -7,20 +7,29 @@
     <p:sldMasterId id="2147483705" r:id="rId6"/>
   </p:sldMasterIdLst>
   <p:notesMasterIdLst>
-    <p:notesMasterId r:id="rId15"/>
+    <p:notesMasterId r:id="rId24"/>
   </p:notesMasterIdLst>
   <p:handoutMasterIdLst>
-    <p:handoutMasterId r:id="rId16"/>
+    <p:handoutMasterId r:id="rId25"/>
   </p:handoutMasterIdLst>
   <p:sldIdLst>
     <p:sldId id="256" r:id="rId7"/>
     <p:sldId id="257" r:id="rId8"/>
     <p:sldId id="259" r:id="rId9"/>
     <p:sldId id="260" r:id="rId10"/>
-    <p:sldId id="264" r:id="rId11"/>
-    <p:sldId id="261" r:id="rId12"/>
-    <p:sldId id="262" r:id="rId13"/>
-    <p:sldId id="263" r:id="rId14"/>
+    <p:sldId id="265" r:id="rId11"/>
+    <p:sldId id="266" r:id="rId12"/>
+    <p:sldId id="269" r:id="rId13"/>
+    <p:sldId id="267" r:id="rId14"/>
+    <p:sldId id="268" r:id="rId15"/>
+    <p:sldId id="270" r:id="rId16"/>
+    <p:sldId id="271" r:id="rId17"/>
+    <p:sldId id="272" r:id="rId18"/>
+    <p:sldId id="273" r:id="rId19"/>
+    <p:sldId id="264" r:id="rId20"/>
+    <p:sldId id="261" r:id="rId21"/>
+    <p:sldId id="262" r:id="rId22"/>
+    <p:sldId id="263" r:id="rId23"/>
   </p:sldIdLst>
   <p:sldSz cx="12192000" cy="6858000"/>
   <p:notesSz cx="6858000" cy="9144000"/>
@@ -583,7 +592,7 @@
           <a:p>
             <a:fld id="{54C52192-B826-4AE0-9CD6-BEA9467D12B3}" type="datetimeFigureOut">
               <a:rPr lang="nb-NO" smtClean="0"/>
-              <a:t>14.12.2018</a:t>
+              <a:t>15.01.2019</a:t>
             </a:fld>
             <a:endParaRPr lang="nb-NO"/>
           </a:p>
@@ -748,7 +757,7 @@
           <a:p>
             <a:fld id="{2696BCB2-2760-41B1-A1BE-7886EF110FCB}" type="datetimeFigureOut">
               <a:rPr lang="nb-NO" smtClean="0"/>
-              <a:t>14.12.2018</a:t>
+              <a:t>15.01.2019</a:t>
             </a:fld>
             <a:endParaRPr lang="nb-NO"/>
           </a:p>
@@ -1094,6 +1103,553 @@
     <p:extLst>
       <p:ext uri="{BB962C8B-B14F-4D97-AF65-F5344CB8AC3E}">
         <p14:creationId xmlns:p14="http://schemas.microsoft.com/office/powerpoint/2010/main" val="700894197"/>
+      </p:ext>
+    </p:extLst>
+  </p:cSld>
+  <p:clrMapOvr>
+    <a:masterClrMapping/>
+  </p:clrMapOvr>
+</p:notes>
+</file>
+
+<file path=ppt/notesSlides/notesSlide2.xml><?xml version="1.0" encoding="utf-8"?>
+<p:notes xmlns:a="http://schemas.openxmlformats.org/drawingml/2006/main" xmlns:r="http://schemas.openxmlformats.org/officeDocument/2006/relationships" xmlns:p="http://schemas.openxmlformats.org/presentationml/2006/main">
+  <p:cSld>
+    <p:spTree>
+      <p:nvGrpSpPr>
+        <p:cNvPr id="1" name=""/>
+        <p:cNvGrpSpPr/>
+        <p:nvPr/>
+      </p:nvGrpSpPr>
+      <p:grpSpPr>
+        <a:xfrm>
+          <a:off x="0" y="0"/>
+          <a:ext cx="0" cy="0"/>
+          <a:chOff x="0" y="0"/>
+          <a:chExt cx="0" cy="0"/>
+        </a:xfrm>
+      </p:grpSpPr>
+      <p:sp>
+        <p:nvSpPr>
+          <p:cNvPr id="2" name="Slide Image Placeholder 1"/>
+          <p:cNvSpPr>
+            <a:spLocks noGrp="1" noRot="1" noChangeAspect="1"/>
+          </p:cNvSpPr>
+          <p:nvPr>
+            <p:ph type="sldImg"/>
+          </p:nvPr>
+        </p:nvSpPr>
+        <p:spPr/>
+      </p:sp>
+      <p:sp>
+        <p:nvSpPr>
+          <p:cNvPr id="3" name="Notes Placeholder 2"/>
+          <p:cNvSpPr>
+            <a:spLocks noGrp="1"/>
+          </p:cNvSpPr>
+          <p:nvPr>
+            <p:ph type="body" idx="1"/>
+          </p:nvPr>
+        </p:nvSpPr>
+        <p:spPr/>
+        <p:txBody>
+          <a:bodyPr/>
+          <a:lstStyle/>
+          <a:p>
+            <a:r>
+              <a:rPr lang="nb-NO" dirty="0"/>
+              <a:t>Hva er grunnen til at vi</a:t>
+            </a:r>
+            <a:r>
+              <a:rPr lang="nb-NO" baseline="0" dirty="0"/>
+              <a:t> gjør det vi gjør? </a:t>
+            </a:r>
+          </a:p>
+          <a:p>
+            <a:r>
+              <a:rPr lang="nb-NO" baseline="0" dirty="0"/>
+              <a:t>Klarer vi å si noe generelt om hva det er vi gjør for kundene våre?</a:t>
+            </a:r>
+          </a:p>
+          <a:p>
+            <a:endParaRPr lang="nb-NO" baseline="0" dirty="0"/>
+          </a:p>
+          <a:p>
+            <a:endParaRPr lang="nb-NO" baseline="0" dirty="0"/>
+          </a:p>
+        </p:txBody>
+      </p:sp>
+      <p:sp>
+        <p:nvSpPr>
+          <p:cNvPr id="4" name="Slide Number Placeholder 3"/>
+          <p:cNvSpPr>
+            <a:spLocks noGrp="1"/>
+          </p:cNvSpPr>
+          <p:nvPr>
+            <p:ph type="sldNum" sz="quarter" idx="10"/>
+          </p:nvPr>
+        </p:nvSpPr>
+        <p:spPr/>
+        <p:txBody>
+          <a:bodyPr/>
+          <a:lstStyle/>
+          <a:p>
+            <a:fld id="{180377DB-C4B0-49B2-8838-0F01BA83B7C4}" type="slidenum">
+              <a:rPr lang="nb-NO" smtClean="0"/>
+              <a:t>5</a:t>
+            </a:fld>
+            <a:endParaRPr lang="nb-NO"/>
+          </a:p>
+        </p:txBody>
+      </p:sp>
+    </p:spTree>
+    <p:extLst>
+      <p:ext uri="{BB962C8B-B14F-4D97-AF65-F5344CB8AC3E}">
+        <p14:creationId xmlns:p14="http://schemas.microsoft.com/office/powerpoint/2010/main" val="2637684536"/>
+      </p:ext>
+    </p:extLst>
+  </p:cSld>
+  <p:clrMapOvr>
+    <a:masterClrMapping/>
+  </p:clrMapOvr>
+</p:notes>
+</file>
+
+<file path=ppt/notesSlides/notesSlide3.xml><?xml version="1.0" encoding="utf-8"?>
+<p:notes xmlns:a="http://schemas.openxmlformats.org/drawingml/2006/main" xmlns:r="http://schemas.openxmlformats.org/officeDocument/2006/relationships" xmlns:p="http://schemas.openxmlformats.org/presentationml/2006/main">
+  <p:cSld>
+    <p:spTree>
+      <p:nvGrpSpPr>
+        <p:cNvPr id="1" name=""/>
+        <p:cNvGrpSpPr/>
+        <p:nvPr/>
+      </p:nvGrpSpPr>
+      <p:grpSpPr>
+        <a:xfrm>
+          <a:off x="0" y="0"/>
+          <a:ext cx="0" cy="0"/>
+          <a:chOff x="0" y="0"/>
+          <a:chExt cx="0" cy="0"/>
+        </a:xfrm>
+      </p:grpSpPr>
+      <p:sp>
+        <p:nvSpPr>
+          <p:cNvPr id="2" name="Slide Image Placeholder 1"/>
+          <p:cNvSpPr>
+            <a:spLocks noGrp="1" noRot="1" noChangeAspect="1"/>
+          </p:cNvSpPr>
+          <p:nvPr>
+            <p:ph type="sldImg"/>
+          </p:nvPr>
+        </p:nvSpPr>
+        <p:spPr/>
+      </p:sp>
+      <p:sp>
+        <p:nvSpPr>
+          <p:cNvPr id="3" name="Notes Placeholder 2"/>
+          <p:cNvSpPr>
+            <a:spLocks noGrp="1"/>
+          </p:cNvSpPr>
+          <p:nvPr>
+            <p:ph type="body" idx="1"/>
+          </p:nvPr>
+        </p:nvSpPr>
+        <p:spPr/>
+        <p:txBody>
+          <a:bodyPr/>
+          <a:lstStyle/>
+          <a:p>
+            <a:r>
+              <a:rPr lang="nb-NO" dirty="0"/>
+              <a:t>La oss</a:t>
+            </a:r>
+            <a:r>
+              <a:rPr lang="nb-NO" baseline="0" dirty="0"/>
+              <a:t> si at målet med det vi jobber med er å skape verdi.</a:t>
+            </a:r>
+          </a:p>
+          <a:p>
+            <a:r>
+              <a:rPr lang="nb-NO" baseline="0" dirty="0"/>
+              <a:t>Hva vil det si? Når skaper vi verdi med </a:t>
+            </a:r>
+            <a:r>
+              <a:rPr lang="nb-NO" baseline="0" dirty="0" err="1"/>
+              <a:t>software</a:t>
+            </a:r>
+            <a:r>
+              <a:rPr lang="nb-NO" baseline="0" dirty="0"/>
+              <a:t>, som konsulenter?</a:t>
+            </a:r>
+          </a:p>
+          <a:p>
+            <a:endParaRPr lang="nb-NO" dirty="0"/>
+          </a:p>
+        </p:txBody>
+      </p:sp>
+      <p:sp>
+        <p:nvSpPr>
+          <p:cNvPr id="4" name="Slide Number Placeholder 3"/>
+          <p:cNvSpPr>
+            <a:spLocks noGrp="1"/>
+          </p:cNvSpPr>
+          <p:nvPr>
+            <p:ph type="sldNum" sz="quarter" idx="10"/>
+          </p:nvPr>
+        </p:nvSpPr>
+        <p:spPr/>
+        <p:txBody>
+          <a:bodyPr/>
+          <a:lstStyle/>
+          <a:p>
+            <a:fld id="{180377DB-C4B0-49B2-8838-0F01BA83B7C4}" type="slidenum">
+              <a:rPr lang="nb-NO" smtClean="0"/>
+              <a:t>6</a:t>
+            </a:fld>
+            <a:endParaRPr lang="nb-NO"/>
+          </a:p>
+        </p:txBody>
+      </p:sp>
+    </p:spTree>
+    <p:extLst>
+      <p:ext uri="{BB962C8B-B14F-4D97-AF65-F5344CB8AC3E}">
+        <p14:creationId xmlns:p14="http://schemas.microsoft.com/office/powerpoint/2010/main" val="990557992"/>
+      </p:ext>
+    </p:extLst>
+  </p:cSld>
+  <p:clrMapOvr>
+    <a:masterClrMapping/>
+  </p:clrMapOvr>
+</p:notes>
+</file>
+
+<file path=ppt/notesSlides/notesSlide4.xml><?xml version="1.0" encoding="utf-8"?>
+<p:notes xmlns:a="http://schemas.openxmlformats.org/drawingml/2006/main" xmlns:r="http://schemas.openxmlformats.org/officeDocument/2006/relationships" xmlns:p="http://schemas.openxmlformats.org/presentationml/2006/main">
+  <p:cSld>
+    <p:spTree>
+      <p:nvGrpSpPr>
+        <p:cNvPr id="1" name=""/>
+        <p:cNvGrpSpPr/>
+        <p:nvPr/>
+      </p:nvGrpSpPr>
+      <p:grpSpPr>
+        <a:xfrm>
+          <a:off x="0" y="0"/>
+          <a:ext cx="0" cy="0"/>
+          <a:chOff x="0" y="0"/>
+          <a:chExt cx="0" cy="0"/>
+        </a:xfrm>
+      </p:grpSpPr>
+      <p:sp>
+        <p:nvSpPr>
+          <p:cNvPr id="2" name="Slide Image Placeholder 1"/>
+          <p:cNvSpPr>
+            <a:spLocks noGrp="1" noRot="1" noChangeAspect="1"/>
+          </p:cNvSpPr>
+          <p:nvPr>
+            <p:ph type="sldImg"/>
+          </p:nvPr>
+        </p:nvSpPr>
+        <p:spPr/>
+      </p:sp>
+      <p:sp>
+        <p:nvSpPr>
+          <p:cNvPr id="3" name="Notes Placeholder 2"/>
+          <p:cNvSpPr>
+            <a:spLocks noGrp="1"/>
+          </p:cNvSpPr>
+          <p:nvPr>
+            <p:ph type="body" idx="1"/>
+          </p:nvPr>
+        </p:nvSpPr>
+        <p:spPr/>
+        <p:txBody>
+          <a:bodyPr/>
+          <a:lstStyle/>
+          <a:p>
+            <a:endParaRPr lang="nb-NO" dirty="0"/>
+          </a:p>
+        </p:txBody>
+      </p:sp>
+      <p:sp>
+        <p:nvSpPr>
+          <p:cNvPr id="4" name="Slide Number Placeholder 3"/>
+          <p:cNvSpPr>
+            <a:spLocks noGrp="1"/>
+          </p:cNvSpPr>
+          <p:nvPr>
+            <p:ph type="sldNum" sz="quarter" idx="10"/>
+          </p:nvPr>
+        </p:nvSpPr>
+        <p:spPr/>
+        <p:txBody>
+          <a:bodyPr/>
+          <a:lstStyle/>
+          <a:p>
+            <a:fld id="{180377DB-C4B0-49B2-8838-0F01BA83B7C4}" type="slidenum">
+              <a:rPr lang="nb-NO" smtClean="0"/>
+              <a:t>7</a:t>
+            </a:fld>
+            <a:endParaRPr lang="nb-NO"/>
+          </a:p>
+        </p:txBody>
+      </p:sp>
+    </p:spTree>
+    <p:extLst>
+      <p:ext uri="{BB962C8B-B14F-4D97-AF65-F5344CB8AC3E}">
+        <p14:creationId xmlns:p14="http://schemas.microsoft.com/office/powerpoint/2010/main" val="4078786062"/>
+      </p:ext>
+    </p:extLst>
+  </p:cSld>
+  <p:clrMapOvr>
+    <a:masterClrMapping/>
+  </p:clrMapOvr>
+</p:notes>
+</file>
+
+<file path=ppt/notesSlides/notesSlide5.xml><?xml version="1.0" encoding="utf-8"?>
+<p:notes xmlns:a="http://schemas.openxmlformats.org/drawingml/2006/main" xmlns:r="http://schemas.openxmlformats.org/officeDocument/2006/relationships" xmlns:p="http://schemas.openxmlformats.org/presentationml/2006/main">
+  <p:cSld>
+    <p:spTree>
+      <p:nvGrpSpPr>
+        <p:cNvPr id="1" name=""/>
+        <p:cNvGrpSpPr/>
+        <p:nvPr/>
+      </p:nvGrpSpPr>
+      <p:grpSpPr>
+        <a:xfrm>
+          <a:off x="0" y="0"/>
+          <a:ext cx="0" cy="0"/>
+          <a:chOff x="0" y="0"/>
+          <a:chExt cx="0" cy="0"/>
+        </a:xfrm>
+      </p:grpSpPr>
+      <p:sp>
+        <p:nvSpPr>
+          <p:cNvPr id="2" name="Slide Image Placeholder 1"/>
+          <p:cNvSpPr>
+            <a:spLocks noGrp="1" noRot="1" noChangeAspect="1"/>
+          </p:cNvSpPr>
+          <p:nvPr>
+            <p:ph type="sldImg"/>
+          </p:nvPr>
+        </p:nvSpPr>
+        <p:spPr/>
+      </p:sp>
+      <p:sp>
+        <p:nvSpPr>
+          <p:cNvPr id="3" name="Notes Placeholder 2"/>
+          <p:cNvSpPr>
+            <a:spLocks noGrp="1"/>
+          </p:cNvSpPr>
+          <p:nvPr>
+            <p:ph type="body" idx="1"/>
+          </p:nvPr>
+        </p:nvSpPr>
+        <p:spPr/>
+        <p:txBody>
+          <a:bodyPr/>
+          <a:lstStyle/>
+          <a:p>
+            <a:endParaRPr lang="nb-NO" dirty="0"/>
+          </a:p>
+        </p:txBody>
+      </p:sp>
+      <p:sp>
+        <p:nvSpPr>
+          <p:cNvPr id="4" name="Slide Number Placeholder 3"/>
+          <p:cNvSpPr>
+            <a:spLocks noGrp="1"/>
+          </p:cNvSpPr>
+          <p:nvPr>
+            <p:ph type="sldNum" sz="quarter" idx="10"/>
+          </p:nvPr>
+        </p:nvSpPr>
+        <p:spPr/>
+        <p:txBody>
+          <a:bodyPr/>
+          <a:lstStyle/>
+          <a:p>
+            <a:fld id="{180377DB-C4B0-49B2-8838-0F01BA83B7C4}" type="slidenum">
+              <a:rPr lang="nb-NO" smtClean="0"/>
+              <a:t>8</a:t>
+            </a:fld>
+            <a:endParaRPr lang="nb-NO"/>
+          </a:p>
+        </p:txBody>
+      </p:sp>
+    </p:spTree>
+    <p:extLst>
+      <p:ext uri="{BB962C8B-B14F-4D97-AF65-F5344CB8AC3E}">
+        <p14:creationId xmlns:p14="http://schemas.microsoft.com/office/powerpoint/2010/main" val="2212570599"/>
+      </p:ext>
+    </p:extLst>
+  </p:cSld>
+  <p:clrMapOvr>
+    <a:masterClrMapping/>
+  </p:clrMapOvr>
+</p:notes>
+</file>
+
+<file path=ppt/notesSlides/notesSlide6.xml><?xml version="1.0" encoding="utf-8"?>
+<p:notes xmlns:a="http://schemas.openxmlformats.org/drawingml/2006/main" xmlns:r="http://schemas.openxmlformats.org/officeDocument/2006/relationships" xmlns:p="http://schemas.openxmlformats.org/presentationml/2006/main">
+  <p:cSld>
+    <p:spTree>
+      <p:nvGrpSpPr>
+        <p:cNvPr id="1" name=""/>
+        <p:cNvGrpSpPr/>
+        <p:nvPr/>
+      </p:nvGrpSpPr>
+      <p:grpSpPr>
+        <a:xfrm>
+          <a:off x="0" y="0"/>
+          <a:ext cx="0" cy="0"/>
+          <a:chOff x="0" y="0"/>
+          <a:chExt cx="0" cy="0"/>
+        </a:xfrm>
+      </p:grpSpPr>
+      <p:sp>
+        <p:nvSpPr>
+          <p:cNvPr id="2" name="Slide Image Placeholder 1"/>
+          <p:cNvSpPr>
+            <a:spLocks noGrp="1" noRot="1" noChangeAspect="1"/>
+          </p:cNvSpPr>
+          <p:nvPr>
+            <p:ph type="sldImg"/>
+          </p:nvPr>
+        </p:nvSpPr>
+        <p:spPr/>
+      </p:sp>
+      <p:sp>
+        <p:nvSpPr>
+          <p:cNvPr id="3" name="Notes Placeholder 2"/>
+          <p:cNvSpPr>
+            <a:spLocks noGrp="1"/>
+          </p:cNvSpPr>
+          <p:nvPr>
+            <p:ph type="body" idx="1"/>
+          </p:nvPr>
+        </p:nvSpPr>
+        <p:spPr/>
+        <p:txBody>
+          <a:bodyPr/>
+          <a:lstStyle/>
+          <a:p>
+            <a:endParaRPr lang="nb-NO" dirty="0"/>
+          </a:p>
+        </p:txBody>
+      </p:sp>
+      <p:sp>
+        <p:nvSpPr>
+          <p:cNvPr id="4" name="Slide Number Placeholder 3"/>
+          <p:cNvSpPr>
+            <a:spLocks noGrp="1"/>
+          </p:cNvSpPr>
+          <p:nvPr>
+            <p:ph type="sldNum" sz="quarter" idx="10"/>
+          </p:nvPr>
+        </p:nvSpPr>
+        <p:spPr/>
+        <p:txBody>
+          <a:bodyPr/>
+          <a:lstStyle/>
+          <a:p>
+            <a:fld id="{180377DB-C4B0-49B2-8838-0F01BA83B7C4}" type="slidenum">
+              <a:rPr lang="nb-NO" smtClean="0"/>
+              <a:t>9</a:t>
+            </a:fld>
+            <a:endParaRPr lang="nb-NO"/>
+          </a:p>
+        </p:txBody>
+      </p:sp>
+    </p:spTree>
+    <p:extLst>
+      <p:ext uri="{BB962C8B-B14F-4D97-AF65-F5344CB8AC3E}">
+        <p14:creationId xmlns:p14="http://schemas.microsoft.com/office/powerpoint/2010/main" val="3585912629"/>
+      </p:ext>
+    </p:extLst>
+  </p:cSld>
+  <p:clrMapOvr>
+    <a:masterClrMapping/>
+  </p:clrMapOvr>
+</p:notes>
+</file>
+
+<file path=ppt/notesSlides/notesSlide7.xml><?xml version="1.0" encoding="utf-8"?>
+<p:notes xmlns:a="http://schemas.openxmlformats.org/drawingml/2006/main" xmlns:r="http://schemas.openxmlformats.org/officeDocument/2006/relationships" xmlns:p="http://schemas.openxmlformats.org/presentationml/2006/main">
+  <p:cSld>
+    <p:spTree>
+      <p:nvGrpSpPr>
+        <p:cNvPr id="1" name=""/>
+        <p:cNvGrpSpPr/>
+        <p:nvPr/>
+      </p:nvGrpSpPr>
+      <p:grpSpPr>
+        <a:xfrm>
+          <a:off x="0" y="0"/>
+          <a:ext cx="0" cy="0"/>
+          <a:chOff x="0" y="0"/>
+          <a:chExt cx="0" cy="0"/>
+        </a:xfrm>
+      </p:grpSpPr>
+      <p:sp>
+        <p:nvSpPr>
+          <p:cNvPr id="2" name="Slide Image Placeholder 1"/>
+          <p:cNvSpPr>
+            <a:spLocks noGrp="1" noRot="1" noChangeAspect="1"/>
+          </p:cNvSpPr>
+          <p:nvPr>
+            <p:ph type="sldImg"/>
+          </p:nvPr>
+        </p:nvSpPr>
+        <p:spPr/>
+      </p:sp>
+      <p:sp>
+        <p:nvSpPr>
+          <p:cNvPr id="3" name="Notes Placeholder 2"/>
+          <p:cNvSpPr>
+            <a:spLocks noGrp="1"/>
+          </p:cNvSpPr>
+          <p:nvPr>
+            <p:ph type="body" idx="1"/>
+          </p:nvPr>
+        </p:nvSpPr>
+        <p:spPr/>
+        <p:txBody>
+          <a:bodyPr/>
+          <a:lstStyle/>
+          <a:p>
+            <a:endParaRPr lang="nb-NO" dirty="0"/>
+          </a:p>
+        </p:txBody>
+      </p:sp>
+      <p:sp>
+        <p:nvSpPr>
+          <p:cNvPr id="4" name="Slide Number Placeholder 3"/>
+          <p:cNvSpPr>
+            <a:spLocks noGrp="1"/>
+          </p:cNvSpPr>
+          <p:nvPr>
+            <p:ph type="sldNum" sz="quarter" idx="10"/>
+          </p:nvPr>
+        </p:nvSpPr>
+        <p:spPr/>
+        <p:txBody>
+          <a:bodyPr/>
+          <a:lstStyle/>
+          <a:p>
+            <a:fld id="{180377DB-C4B0-49B2-8838-0F01BA83B7C4}" type="slidenum">
+              <a:rPr lang="nb-NO" smtClean="0"/>
+              <a:t>13</a:t>
+            </a:fld>
+            <a:endParaRPr lang="nb-NO"/>
+          </a:p>
+        </p:txBody>
+      </p:sp>
+    </p:spTree>
+    <p:extLst>
+      <p:ext uri="{BB962C8B-B14F-4D97-AF65-F5344CB8AC3E}">
+        <p14:creationId xmlns:p14="http://schemas.microsoft.com/office/powerpoint/2010/main" val="1628035474"/>
       </p:ext>
     </p:extLst>
   </p:cSld>
@@ -10416,6 +10972,1319 @@
 </p:sld>
 </file>
 
+<file path=ppt/slides/slide10.xml><?xml version="1.0" encoding="utf-8"?>
+<p:sld xmlns:a="http://schemas.openxmlformats.org/drawingml/2006/main" xmlns:r="http://schemas.openxmlformats.org/officeDocument/2006/relationships" xmlns:p="http://schemas.openxmlformats.org/presentationml/2006/main">
+  <p:cSld>
+    <p:spTree>
+      <p:nvGrpSpPr>
+        <p:cNvPr id="1" name=""/>
+        <p:cNvGrpSpPr/>
+        <p:nvPr/>
+      </p:nvGrpSpPr>
+      <p:grpSpPr>
+        <a:xfrm>
+          <a:off x="0" y="0"/>
+          <a:ext cx="0" cy="0"/>
+          <a:chOff x="0" y="0"/>
+          <a:chExt cx="0" cy="0"/>
+        </a:xfrm>
+      </p:grpSpPr>
+      <p:sp>
+        <p:nvSpPr>
+          <p:cNvPr id="3" name="Title 2"/>
+          <p:cNvSpPr>
+            <a:spLocks noGrp="1"/>
+          </p:cNvSpPr>
+          <p:nvPr>
+            <p:ph type="title"/>
+          </p:nvPr>
+        </p:nvSpPr>
+        <p:spPr/>
+        <p:txBody>
+          <a:bodyPr/>
+          <a:lstStyle/>
+          <a:p>
+            <a:r>
+              <a:rPr lang="nb-NO" dirty="0"/>
+              <a:t>Feedback</a:t>
+            </a:r>
+          </a:p>
+        </p:txBody>
+      </p:sp>
+      <p:pic>
+        <p:nvPicPr>
+          <p:cNvPr id="4" name="Bilde 6">
+            <a:extLst/>
+          </p:cNvPr>
+          <p:cNvPicPr>
+            <a:picLocks noGrp="1" noChangeAspect="1"/>
+          </p:cNvPicPr>
+          <p:nvPr>
+            <p:ph idx="1"/>
+          </p:nvPr>
+        </p:nvPicPr>
+        <p:blipFill>
+          <a:blip r:embed="rId2"/>
+          <a:stretch>
+            <a:fillRect/>
+          </a:stretch>
+        </p:blipFill>
+        <p:spPr>
+          <a:xfrm>
+            <a:off x="3922999" y="1690688"/>
+            <a:ext cx="4702590" cy="1590227"/>
+          </a:xfrm>
+          <a:prstGeom prst="rect">
+            <a:avLst/>
+          </a:prstGeom>
+        </p:spPr>
+      </p:pic>
+      <p:sp>
+        <p:nvSpPr>
+          <p:cNvPr id="5" name="Rectangle 4"/>
+          <p:cNvSpPr/>
+          <p:nvPr/>
+        </p:nvSpPr>
+        <p:spPr>
+          <a:xfrm>
+            <a:off x="802803" y="3816625"/>
+            <a:ext cx="10942983" cy="1729409"/>
+          </a:xfrm>
+          <a:prstGeom prst="rect">
+            <a:avLst/>
+          </a:prstGeom>
+          <a:solidFill>
+            <a:schemeClr val="bg1"/>
+          </a:solidFill>
+          <a:ln>
+            <a:solidFill>
+              <a:schemeClr val="bg1"/>
+            </a:solidFill>
+          </a:ln>
+        </p:spPr>
+        <p:style>
+          <a:lnRef idx="2">
+            <a:schemeClr val="accent1">
+              <a:shade val="50000"/>
+            </a:schemeClr>
+          </a:lnRef>
+          <a:fillRef idx="1">
+            <a:schemeClr val="accent1"/>
+          </a:fillRef>
+          <a:effectRef idx="0">
+            <a:schemeClr val="accent1"/>
+          </a:effectRef>
+          <a:fontRef idx="minor">
+            <a:schemeClr val="lt1"/>
+          </a:fontRef>
+        </p:style>
+        <p:txBody>
+          <a:bodyPr rtlCol="0" anchor="t"/>
+          <a:lstStyle/>
+          <a:p>
+            <a:pPr lvl="1"/>
+            <a:r>
+              <a:rPr lang="nb-NO" sz="4000" dirty="0">
+                <a:solidFill>
+                  <a:schemeClr val="tx1"/>
+                </a:solidFill>
+              </a:rPr>
+              <a:t>«Technology </a:t>
+            </a:r>
+            <a:r>
+              <a:rPr lang="nb-NO" sz="4000" dirty="0" err="1">
+                <a:solidFill>
+                  <a:schemeClr val="tx1"/>
+                </a:solidFill>
+              </a:rPr>
+              <a:t>can</a:t>
+            </a:r>
+            <a:r>
+              <a:rPr lang="nb-NO" sz="4000" dirty="0">
+                <a:solidFill>
+                  <a:schemeClr val="tx1"/>
+                </a:solidFill>
+              </a:rPr>
+              <a:t> be </a:t>
+            </a:r>
+            <a:r>
+              <a:rPr lang="nb-NO" sz="4000" dirty="0" err="1">
+                <a:solidFill>
+                  <a:schemeClr val="tx1"/>
+                </a:solidFill>
+              </a:rPr>
+              <a:t>beneficial</a:t>
+            </a:r>
+            <a:r>
+              <a:rPr lang="nb-NO" sz="4000" dirty="0">
+                <a:solidFill>
+                  <a:schemeClr val="tx1"/>
+                </a:solidFill>
+              </a:rPr>
+              <a:t> </a:t>
+            </a:r>
+            <a:r>
+              <a:rPr lang="nb-NO" sz="4000" dirty="0" err="1">
+                <a:solidFill>
+                  <a:schemeClr val="tx1"/>
+                </a:solidFill>
+              </a:rPr>
+              <a:t>if</a:t>
+            </a:r>
+            <a:r>
+              <a:rPr lang="nb-NO" sz="4000" dirty="0">
+                <a:solidFill>
+                  <a:schemeClr val="tx1"/>
+                </a:solidFill>
+              </a:rPr>
+              <a:t> and </a:t>
+            </a:r>
+            <a:r>
+              <a:rPr lang="nb-NO" sz="4000" dirty="0" err="1">
+                <a:solidFill>
+                  <a:schemeClr val="tx1"/>
+                </a:solidFill>
+              </a:rPr>
+              <a:t>only</a:t>
+            </a:r>
+            <a:r>
+              <a:rPr lang="nb-NO" sz="4000" dirty="0">
+                <a:solidFill>
+                  <a:schemeClr val="tx1"/>
+                </a:solidFill>
+              </a:rPr>
+              <a:t> </a:t>
+            </a:r>
+            <a:r>
+              <a:rPr lang="nb-NO" sz="4000" dirty="0" err="1">
+                <a:solidFill>
+                  <a:schemeClr val="tx1"/>
+                </a:solidFill>
+              </a:rPr>
+              <a:t>if</a:t>
+            </a:r>
+            <a:r>
+              <a:rPr lang="nb-NO" sz="4000" dirty="0">
+                <a:solidFill>
+                  <a:schemeClr val="tx1"/>
+                </a:solidFill>
+              </a:rPr>
+              <a:t> it </a:t>
+            </a:r>
+            <a:r>
+              <a:rPr lang="nb-NO" sz="4000" dirty="0" err="1">
+                <a:solidFill>
+                  <a:schemeClr val="tx1"/>
+                </a:solidFill>
+              </a:rPr>
+              <a:t>deminishes</a:t>
+            </a:r>
+            <a:r>
+              <a:rPr lang="nb-NO" sz="4000" dirty="0">
+                <a:solidFill>
+                  <a:schemeClr val="tx1"/>
+                </a:solidFill>
+              </a:rPr>
+              <a:t> a </a:t>
+            </a:r>
+            <a:r>
+              <a:rPr lang="nb-NO" sz="4000" dirty="0" err="1">
+                <a:solidFill>
+                  <a:schemeClr val="tx1"/>
+                </a:solidFill>
+              </a:rPr>
+              <a:t>limitation</a:t>
+            </a:r>
+            <a:r>
+              <a:rPr lang="nb-NO" sz="4000" dirty="0">
+                <a:solidFill>
+                  <a:schemeClr val="tx1"/>
+                </a:solidFill>
+              </a:rPr>
+              <a:t>» - Dr. </a:t>
+            </a:r>
+            <a:r>
+              <a:rPr lang="nb-NO" sz="4000" dirty="0" err="1">
+                <a:solidFill>
+                  <a:schemeClr val="tx1"/>
+                </a:solidFill>
+              </a:rPr>
+              <a:t>Eliyahu</a:t>
+            </a:r>
+            <a:r>
+              <a:rPr lang="nb-NO" sz="4000" dirty="0">
+                <a:solidFill>
+                  <a:schemeClr val="tx1"/>
+                </a:solidFill>
+              </a:rPr>
+              <a:t> M. Goldratt</a:t>
+            </a:r>
+          </a:p>
+        </p:txBody>
+      </p:sp>
+    </p:spTree>
+    <p:extLst>
+      <p:ext uri="{BB962C8B-B14F-4D97-AF65-F5344CB8AC3E}">
+        <p14:creationId xmlns:p14="http://schemas.microsoft.com/office/powerpoint/2010/main" val="2876007488"/>
+      </p:ext>
+    </p:extLst>
+  </p:cSld>
+  <p:clrMapOvr>
+    <a:masterClrMapping/>
+  </p:clrMapOvr>
+</p:sld>
+</file>
+
+<file path=ppt/slides/slide11.xml><?xml version="1.0" encoding="utf-8"?>
+<p:sld xmlns:a="http://schemas.openxmlformats.org/drawingml/2006/main" xmlns:r="http://schemas.openxmlformats.org/officeDocument/2006/relationships" xmlns:p="http://schemas.openxmlformats.org/presentationml/2006/main">
+  <p:cSld>
+    <p:spTree>
+      <p:nvGrpSpPr>
+        <p:cNvPr id="1" name=""/>
+        <p:cNvGrpSpPr/>
+        <p:nvPr/>
+      </p:nvGrpSpPr>
+      <p:grpSpPr>
+        <a:xfrm>
+          <a:off x="0" y="0"/>
+          <a:ext cx="0" cy="0"/>
+          <a:chOff x="0" y="0"/>
+          <a:chExt cx="0" cy="0"/>
+        </a:xfrm>
+      </p:grpSpPr>
+      <p:sp>
+        <p:nvSpPr>
+          <p:cNvPr id="3" name="Title 2"/>
+          <p:cNvSpPr>
+            <a:spLocks noGrp="1"/>
+          </p:cNvSpPr>
+          <p:nvPr>
+            <p:ph type="title"/>
+          </p:nvPr>
+        </p:nvSpPr>
+        <p:spPr/>
+        <p:txBody>
+          <a:bodyPr/>
+          <a:lstStyle/>
+          <a:p>
+            <a:r>
+              <a:rPr lang="nb-NO" dirty="0"/>
+              <a:t>Læring og eksperimentering</a:t>
+            </a:r>
+          </a:p>
+        </p:txBody>
+      </p:sp>
+      <p:pic>
+        <p:nvPicPr>
+          <p:cNvPr id="4" name="Bilde 7">
+            <a:extLst/>
+          </p:cNvPr>
+          <p:cNvPicPr>
+            <a:picLocks noChangeAspect="1"/>
+          </p:cNvPicPr>
+          <p:nvPr/>
+        </p:nvPicPr>
+        <p:blipFill>
+          <a:blip r:embed="rId2"/>
+          <a:stretch>
+            <a:fillRect/>
+          </a:stretch>
+        </p:blipFill>
+        <p:spPr>
+          <a:xfrm>
+            <a:off x="3264683" y="2248778"/>
+            <a:ext cx="6019224" cy="2020588"/>
+          </a:xfrm>
+          <a:prstGeom prst="rect">
+            <a:avLst/>
+          </a:prstGeom>
+        </p:spPr>
+      </p:pic>
+    </p:spTree>
+    <p:extLst>
+      <p:ext uri="{BB962C8B-B14F-4D97-AF65-F5344CB8AC3E}">
+        <p14:creationId xmlns:p14="http://schemas.microsoft.com/office/powerpoint/2010/main" val="3358911343"/>
+      </p:ext>
+    </p:extLst>
+  </p:cSld>
+  <p:clrMapOvr>
+    <a:masterClrMapping/>
+  </p:clrMapOvr>
+</p:sld>
+</file>
+
+<file path=ppt/slides/slide12.xml><?xml version="1.0" encoding="utf-8"?>
+<p:sld xmlns:a="http://schemas.openxmlformats.org/drawingml/2006/main" xmlns:r="http://schemas.openxmlformats.org/officeDocument/2006/relationships" xmlns:p="http://schemas.openxmlformats.org/presentationml/2006/main">
+  <p:cSld>
+    <p:spTree>
+      <p:nvGrpSpPr>
+        <p:cNvPr id="1" name=""/>
+        <p:cNvGrpSpPr/>
+        <p:nvPr/>
+      </p:nvGrpSpPr>
+      <p:grpSpPr>
+        <a:xfrm>
+          <a:off x="0" y="0"/>
+          <a:ext cx="0" cy="0"/>
+          <a:chOff x="0" y="0"/>
+          <a:chExt cx="0" cy="0"/>
+        </a:xfrm>
+      </p:grpSpPr>
+      <p:sp>
+        <p:nvSpPr>
+          <p:cNvPr id="2" name="Content Placeholder 1"/>
+          <p:cNvSpPr>
+            <a:spLocks noGrp="1"/>
+          </p:cNvSpPr>
+          <p:nvPr>
+            <p:ph idx="1"/>
+          </p:nvPr>
+        </p:nvSpPr>
+        <p:spPr/>
+        <p:txBody>
+          <a:bodyPr/>
+          <a:lstStyle/>
+          <a:p>
+            <a:r>
+              <a:rPr lang="nb-NO" dirty="0"/>
+              <a:t>Flyt</a:t>
+            </a:r>
+          </a:p>
+          <a:p>
+            <a:r>
+              <a:rPr lang="nb-NO" dirty="0"/>
+              <a:t>Feedback</a:t>
+            </a:r>
+          </a:p>
+          <a:p>
+            <a:r>
+              <a:rPr lang="nb-NO" dirty="0"/>
+              <a:t>Kontinuerlig læring og eksperimentering</a:t>
+            </a:r>
+          </a:p>
+        </p:txBody>
+      </p:sp>
+      <p:sp>
+        <p:nvSpPr>
+          <p:cNvPr id="3" name="Title 2"/>
+          <p:cNvSpPr>
+            <a:spLocks noGrp="1"/>
+          </p:cNvSpPr>
+          <p:nvPr>
+            <p:ph type="title"/>
+          </p:nvPr>
+        </p:nvSpPr>
+        <p:spPr>
+          <a:xfrm>
+            <a:off x="1234800" y="394942"/>
+            <a:ext cx="10078991" cy="1325563"/>
+          </a:xfrm>
+        </p:spPr>
+        <p:txBody>
+          <a:bodyPr/>
+          <a:lstStyle/>
+          <a:p>
+            <a:r>
+              <a:rPr lang="nb-NO" dirty="0" err="1"/>
+              <a:t>DevOps</a:t>
+            </a:r>
+            <a:r>
+              <a:rPr lang="nb-NO" dirty="0"/>
+              <a:t> er..</a:t>
+            </a:r>
+          </a:p>
+        </p:txBody>
+      </p:sp>
+    </p:spTree>
+    <p:extLst>
+      <p:ext uri="{BB962C8B-B14F-4D97-AF65-F5344CB8AC3E}">
+        <p14:creationId xmlns:p14="http://schemas.microsoft.com/office/powerpoint/2010/main" val="3934765741"/>
+      </p:ext>
+    </p:extLst>
+  </p:cSld>
+  <p:clrMapOvr>
+    <a:masterClrMapping/>
+  </p:clrMapOvr>
+</p:sld>
+</file>
+
+<file path=ppt/slides/slide13.xml><?xml version="1.0" encoding="utf-8"?>
+<p:sld xmlns:a="http://schemas.openxmlformats.org/drawingml/2006/main" xmlns:r="http://schemas.openxmlformats.org/officeDocument/2006/relationships" xmlns:p="http://schemas.openxmlformats.org/presentationml/2006/main">
+  <p:cSld>
+    <p:spTree>
+      <p:nvGrpSpPr>
+        <p:cNvPr id="1" name=""/>
+        <p:cNvGrpSpPr/>
+        <p:nvPr/>
+      </p:nvGrpSpPr>
+      <p:grpSpPr>
+        <a:xfrm>
+          <a:off x="0" y="0"/>
+          <a:ext cx="0" cy="0"/>
+          <a:chOff x="0" y="0"/>
+          <a:chExt cx="0" cy="0"/>
+        </a:xfrm>
+      </p:grpSpPr>
+      <p:sp>
+        <p:nvSpPr>
+          <p:cNvPr id="2" name="Content Placeholder 1"/>
+          <p:cNvSpPr>
+            <a:spLocks noGrp="1"/>
+          </p:cNvSpPr>
+          <p:nvPr>
+            <p:ph idx="1"/>
+          </p:nvPr>
+        </p:nvSpPr>
+        <p:spPr/>
+        <p:txBody>
+          <a:bodyPr/>
+          <a:lstStyle/>
+          <a:p>
+            <a:pPr>
+              <a:lnSpc>
+                <a:spcPct val="250000"/>
+              </a:lnSpc>
+            </a:pPr>
+            <a:r>
+              <a:rPr lang="nb-NO" dirty="0"/>
+              <a:t>Delivery pipeline</a:t>
+            </a:r>
+          </a:p>
+          <a:p>
+            <a:pPr>
+              <a:lnSpc>
+                <a:spcPct val="250000"/>
+              </a:lnSpc>
+            </a:pPr>
+            <a:r>
+              <a:rPr lang="nb-NO" dirty="0" err="1"/>
+              <a:t>Infrastructure</a:t>
+            </a:r>
+            <a:r>
+              <a:rPr lang="nb-NO" dirty="0"/>
+              <a:t> as </a:t>
+            </a:r>
+            <a:r>
+              <a:rPr lang="nb-NO" dirty="0" err="1"/>
+              <a:t>code</a:t>
+            </a:r>
+            <a:r>
+              <a:rPr lang="nb-NO" dirty="0"/>
+              <a:t> </a:t>
+            </a:r>
+          </a:p>
+          <a:p>
+            <a:pPr>
+              <a:lnSpc>
+                <a:spcPct val="250000"/>
+              </a:lnSpc>
+            </a:pPr>
+            <a:r>
+              <a:rPr lang="nb-NO" dirty="0" err="1"/>
+              <a:t>Monitorering</a:t>
+            </a:r>
+            <a:r>
+              <a:rPr lang="nb-NO" dirty="0"/>
+              <a:t>/Telemetri</a:t>
+            </a:r>
+          </a:p>
+        </p:txBody>
+      </p:sp>
+      <p:sp>
+        <p:nvSpPr>
+          <p:cNvPr id="3" name="Title 2"/>
+          <p:cNvSpPr>
+            <a:spLocks noGrp="1"/>
+          </p:cNvSpPr>
+          <p:nvPr>
+            <p:ph type="title"/>
+          </p:nvPr>
+        </p:nvSpPr>
+        <p:spPr/>
+        <p:txBody>
+          <a:bodyPr/>
+          <a:lstStyle/>
+          <a:p>
+            <a:r>
+              <a:rPr lang="nb-NO" dirty="0"/>
+              <a:t>Workshop #2</a:t>
+            </a:r>
+          </a:p>
+        </p:txBody>
+      </p:sp>
+      <p:sp>
+        <p:nvSpPr>
+          <p:cNvPr id="5" name="Right Brace 4"/>
+          <p:cNvSpPr/>
+          <p:nvPr/>
+        </p:nvSpPr>
+        <p:spPr>
+          <a:xfrm>
+            <a:off x="4860236" y="2335695"/>
+            <a:ext cx="675860" cy="1212575"/>
+          </a:xfrm>
+          <a:prstGeom prst="rightBrace">
+            <a:avLst/>
+          </a:prstGeom>
+        </p:spPr>
+        <p:style>
+          <a:lnRef idx="1">
+            <a:schemeClr val="accent1"/>
+          </a:lnRef>
+          <a:fillRef idx="0">
+            <a:schemeClr val="accent1"/>
+          </a:fillRef>
+          <a:effectRef idx="0">
+            <a:schemeClr val="accent1"/>
+          </a:effectRef>
+          <a:fontRef idx="minor">
+            <a:schemeClr val="tx1"/>
+          </a:fontRef>
+        </p:style>
+        <p:txBody>
+          <a:bodyPr rtlCol="0" anchor="ctr"/>
+          <a:lstStyle/>
+          <a:p>
+            <a:pPr algn="ctr"/>
+            <a:endParaRPr lang="nb-NO" dirty="0"/>
+          </a:p>
+        </p:txBody>
+      </p:sp>
+      <p:sp>
+        <p:nvSpPr>
+          <p:cNvPr id="6" name="TextBox 5"/>
+          <p:cNvSpPr txBox="1"/>
+          <p:nvPr/>
+        </p:nvSpPr>
+        <p:spPr>
+          <a:xfrm>
+            <a:off x="5844209" y="2680372"/>
+            <a:ext cx="2557944" cy="523220"/>
+          </a:xfrm>
+          <a:prstGeom prst="rect">
+            <a:avLst/>
+          </a:prstGeom>
+          <a:noFill/>
+        </p:spPr>
+        <p:txBody>
+          <a:bodyPr wrap="none" rtlCol="0">
+            <a:spAutoFit/>
+          </a:bodyPr>
+          <a:lstStyle/>
+          <a:p>
+            <a:r>
+              <a:rPr lang="nb-NO" sz="2800" dirty="0"/>
+              <a:t>Flyt og feedback</a:t>
+            </a:r>
+          </a:p>
+        </p:txBody>
+      </p:sp>
+      <p:sp>
+        <p:nvSpPr>
+          <p:cNvPr id="7" name="Right Brace 6"/>
+          <p:cNvSpPr/>
+          <p:nvPr/>
+        </p:nvSpPr>
+        <p:spPr>
+          <a:xfrm>
+            <a:off x="4541524" y="3871290"/>
+            <a:ext cx="587067" cy="800101"/>
+          </a:xfrm>
+          <a:prstGeom prst="rightBrace">
+            <a:avLst/>
+          </a:prstGeom>
+        </p:spPr>
+        <p:style>
+          <a:lnRef idx="1">
+            <a:schemeClr val="accent1"/>
+          </a:lnRef>
+          <a:fillRef idx="0">
+            <a:schemeClr val="accent1"/>
+          </a:fillRef>
+          <a:effectRef idx="0">
+            <a:schemeClr val="accent1"/>
+          </a:effectRef>
+          <a:fontRef idx="minor">
+            <a:schemeClr val="tx1"/>
+          </a:fontRef>
+        </p:style>
+        <p:txBody>
+          <a:bodyPr rtlCol="0" anchor="ctr"/>
+          <a:lstStyle/>
+          <a:p>
+            <a:pPr algn="ctr"/>
+            <a:endParaRPr lang="nb-NO"/>
+          </a:p>
+        </p:txBody>
+      </p:sp>
+      <p:sp>
+        <p:nvSpPr>
+          <p:cNvPr id="8" name="TextBox 7"/>
+          <p:cNvSpPr txBox="1"/>
+          <p:nvPr/>
+        </p:nvSpPr>
+        <p:spPr>
+          <a:xfrm>
+            <a:off x="5426105" y="4058339"/>
+            <a:ext cx="3449537" cy="523220"/>
+          </a:xfrm>
+          <a:prstGeom prst="rect">
+            <a:avLst/>
+          </a:prstGeom>
+          <a:noFill/>
+        </p:spPr>
+        <p:txBody>
+          <a:bodyPr wrap="square" rtlCol="0">
+            <a:spAutoFit/>
+          </a:bodyPr>
+          <a:lstStyle/>
+          <a:p>
+            <a:r>
+              <a:rPr lang="nb-NO" sz="2800" dirty="0"/>
+              <a:t>Feedback og læring</a:t>
+            </a:r>
+          </a:p>
+        </p:txBody>
+      </p:sp>
+    </p:spTree>
+    <p:extLst>
+      <p:ext uri="{BB962C8B-B14F-4D97-AF65-F5344CB8AC3E}">
+        <p14:creationId xmlns:p14="http://schemas.microsoft.com/office/powerpoint/2010/main" val="3397964344"/>
+      </p:ext>
+    </p:extLst>
+  </p:cSld>
+  <p:clrMapOvr>
+    <a:masterClrMapping/>
+  </p:clrMapOvr>
+</p:sld>
+</file>
+
+<file path=ppt/slides/slide14.xml><?xml version="1.0" encoding="utf-8"?>
+<p:sld xmlns:a="http://schemas.openxmlformats.org/drawingml/2006/main" xmlns:r="http://schemas.openxmlformats.org/officeDocument/2006/relationships" xmlns:p="http://schemas.openxmlformats.org/presentationml/2006/main">
+  <p:cSld>
+    <p:spTree>
+      <p:nvGrpSpPr>
+        <p:cNvPr id="1" name=""/>
+        <p:cNvGrpSpPr/>
+        <p:nvPr/>
+      </p:nvGrpSpPr>
+      <p:grpSpPr>
+        <a:xfrm>
+          <a:off x="0" y="0"/>
+          <a:ext cx="0" cy="0"/>
+          <a:chOff x="0" y="0"/>
+          <a:chExt cx="0" cy="0"/>
+        </a:xfrm>
+      </p:grpSpPr>
+      <p:sp>
+        <p:nvSpPr>
+          <p:cNvPr id="2" name="Content Placeholder 1">
+            <a:extLst>
+              <a:ext uri="{FF2B5EF4-FFF2-40B4-BE49-F238E27FC236}">
+                <a16:creationId xmlns:a16="http://schemas.microsoft.com/office/drawing/2014/main" id="{13200DE8-44F3-48A3-BBC9-63173A6CF0B0}"/>
+              </a:ext>
+            </a:extLst>
+          </p:cNvPr>
+          <p:cNvSpPr>
+            <a:spLocks noGrp="1"/>
+          </p:cNvSpPr>
+          <p:nvPr>
+            <p:ph idx="1"/>
+          </p:nvPr>
+        </p:nvSpPr>
+        <p:spPr/>
+        <p:txBody>
+          <a:bodyPr/>
+          <a:lstStyle/>
+          <a:p>
+            <a:r>
+              <a:rPr lang="nb-NO" dirty="0"/>
+              <a:t>Forutsigbarhet</a:t>
+            </a:r>
+          </a:p>
+          <a:p>
+            <a:endParaRPr lang="nb-NO" dirty="0"/>
+          </a:p>
+          <a:p>
+            <a:r>
+              <a:rPr lang="nb-NO" dirty="0"/>
+              <a:t>Mulighet til å opprette konsistente miljøer</a:t>
+            </a:r>
+          </a:p>
+          <a:p>
+            <a:endParaRPr lang="nb-NO" dirty="0"/>
+          </a:p>
+          <a:p>
+            <a:r>
+              <a:rPr lang="nb-NO" dirty="0"/>
+              <a:t>God dokumentasjon av infrastrukturen.</a:t>
+            </a:r>
+          </a:p>
+          <a:p>
+            <a:endParaRPr lang="nb-NO" dirty="0"/>
+          </a:p>
+          <a:p>
+            <a:endParaRPr lang="nb-NO" dirty="0"/>
+          </a:p>
+          <a:p>
+            <a:endParaRPr lang="nb-NO" dirty="0"/>
+          </a:p>
+        </p:txBody>
+      </p:sp>
+      <p:sp>
+        <p:nvSpPr>
+          <p:cNvPr id="3" name="Title 2">
+            <a:extLst>
+              <a:ext uri="{FF2B5EF4-FFF2-40B4-BE49-F238E27FC236}">
+                <a16:creationId xmlns:a16="http://schemas.microsoft.com/office/drawing/2014/main" id="{1B6B6ACF-EB8D-4510-A862-5848A8884C84}"/>
+              </a:ext>
+            </a:extLst>
+          </p:cNvPr>
+          <p:cNvSpPr>
+            <a:spLocks noGrp="1"/>
+          </p:cNvSpPr>
+          <p:nvPr>
+            <p:ph type="title"/>
+          </p:nvPr>
+        </p:nvSpPr>
+        <p:spPr/>
+        <p:txBody>
+          <a:bodyPr/>
+          <a:lstStyle/>
+          <a:p>
+            <a:r>
+              <a:rPr lang="nb-NO" dirty="0" err="1"/>
+              <a:t>Infrastructure</a:t>
+            </a:r>
+            <a:r>
+              <a:rPr lang="nb-NO" dirty="0"/>
+              <a:t> as Code</a:t>
+            </a:r>
+          </a:p>
+        </p:txBody>
+      </p:sp>
+    </p:spTree>
+    <p:extLst>
+      <p:ext uri="{BB962C8B-B14F-4D97-AF65-F5344CB8AC3E}">
+        <p14:creationId xmlns:p14="http://schemas.microsoft.com/office/powerpoint/2010/main" val="2750714282"/>
+      </p:ext>
+    </p:extLst>
+  </p:cSld>
+  <p:clrMapOvr>
+    <a:masterClrMapping/>
+  </p:clrMapOvr>
+</p:sld>
+</file>
+
+<file path=ppt/slides/slide15.xml><?xml version="1.0" encoding="utf-8"?>
+<p:sld xmlns:a="http://schemas.openxmlformats.org/drawingml/2006/main" xmlns:r="http://schemas.openxmlformats.org/officeDocument/2006/relationships" xmlns:p="http://schemas.openxmlformats.org/presentationml/2006/main">
+  <p:cSld>
+    <p:spTree>
+      <p:nvGrpSpPr>
+        <p:cNvPr id="1" name=""/>
+        <p:cNvGrpSpPr/>
+        <p:nvPr/>
+      </p:nvGrpSpPr>
+      <p:grpSpPr>
+        <a:xfrm>
+          <a:off x="0" y="0"/>
+          <a:ext cx="0" cy="0"/>
+          <a:chOff x="0" y="0"/>
+          <a:chExt cx="0" cy="0"/>
+        </a:xfrm>
+      </p:grpSpPr>
+      <p:sp>
+        <p:nvSpPr>
+          <p:cNvPr id="2" name="Content Placeholder 1">
+            <a:extLst>
+              <a:ext uri="{FF2B5EF4-FFF2-40B4-BE49-F238E27FC236}">
+                <a16:creationId xmlns:a16="http://schemas.microsoft.com/office/drawing/2014/main" id="{31783B1B-5095-4966-B826-4F541467D784}"/>
+              </a:ext>
+            </a:extLst>
+          </p:cNvPr>
+          <p:cNvSpPr>
+            <a:spLocks noGrp="1"/>
+          </p:cNvSpPr>
+          <p:nvPr>
+            <p:ph idx="1"/>
+          </p:nvPr>
+        </p:nvSpPr>
+        <p:spPr>
+          <a:xfrm>
+            <a:off x="1193237" y="1841211"/>
+            <a:ext cx="8382613" cy="4351338"/>
+          </a:xfrm>
+        </p:spPr>
+        <p:txBody>
+          <a:bodyPr/>
+          <a:lstStyle/>
+          <a:p>
+            <a:r>
+              <a:rPr lang="nb-NO" dirty="0"/>
+              <a:t>Deklarativ beskrivelse av infrastruktur i Azure</a:t>
+            </a:r>
+          </a:p>
+          <a:p>
+            <a:pPr marL="0" indent="0">
+              <a:buNone/>
+            </a:pPr>
+            <a:endParaRPr lang="nb-NO" dirty="0"/>
+          </a:p>
+          <a:p>
+            <a:r>
+              <a:rPr lang="nb-NO" dirty="0"/>
+              <a:t>JSON-struktur</a:t>
+            </a:r>
+          </a:p>
+          <a:p>
+            <a:endParaRPr lang="nb-NO" dirty="0"/>
+          </a:p>
+          <a:p>
+            <a:r>
+              <a:rPr lang="nb-NO" dirty="0"/>
+              <a:t>Filer</a:t>
+            </a:r>
+          </a:p>
+          <a:p>
+            <a:pPr lvl="1"/>
+            <a:r>
+              <a:rPr lang="nb-NO" dirty="0" err="1">
+                <a:latin typeface="Courier New" panose="02070309020205020404" pitchFamily="49" charset="0"/>
+                <a:cs typeface="Courier New" panose="02070309020205020404" pitchFamily="49" charset="0"/>
+              </a:rPr>
+              <a:t>azuredeploy.json</a:t>
+            </a:r>
+            <a:endParaRPr lang="nb-NO" dirty="0">
+              <a:latin typeface="Courier New" panose="02070309020205020404" pitchFamily="49" charset="0"/>
+              <a:cs typeface="Courier New" panose="02070309020205020404" pitchFamily="49" charset="0"/>
+            </a:endParaRPr>
+          </a:p>
+          <a:p>
+            <a:pPr lvl="1"/>
+            <a:r>
+              <a:rPr lang="nb-NO" dirty="0" err="1">
+                <a:latin typeface="Courier New" panose="02070309020205020404" pitchFamily="49" charset="0"/>
+                <a:cs typeface="Courier New" panose="02070309020205020404" pitchFamily="49" charset="0"/>
+              </a:rPr>
+              <a:t>azuredeploy.parameters.json</a:t>
+            </a:r>
+            <a:endParaRPr lang="nb-NO" dirty="0"/>
+          </a:p>
+          <a:p>
+            <a:pPr lvl="1"/>
+            <a:endParaRPr lang="nb-NO" dirty="0"/>
+          </a:p>
+          <a:p>
+            <a:pPr lvl="1"/>
+            <a:endParaRPr lang="nb-NO" dirty="0"/>
+          </a:p>
+          <a:p>
+            <a:r>
+              <a:rPr lang="nb-NO" dirty="0"/>
+              <a:t>To moduser:</a:t>
+            </a:r>
+          </a:p>
+          <a:p>
+            <a:pPr lvl="1"/>
+            <a:r>
+              <a:rPr lang="nb-NO" dirty="0"/>
+              <a:t>Inkrementell – oppretter kun det som er endret</a:t>
+            </a:r>
+          </a:p>
+          <a:p>
+            <a:pPr lvl="1"/>
+            <a:r>
+              <a:rPr lang="nb-NO" dirty="0"/>
+              <a:t>Komplett – sletter alt og oppretter alt på nytt</a:t>
+            </a:r>
+          </a:p>
+        </p:txBody>
+      </p:sp>
+      <p:sp>
+        <p:nvSpPr>
+          <p:cNvPr id="3" name="Title 2">
+            <a:extLst>
+              <a:ext uri="{FF2B5EF4-FFF2-40B4-BE49-F238E27FC236}">
+                <a16:creationId xmlns:a16="http://schemas.microsoft.com/office/drawing/2014/main" id="{3D15BAEB-1545-45BA-9496-F3F45C1F50EB}"/>
+              </a:ext>
+            </a:extLst>
+          </p:cNvPr>
+          <p:cNvSpPr>
+            <a:spLocks noGrp="1"/>
+          </p:cNvSpPr>
+          <p:nvPr>
+            <p:ph type="title"/>
+          </p:nvPr>
+        </p:nvSpPr>
+        <p:spPr/>
+        <p:txBody>
+          <a:bodyPr/>
+          <a:lstStyle/>
+          <a:p>
+            <a:r>
+              <a:rPr lang="nb-NO" dirty="0"/>
+              <a:t>ARM-</a:t>
+            </a:r>
+            <a:r>
+              <a:rPr lang="nb-NO" dirty="0" err="1"/>
+              <a:t>templates</a:t>
+            </a:r>
+            <a:endParaRPr lang="nb-NO" dirty="0"/>
+          </a:p>
+        </p:txBody>
+      </p:sp>
+    </p:spTree>
+    <p:extLst>
+      <p:ext uri="{BB962C8B-B14F-4D97-AF65-F5344CB8AC3E}">
+        <p14:creationId xmlns:p14="http://schemas.microsoft.com/office/powerpoint/2010/main" val="2548185199"/>
+      </p:ext>
+    </p:extLst>
+  </p:cSld>
+  <p:clrMapOvr>
+    <a:masterClrMapping/>
+  </p:clrMapOvr>
+</p:sld>
+</file>
+
+<file path=ppt/slides/slide16.xml><?xml version="1.0" encoding="utf-8"?>
+<p:sld xmlns:a="http://schemas.openxmlformats.org/drawingml/2006/main" xmlns:r="http://schemas.openxmlformats.org/officeDocument/2006/relationships" xmlns:p="http://schemas.openxmlformats.org/presentationml/2006/main">
+  <p:cSld>
+    <p:spTree>
+      <p:nvGrpSpPr>
+        <p:cNvPr id="1" name=""/>
+        <p:cNvGrpSpPr/>
+        <p:nvPr/>
+      </p:nvGrpSpPr>
+      <p:grpSpPr>
+        <a:xfrm>
+          <a:off x="0" y="0"/>
+          <a:ext cx="0" cy="0"/>
+          <a:chOff x="0" y="0"/>
+          <a:chExt cx="0" cy="0"/>
+        </a:xfrm>
+      </p:grpSpPr>
+      <p:sp>
+        <p:nvSpPr>
+          <p:cNvPr id="2" name="Content Placeholder 1">
+            <a:extLst>
+              <a:ext uri="{FF2B5EF4-FFF2-40B4-BE49-F238E27FC236}">
+                <a16:creationId xmlns:a16="http://schemas.microsoft.com/office/drawing/2014/main" id="{787ACE07-237C-4EEF-A335-325E5DEAFB8A}"/>
+              </a:ext>
+            </a:extLst>
+          </p:cNvPr>
+          <p:cNvSpPr>
+            <a:spLocks noGrp="1"/>
+          </p:cNvSpPr>
+          <p:nvPr>
+            <p:ph idx="1"/>
+          </p:nvPr>
+        </p:nvSpPr>
+        <p:spPr/>
+        <p:txBody>
+          <a:bodyPr/>
+          <a:lstStyle/>
+          <a:p>
+            <a:pPr marL="0" indent="0">
+              <a:buNone/>
+            </a:pPr>
+            <a:r>
+              <a:rPr lang="nb-NO" sz="1600" dirty="0">
+                <a:latin typeface="Courier New" panose="02070309020205020404" pitchFamily="49" charset="0"/>
+                <a:cs typeface="Courier New" panose="02070309020205020404" pitchFamily="49" charset="0"/>
+              </a:rPr>
+              <a:t>{ </a:t>
+            </a:r>
+          </a:p>
+          <a:p>
+            <a:pPr marL="0" indent="0">
+              <a:buNone/>
+            </a:pPr>
+            <a:r>
+              <a:rPr lang="nb-NO" sz="1600" dirty="0">
+                <a:latin typeface="Courier New" panose="02070309020205020404" pitchFamily="49" charset="0"/>
+                <a:cs typeface="Courier New" panose="02070309020205020404" pitchFamily="49" charset="0"/>
+              </a:rPr>
+              <a:t>	"$</a:t>
+            </a:r>
+            <a:r>
+              <a:rPr lang="nb-NO" sz="1600" dirty="0" err="1">
+                <a:latin typeface="Courier New" panose="02070309020205020404" pitchFamily="49" charset="0"/>
+                <a:cs typeface="Courier New" panose="02070309020205020404" pitchFamily="49" charset="0"/>
+              </a:rPr>
+              <a:t>schema</a:t>
+            </a:r>
+            <a:r>
+              <a:rPr lang="nb-NO" sz="1600" dirty="0">
+                <a:latin typeface="Courier New" panose="02070309020205020404" pitchFamily="49" charset="0"/>
+                <a:cs typeface="Courier New" panose="02070309020205020404" pitchFamily="49" charset="0"/>
+              </a:rPr>
+              <a:t>": "", </a:t>
+            </a:r>
+          </a:p>
+          <a:p>
+            <a:pPr marL="0" indent="0">
+              <a:buNone/>
+            </a:pPr>
+            <a:r>
+              <a:rPr lang="nb-NO" sz="1600" dirty="0">
+                <a:latin typeface="Courier New" panose="02070309020205020404" pitchFamily="49" charset="0"/>
+                <a:cs typeface="Courier New" panose="02070309020205020404" pitchFamily="49" charset="0"/>
+              </a:rPr>
+              <a:t>	"contentVersion": "", </a:t>
+            </a:r>
+          </a:p>
+          <a:p>
+            <a:pPr marL="0" indent="0">
+              <a:buNone/>
+            </a:pPr>
+            <a:r>
+              <a:rPr lang="nb-NO" sz="1600" dirty="0">
+                <a:latin typeface="Courier New" panose="02070309020205020404" pitchFamily="49" charset="0"/>
+                <a:cs typeface="Courier New" panose="02070309020205020404" pitchFamily="49" charset="0"/>
+              </a:rPr>
+              <a:t>	"parameters": { }, </a:t>
+            </a:r>
+          </a:p>
+          <a:p>
+            <a:pPr marL="0" indent="0">
+              <a:buNone/>
+            </a:pPr>
+            <a:r>
+              <a:rPr lang="nb-NO" sz="1600" dirty="0">
+                <a:latin typeface="Courier New" panose="02070309020205020404" pitchFamily="49" charset="0"/>
+                <a:cs typeface="Courier New" panose="02070309020205020404" pitchFamily="49" charset="0"/>
+              </a:rPr>
+              <a:t>	"variables": { }, </a:t>
+            </a:r>
+          </a:p>
+          <a:p>
+            <a:pPr marL="0" indent="0">
+              <a:buNone/>
+            </a:pPr>
+            <a:r>
+              <a:rPr lang="nb-NO" sz="1600" dirty="0">
+                <a:latin typeface="Courier New" panose="02070309020205020404" pitchFamily="49" charset="0"/>
+                <a:cs typeface="Courier New" panose="02070309020205020404" pitchFamily="49" charset="0"/>
+              </a:rPr>
+              <a:t>	"functions": [ ], </a:t>
+            </a:r>
+          </a:p>
+          <a:p>
+            <a:pPr marL="0" indent="0">
+              <a:buNone/>
+            </a:pPr>
+            <a:r>
+              <a:rPr lang="nb-NO" sz="1600" dirty="0">
+                <a:latin typeface="Courier New" panose="02070309020205020404" pitchFamily="49" charset="0"/>
+                <a:cs typeface="Courier New" panose="02070309020205020404" pitchFamily="49" charset="0"/>
+              </a:rPr>
+              <a:t>	"resources": [ ], </a:t>
+            </a:r>
+          </a:p>
+          <a:p>
+            <a:pPr marL="0" indent="0">
+              <a:buNone/>
+            </a:pPr>
+            <a:r>
+              <a:rPr lang="nb-NO" sz="1600" dirty="0">
+                <a:latin typeface="Courier New" panose="02070309020205020404" pitchFamily="49" charset="0"/>
+                <a:cs typeface="Courier New" panose="02070309020205020404" pitchFamily="49" charset="0"/>
+              </a:rPr>
+              <a:t>	"outputs": { } </a:t>
+            </a:r>
+          </a:p>
+          <a:p>
+            <a:pPr marL="0" indent="0">
+              <a:buNone/>
+            </a:pPr>
+            <a:r>
+              <a:rPr lang="nb-NO" sz="1600" dirty="0">
+                <a:latin typeface="Courier New" panose="02070309020205020404" pitchFamily="49" charset="0"/>
+                <a:cs typeface="Courier New" panose="02070309020205020404" pitchFamily="49" charset="0"/>
+              </a:rPr>
+              <a:t>}</a:t>
+            </a:r>
+          </a:p>
+          <a:p>
+            <a:pPr marL="0" indent="0">
+              <a:buNone/>
+            </a:pPr>
+            <a:endParaRPr lang="nb-NO" sz="1600" dirty="0">
+              <a:latin typeface="Courier New" panose="02070309020205020404" pitchFamily="49" charset="0"/>
+              <a:cs typeface="Courier New" panose="02070309020205020404" pitchFamily="49" charset="0"/>
+            </a:endParaRPr>
+          </a:p>
+          <a:p>
+            <a:r>
+              <a:rPr lang="nb-NO" sz="2000" dirty="0">
+                <a:cs typeface="Courier New" panose="02070309020205020404" pitchFamily="49" charset="0"/>
+                <a:hlinkClick r:id="rId2"/>
+              </a:rPr>
+              <a:t>https://docs.microsoft.com/en-us/azure/azure-resource-manager/resource-group-authoring-templates</a:t>
+            </a:r>
+            <a:endParaRPr lang="nb-NO" sz="2000" dirty="0">
+              <a:cs typeface="Courier New" panose="02070309020205020404" pitchFamily="49" charset="0"/>
+            </a:endParaRPr>
+          </a:p>
+          <a:p>
+            <a:endParaRPr lang="nb-NO" sz="2000" dirty="0">
+              <a:cs typeface="Courier New" panose="02070309020205020404" pitchFamily="49" charset="0"/>
+            </a:endParaRPr>
+          </a:p>
+        </p:txBody>
+      </p:sp>
+      <p:sp>
+        <p:nvSpPr>
+          <p:cNvPr id="3" name="Title 2">
+            <a:extLst>
+              <a:ext uri="{FF2B5EF4-FFF2-40B4-BE49-F238E27FC236}">
+                <a16:creationId xmlns:a16="http://schemas.microsoft.com/office/drawing/2014/main" id="{CCF727E1-176E-4A6B-8896-92949B40C349}"/>
+              </a:ext>
+            </a:extLst>
+          </p:cNvPr>
+          <p:cNvSpPr>
+            <a:spLocks noGrp="1"/>
+          </p:cNvSpPr>
+          <p:nvPr>
+            <p:ph type="title"/>
+          </p:nvPr>
+        </p:nvSpPr>
+        <p:spPr/>
+        <p:txBody>
+          <a:bodyPr/>
+          <a:lstStyle/>
+          <a:p>
+            <a:r>
+              <a:rPr lang="nb-NO" dirty="0"/>
+              <a:t>ARM-</a:t>
+            </a:r>
+            <a:r>
+              <a:rPr lang="nb-NO" dirty="0" err="1"/>
+              <a:t>templates</a:t>
+            </a:r>
+            <a:r>
+              <a:rPr lang="nb-NO" dirty="0"/>
+              <a:t> struktur </a:t>
+            </a:r>
+          </a:p>
+        </p:txBody>
+      </p:sp>
+    </p:spTree>
+    <p:extLst>
+      <p:ext uri="{BB962C8B-B14F-4D97-AF65-F5344CB8AC3E}">
+        <p14:creationId xmlns:p14="http://schemas.microsoft.com/office/powerpoint/2010/main" val="1060301785"/>
+      </p:ext>
+    </p:extLst>
+  </p:cSld>
+  <p:clrMapOvr>
+    <a:masterClrMapping/>
+  </p:clrMapOvr>
+</p:sld>
+</file>
+
+<file path=ppt/slides/slide17.xml><?xml version="1.0" encoding="utf-8"?>
+<p:sld xmlns:a="http://schemas.openxmlformats.org/drawingml/2006/main" xmlns:r="http://schemas.openxmlformats.org/officeDocument/2006/relationships" xmlns:p="http://schemas.openxmlformats.org/presentationml/2006/main">
+  <p:cSld>
+    <p:spTree>
+      <p:nvGrpSpPr>
+        <p:cNvPr id="1" name=""/>
+        <p:cNvGrpSpPr/>
+        <p:nvPr/>
+      </p:nvGrpSpPr>
+      <p:grpSpPr>
+        <a:xfrm>
+          <a:off x="0" y="0"/>
+          <a:ext cx="0" cy="0"/>
+          <a:chOff x="0" y="0"/>
+          <a:chExt cx="0" cy="0"/>
+        </a:xfrm>
+      </p:grpSpPr>
+      <p:sp>
+        <p:nvSpPr>
+          <p:cNvPr id="2" name="Content Placeholder 1">
+            <a:extLst>
+              <a:ext uri="{FF2B5EF4-FFF2-40B4-BE49-F238E27FC236}">
+                <a16:creationId xmlns:a16="http://schemas.microsoft.com/office/drawing/2014/main" id="{9ACC7AD5-9759-4794-8447-7D74D11ADA52}"/>
+              </a:ext>
+            </a:extLst>
+          </p:cNvPr>
+          <p:cNvSpPr>
+            <a:spLocks noGrp="1"/>
+          </p:cNvSpPr>
+          <p:nvPr>
+            <p:ph idx="1"/>
+          </p:nvPr>
+        </p:nvSpPr>
+        <p:spPr/>
+        <p:txBody>
+          <a:bodyPr/>
+          <a:lstStyle/>
+          <a:p>
+            <a:r>
+              <a:rPr lang="nb-NO" dirty="0">
+                <a:hlinkClick r:id="rId2"/>
+              </a:rPr>
+              <a:t>https://github.com/Azure/azure-quickstart-templates</a:t>
+            </a:r>
+            <a:endParaRPr lang="nb-NO" dirty="0"/>
+          </a:p>
+          <a:p>
+            <a:endParaRPr lang="nb-NO" dirty="0"/>
+          </a:p>
+          <a:p>
+            <a:endParaRPr lang="nb-NO" dirty="0"/>
+          </a:p>
+        </p:txBody>
+      </p:sp>
+      <p:sp>
+        <p:nvSpPr>
+          <p:cNvPr id="3" name="Title 2">
+            <a:extLst>
+              <a:ext uri="{FF2B5EF4-FFF2-40B4-BE49-F238E27FC236}">
+                <a16:creationId xmlns:a16="http://schemas.microsoft.com/office/drawing/2014/main" id="{6DF109DB-F753-405D-BE67-C0E56871CE35}"/>
+              </a:ext>
+            </a:extLst>
+          </p:cNvPr>
+          <p:cNvSpPr>
+            <a:spLocks noGrp="1"/>
+          </p:cNvSpPr>
+          <p:nvPr>
+            <p:ph type="title"/>
+          </p:nvPr>
+        </p:nvSpPr>
+        <p:spPr/>
+        <p:txBody>
+          <a:bodyPr/>
+          <a:lstStyle/>
+          <a:p>
+            <a:r>
+              <a:rPr lang="nb-NO" dirty="0"/>
+              <a:t>ARM-</a:t>
+            </a:r>
+            <a:r>
+              <a:rPr lang="nb-NO" dirty="0" err="1"/>
+              <a:t>templates</a:t>
+            </a:r>
+            <a:r>
+              <a:rPr lang="nb-NO" dirty="0"/>
+              <a:t> ressurser</a:t>
+            </a:r>
+          </a:p>
+        </p:txBody>
+      </p:sp>
+    </p:spTree>
+    <p:extLst>
+      <p:ext uri="{BB962C8B-B14F-4D97-AF65-F5344CB8AC3E}">
+        <p14:creationId xmlns:p14="http://schemas.microsoft.com/office/powerpoint/2010/main" val="72647585"/>
+      </p:ext>
+    </p:extLst>
+  </p:cSld>
+  <p:clrMapOvr>
+    <a:masterClrMapping/>
+  </p:clrMapOvr>
+</p:sld>
+</file>
+
 <file path=ppt/slides/slide2.xml><?xml version="1.0" encoding="utf-8"?>
 <p:sld xmlns:a="http://schemas.openxmlformats.org/drawingml/2006/main" xmlns:r="http://schemas.openxmlformats.org/officeDocument/2006/relationships" xmlns:p="http://schemas.openxmlformats.org/presentationml/2006/main">
   <p:cSld>
@@ -10795,18 +12664,12 @@
       </p:grpSpPr>
       <p:sp>
         <p:nvSpPr>
-          <p:cNvPr id="2" name="Content Placeholder 1">
-            <a:extLst>
-              <a:ext uri="{FF2B5EF4-FFF2-40B4-BE49-F238E27FC236}">
-                <a16:creationId xmlns:a16="http://schemas.microsoft.com/office/drawing/2014/main" id="{13200DE8-44F3-48A3-BBC9-63173A6CF0B0}"/>
-              </a:ext>
-            </a:extLst>
-          </p:cNvPr>
+          <p:cNvPr id="3" name="Title 2"/>
           <p:cNvSpPr>
             <a:spLocks noGrp="1"/>
           </p:cNvSpPr>
           <p:nvPr>
-            <p:ph idx="1"/>
+            <p:ph type="title"/>
           </p:nvPr>
         </p:nvSpPr>
         <p:spPr/>
@@ -10816,66 +12679,15 @@
           <a:p>
             <a:r>
               <a:rPr lang="nb-NO" dirty="0"/>
-              <a:t>Forutsigbarhet</a:t>
-            </a:r>
-          </a:p>
-          <a:p>
-            <a:endParaRPr lang="nb-NO" dirty="0"/>
-          </a:p>
-          <a:p>
+              <a:t>Hvorfor lager vi </a:t>
+            </a:r>
+            <a:r>
+              <a:rPr lang="nb-NO" dirty="0" err="1"/>
+              <a:t>software</a:t>
+            </a:r>
             <a:r>
               <a:rPr lang="nb-NO" dirty="0"/>
-              <a:t>Mulighet til å opprette konsistente miljøer</a:t>
-            </a:r>
-          </a:p>
-          <a:p>
-            <a:endParaRPr lang="nb-NO" dirty="0"/>
-          </a:p>
-          <a:p>
-            <a:r>
-              <a:rPr lang="nb-NO" dirty="0"/>
-              <a:t>God dokumentasjon av infrastrukturen.</a:t>
-            </a:r>
-          </a:p>
-          <a:p>
-            <a:endParaRPr lang="nb-NO" dirty="0"/>
-          </a:p>
-          <a:p>
-            <a:endParaRPr lang="nb-NO" dirty="0"/>
-          </a:p>
-          <a:p>
-            <a:endParaRPr lang="nb-NO" dirty="0"/>
-          </a:p>
-        </p:txBody>
-      </p:sp>
-      <p:sp>
-        <p:nvSpPr>
-          <p:cNvPr id="3" name="Title 2">
-            <a:extLst>
-              <a:ext uri="{FF2B5EF4-FFF2-40B4-BE49-F238E27FC236}">
-                <a16:creationId xmlns:a16="http://schemas.microsoft.com/office/drawing/2014/main" id="{1B6B6ACF-EB8D-4510-A862-5848A8884C84}"/>
-              </a:ext>
-            </a:extLst>
-          </p:cNvPr>
-          <p:cNvSpPr>
-            <a:spLocks noGrp="1"/>
-          </p:cNvSpPr>
-          <p:nvPr>
-            <p:ph type="title"/>
-          </p:nvPr>
-        </p:nvSpPr>
-        <p:spPr/>
-        <p:txBody>
-          <a:bodyPr/>
-          <a:lstStyle/>
-          <a:p>
-            <a:r>
-              <a:rPr lang="nb-NO" dirty="0" err="1"/>
-              <a:t>Infrastructure</a:t>
-            </a:r>
-            <a:r>
-              <a:rPr lang="nb-NO" dirty="0"/>
-              <a:t> as Code</a:t>
+              <a:t>?</a:t>
             </a:r>
           </a:p>
         </p:txBody>
@@ -10883,7 +12695,7 @@
     </p:spTree>
     <p:extLst>
       <p:ext uri="{BB962C8B-B14F-4D97-AF65-F5344CB8AC3E}">
-        <p14:creationId xmlns:p14="http://schemas.microsoft.com/office/powerpoint/2010/main" val="2750714282"/>
+        <p14:creationId xmlns:p14="http://schemas.microsoft.com/office/powerpoint/2010/main" val="791662924"/>
       </p:ext>
     </p:extLst>
   </p:cSld>
@@ -10912,148 +12724,30 @@
       </p:grpSpPr>
       <p:sp>
         <p:nvSpPr>
-          <p:cNvPr id="2" name="Content Placeholder 1">
-            <a:extLst>
-              <a:ext uri="{FF2B5EF4-FFF2-40B4-BE49-F238E27FC236}">
-                <a16:creationId xmlns:a16="http://schemas.microsoft.com/office/drawing/2014/main" id="{31783B1B-5095-4966-B826-4F541467D784}"/>
-              </a:ext>
-            </a:extLst>
-          </p:cNvPr>
+          <p:cNvPr id="3" name="Title 2"/>
           <p:cNvSpPr>
             <a:spLocks noGrp="1"/>
           </p:cNvSpPr>
           <p:nvPr>
-            <p:ph idx="1"/>
-          </p:nvPr>
-        </p:nvSpPr>
-        <p:spPr>
-          <a:xfrm>
-            <a:off x="1193237" y="1841211"/>
-            <a:ext cx="8382613" cy="4351338"/>
-          </a:xfrm>
-        </p:spPr>
+            <p:ph type="title"/>
+          </p:nvPr>
+        </p:nvSpPr>
+        <p:spPr/>
         <p:txBody>
           <a:bodyPr/>
           <a:lstStyle/>
           <a:p>
             <a:r>
               <a:rPr lang="nb-NO" dirty="0"/>
-              <a:t>Deklarativ beskrivelse av infrastruktur i Azure</a:t>
-            </a:r>
-          </a:p>
-          <a:p>
-            <a:pPr marL="0" indent="0">
-              <a:buNone/>
-            </a:pPr>
-            <a:endParaRPr lang="nb-NO" dirty="0"/>
-          </a:p>
-          <a:p>
-            <a:r>
-              <a:rPr lang="nb-NO" dirty="0"/>
-              <a:t>JSON-struktur</a:t>
-            </a:r>
-          </a:p>
-          <a:p>
-            <a:endParaRPr lang="nb-NO" dirty="0"/>
-          </a:p>
-          <a:p>
-            <a:r>
-              <a:rPr lang="nb-NO" dirty="0"/>
-              <a:t>Filer</a:t>
-            </a:r>
-          </a:p>
-          <a:p>
-            <a:pPr lvl="1"/>
-            <a:r>
-              <a:rPr lang="nb-NO" dirty="0" err="1">
-                <a:latin typeface="Courier New" panose="02070309020205020404" pitchFamily="49" charset="0"/>
-                <a:cs typeface="Courier New" panose="02070309020205020404" pitchFamily="49" charset="0"/>
-              </a:rPr>
-              <a:t>azuredeploy.json</a:t>
-            </a:r>
-            <a:endParaRPr lang="nb-NO" dirty="0">
-              <a:latin typeface="Courier New" panose="02070309020205020404" pitchFamily="49" charset="0"/>
-              <a:cs typeface="Courier New" panose="02070309020205020404" pitchFamily="49" charset="0"/>
-            </a:endParaRPr>
-          </a:p>
-          <a:p>
-            <a:pPr lvl="1"/>
-            <a:r>
-              <a:rPr lang="nb-NO" dirty="0" err="1">
-                <a:latin typeface="Courier New" panose="02070309020205020404" pitchFamily="49" charset="0"/>
-                <a:cs typeface="Courier New" panose="02070309020205020404" pitchFamily="49" charset="0"/>
-              </a:rPr>
-              <a:t>azuredeploy.parameters.json</a:t>
-            </a:r>
-            <a:endParaRPr lang="nb-NO" dirty="0"/>
-          </a:p>
-          <a:p>
-            <a:pPr lvl="1"/>
-            <a:endParaRPr lang="nb-NO" dirty="0"/>
-          </a:p>
-          <a:p>
-            <a:pPr lvl="1"/>
-            <a:endParaRPr lang="nb-NO" dirty="0"/>
-          </a:p>
-          <a:p>
-            <a:r>
-              <a:rPr lang="nb-NO" dirty="0"/>
-              <a:t>To moduser:</a:t>
-            </a:r>
-          </a:p>
-          <a:p>
-            <a:pPr lvl="1"/>
-            <a:r>
-              <a:rPr lang="nb-NO" dirty="0"/>
-              <a:t>Inkrementell – oppretter kun det som er endret</a:t>
-            </a:r>
-          </a:p>
-          <a:p>
-            <a:pPr lvl="1"/>
-            <a:r>
-              <a:rPr lang="nb-NO" dirty="0"/>
-              <a:t>Komplett – sletter alt og oppretter alt på nytt</a:t>
-            </a:r>
-          </a:p>
-        </p:txBody>
-      </p:sp>
-      <p:sp>
-        <p:nvSpPr>
-          <p:cNvPr id="3" name="Title 2">
-            <a:extLst>
-              <a:ext uri="{FF2B5EF4-FFF2-40B4-BE49-F238E27FC236}">
-                <a16:creationId xmlns:a16="http://schemas.microsoft.com/office/drawing/2014/main" id="{3D15BAEB-1545-45BA-9496-F3F45C1F50EB}"/>
-              </a:ext>
-            </a:extLst>
-          </p:cNvPr>
-          <p:cNvSpPr>
-            <a:spLocks noGrp="1"/>
-          </p:cNvSpPr>
-          <p:nvPr>
-            <p:ph type="title"/>
-          </p:nvPr>
-        </p:nvSpPr>
-        <p:spPr/>
-        <p:txBody>
-          <a:bodyPr/>
-          <a:lstStyle/>
-          <a:p>
-            <a:r>
-              <a:rPr lang="nb-NO" dirty="0"/>
-              <a:t>ARM-</a:t>
-            </a:r>
-            <a:r>
-              <a:rPr lang="nb-NO" dirty="0" err="1"/>
-              <a:t>templates</a:t>
-            </a:r>
-            <a:endParaRPr lang="nb-NO" dirty="0"/>
+              <a:t>Skape verdi</a:t>
+            </a:r>
           </a:p>
         </p:txBody>
       </p:sp>
     </p:spTree>
     <p:extLst>
       <p:ext uri="{BB962C8B-B14F-4D97-AF65-F5344CB8AC3E}">
-        <p14:creationId xmlns:p14="http://schemas.microsoft.com/office/powerpoint/2010/main" val="2548185199"/>
+        <p14:creationId xmlns:p14="http://schemas.microsoft.com/office/powerpoint/2010/main" val="1119716667"/>
       </p:ext>
     </p:extLst>
   </p:cSld>
@@ -11082,214 +12776,138 @@
       </p:grpSpPr>
       <p:sp>
         <p:nvSpPr>
-          <p:cNvPr id="2" name="Content Placeholder 1">
+          <p:cNvPr id="3" name="Title 2"/>
+          <p:cNvSpPr>
+            <a:spLocks noGrp="1"/>
+          </p:cNvSpPr>
+          <p:nvPr>
+            <p:ph type="title"/>
+          </p:nvPr>
+        </p:nvSpPr>
+        <p:spPr/>
+        <p:txBody>
+          <a:bodyPr/>
+          <a:lstStyle/>
+          <a:p>
+            <a:r>
+              <a:rPr lang="nb-NO" dirty="0"/>
+              <a:t>Verdi skapes først når kode er i </a:t>
+            </a:r>
+            <a:r>
+              <a:rPr lang="nb-NO" dirty="0" err="1"/>
+              <a:t>prod</a:t>
+            </a:r>
+            <a:endParaRPr lang="nb-NO" dirty="0"/>
+          </a:p>
+        </p:txBody>
+      </p:sp>
+      <p:pic>
+        <p:nvPicPr>
+          <p:cNvPr id="2050" name="Picture 2" descr="Bilderesultat for kanban"/>
+          <p:cNvPicPr>
+            <a:picLocks noChangeAspect="1" noChangeArrowheads="1"/>
+          </p:cNvPicPr>
+          <p:nvPr/>
+        </p:nvPicPr>
+        <p:blipFill>
+          <a:blip r:embed="rId3">
             <a:extLst>
-              <a:ext uri="{FF2B5EF4-FFF2-40B4-BE49-F238E27FC236}">
-                <a16:creationId xmlns:a16="http://schemas.microsoft.com/office/drawing/2014/main" id="{787ACE07-237C-4EEF-A335-325E5DEAFB8A}"/>
+              <a:ext uri="{28A0092B-C50C-407E-A947-70E740481C1C}">
+                <a14:useLocalDpi xmlns:a14="http://schemas.microsoft.com/office/drawing/2010/main" val="0"/>
               </a:ext>
             </a:extLst>
-          </p:cNvPr>
-          <p:cNvSpPr>
-            <a:spLocks noGrp="1"/>
-          </p:cNvSpPr>
-          <p:nvPr>
-            <p:ph idx="1"/>
-          </p:nvPr>
-        </p:nvSpPr>
-        <p:spPr/>
-        <p:txBody>
-          <a:bodyPr/>
+          </a:blip>
+          <a:srcRect/>
+          <a:stretch>
+            <a:fillRect/>
+          </a:stretch>
+        </p:blipFill>
+        <p:spPr bwMode="auto">
+          <a:xfrm>
+            <a:off x="1234800" y="3233525"/>
+            <a:ext cx="7318511" cy="3525083"/>
+          </a:xfrm>
+          <a:prstGeom prst="rect">
+            <a:avLst/>
+          </a:prstGeom>
+          <a:noFill/>
+          <a:extLst>
+            <a:ext uri="{909E8E84-426E-40DD-AFC4-6F175D3DCCD1}">
+              <a14:hiddenFill xmlns:a14="http://schemas.microsoft.com/office/drawing/2010/main">
+                <a:solidFill>
+                  <a:srgbClr val="FFFFFF"/>
+                </a:solidFill>
+              </a14:hiddenFill>
+            </a:ext>
+          </a:extLst>
+        </p:spPr>
+      </p:pic>
+      <p:sp>
+        <p:nvSpPr>
+          <p:cNvPr id="6" name="TextBox 5"/>
+          <p:cNvSpPr txBox="1"/>
+          <p:nvPr/>
+        </p:nvSpPr>
+        <p:spPr>
+          <a:xfrm>
+            <a:off x="9915939" y="2295939"/>
+            <a:ext cx="2276061" cy="769441"/>
+          </a:xfrm>
+          <a:prstGeom prst="rect">
+            <a:avLst/>
+          </a:prstGeom>
+          <a:noFill/>
+        </p:spPr>
+        <p:txBody>
+          <a:bodyPr wrap="square" rtlCol="0">
+            <a:spAutoFit/>
+          </a:bodyPr>
           <a:lstStyle/>
           <a:p>
-            <a:pPr marL="0" indent="0">
-              <a:buNone/>
-            </a:pPr>
-            <a:r>
-              <a:rPr lang="nb-NO" sz="1600" dirty="0">
-                <a:latin typeface="Courier New" panose="02070309020205020404" pitchFamily="49" charset="0"/>
-                <a:cs typeface="Courier New" panose="02070309020205020404" pitchFamily="49" charset="0"/>
-              </a:rPr>
-              <a:t>{ </a:t>
-            </a:r>
-          </a:p>
-          <a:p>
-            <a:pPr marL="0" indent="0">
-              <a:buNone/>
-            </a:pPr>
-            <a:r>
-              <a:rPr lang="nb-NO" sz="1600" dirty="0">
-                <a:latin typeface="Courier New" panose="02070309020205020404" pitchFamily="49" charset="0"/>
-                <a:cs typeface="Courier New" panose="02070309020205020404" pitchFamily="49" charset="0"/>
-              </a:rPr>
-              <a:t>	"$</a:t>
-            </a:r>
-            <a:r>
-              <a:rPr lang="nb-NO" sz="1600" dirty="0" err="1">
-                <a:latin typeface="Courier New" panose="02070309020205020404" pitchFamily="49" charset="0"/>
-                <a:cs typeface="Courier New" panose="02070309020205020404" pitchFamily="49" charset="0"/>
-              </a:rPr>
-              <a:t>schema</a:t>
-            </a:r>
-            <a:r>
-              <a:rPr lang="nb-NO" sz="1600" dirty="0">
-                <a:latin typeface="Courier New" panose="02070309020205020404" pitchFamily="49" charset="0"/>
-                <a:cs typeface="Courier New" panose="02070309020205020404" pitchFamily="49" charset="0"/>
-              </a:rPr>
-              <a:t>": "", </a:t>
-            </a:r>
-          </a:p>
-          <a:p>
-            <a:pPr marL="0" indent="0">
-              <a:buNone/>
-            </a:pPr>
-            <a:r>
-              <a:rPr lang="nb-NO" sz="1600" dirty="0">
-                <a:latin typeface="Courier New" panose="02070309020205020404" pitchFamily="49" charset="0"/>
-                <a:cs typeface="Courier New" panose="02070309020205020404" pitchFamily="49" charset="0"/>
-              </a:rPr>
-              <a:t>	"contentVersion": "", </a:t>
-            </a:r>
-          </a:p>
-          <a:p>
-            <a:pPr marL="0" indent="0">
-              <a:buNone/>
-            </a:pPr>
-            <a:r>
-              <a:rPr lang="nb-NO" sz="1600" dirty="0">
-                <a:latin typeface="Courier New" panose="02070309020205020404" pitchFamily="49" charset="0"/>
-                <a:cs typeface="Courier New" panose="02070309020205020404" pitchFamily="49" charset="0"/>
-              </a:rPr>
-              <a:t>	"parameters": { }, </a:t>
-            </a:r>
-          </a:p>
-          <a:p>
-            <a:pPr marL="0" indent="0">
-              <a:buNone/>
-            </a:pPr>
-            <a:r>
-              <a:rPr lang="nb-NO" sz="1600" dirty="0">
-                <a:latin typeface="Courier New" panose="02070309020205020404" pitchFamily="49" charset="0"/>
-                <a:cs typeface="Courier New" panose="02070309020205020404" pitchFamily="49" charset="0"/>
-              </a:rPr>
-              <a:t>	"variables": { }, </a:t>
-            </a:r>
-          </a:p>
-          <a:p>
-            <a:pPr marL="0" indent="0">
-              <a:buNone/>
-            </a:pPr>
-            <a:r>
-              <a:rPr lang="nb-NO" sz="1600" dirty="0">
-                <a:latin typeface="Courier New" panose="02070309020205020404" pitchFamily="49" charset="0"/>
-                <a:cs typeface="Courier New" panose="02070309020205020404" pitchFamily="49" charset="0"/>
-              </a:rPr>
-              <a:t>	"functions": [ ], </a:t>
-            </a:r>
-          </a:p>
-          <a:p>
-            <a:pPr marL="0" indent="0">
-              <a:buNone/>
-            </a:pPr>
-            <a:r>
-              <a:rPr lang="nb-NO" sz="1600" dirty="0">
-                <a:latin typeface="Courier New" panose="02070309020205020404" pitchFamily="49" charset="0"/>
-                <a:cs typeface="Courier New" panose="02070309020205020404" pitchFamily="49" charset="0"/>
-              </a:rPr>
-              <a:t>	"resources": [ ], </a:t>
-            </a:r>
-          </a:p>
-          <a:p>
-            <a:pPr marL="0" indent="0">
-              <a:buNone/>
-            </a:pPr>
-            <a:r>
-              <a:rPr lang="nb-NO" sz="1600" dirty="0">
-                <a:latin typeface="Courier New" panose="02070309020205020404" pitchFamily="49" charset="0"/>
-                <a:cs typeface="Courier New" panose="02070309020205020404" pitchFamily="49" charset="0"/>
-              </a:rPr>
-              <a:t>	"outputs": { } </a:t>
-            </a:r>
-          </a:p>
-          <a:p>
-            <a:pPr marL="0" indent="0">
-              <a:buNone/>
-            </a:pPr>
-            <a:r>
-              <a:rPr lang="nb-NO" sz="1600" dirty="0">
-                <a:latin typeface="Courier New" panose="02070309020205020404" pitchFamily="49" charset="0"/>
-                <a:cs typeface="Courier New" panose="02070309020205020404" pitchFamily="49" charset="0"/>
-              </a:rPr>
-              <a:t>}</a:t>
-            </a:r>
-          </a:p>
-          <a:p>
-            <a:pPr marL="0" indent="0">
-              <a:buNone/>
-            </a:pPr>
-            <a:endParaRPr lang="nb-NO" sz="1600" dirty="0">
-              <a:latin typeface="Courier New" panose="02070309020205020404" pitchFamily="49" charset="0"/>
-              <a:cs typeface="Courier New" panose="02070309020205020404" pitchFamily="49" charset="0"/>
-            </a:endParaRPr>
-          </a:p>
-          <a:p>
-            <a:r>
-              <a:rPr lang="nb-NO" sz="2000" dirty="0">
-                <a:cs typeface="Courier New" panose="02070309020205020404" pitchFamily="49" charset="0"/>
-                <a:hlinkClick r:id="rId2"/>
-              </a:rPr>
-              <a:t>https://docs.microsoft.com/en-us/azure/azure-resource-manager/resource-group-authoring-templates</a:t>
-            </a:r>
-            <a:endParaRPr lang="nb-NO" sz="2000" dirty="0">
-              <a:cs typeface="Courier New" panose="02070309020205020404" pitchFamily="49" charset="0"/>
-            </a:endParaRPr>
-          </a:p>
-          <a:p>
-            <a:endParaRPr lang="nb-NO" sz="2000" dirty="0">
-              <a:cs typeface="Courier New" panose="02070309020205020404" pitchFamily="49" charset="0"/>
-            </a:endParaRPr>
-          </a:p>
-        </p:txBody>
-      </p:sp>
-      <p:sp>
-        <p:nvSpPr>
-          <p:cNvPr id="3" name="Title 2">
-            <a:extLst>
-              <a:ext uri="{FF2B5EF4-FFF2-40B4-BE49-F238E27FC236}">
-                <a16:creationId xmlns:a16="http://schemas.microsoft.com/office/drawing/2014/main" id="{CCF727E1-176E-4A6B-8896-92949B40C349}"/>
-              </a:ext>
-            </a:extLst>
-          </p:cNvPr>
-          <p:cNvSpPr>
-            <a:spLocks noGrp="1"/>
-          </p:cNvSpPr>
-          <p:nvPr>
-            <p:ph type="title"/>
-          </p:nvPr>
-        </p:nvSpPr>
-        <p:spPr/>
-        <p:txBody>
-          <a:bodyPr/>
-          <a:lstStyle/>
-          <a:p>
-            <a:r>
-              <a:rPr lang="nb-NO" dirty="0"/>
-              <a:t>ARM-</a:t>
-            </a:r>
-            <a:r>
-              <a:rPr lang="nb-NO" dirty="0" err="1"/>
-              <a:t>templates</a:t>
-            </a:r>
-            <a:r>
-              <a:rPr lang="nb-NO" dirty="0"/>
-              <a:t> struktur </a:t>
-            </a:r>
-          </a:p>
-        </p:txBody>
-      </p:sp>
+            <a:r>
+              <a:rPr lang="nb-NO" sz="4400" dirty="0"/>
+              <a:t>Verdi</a:t>
+            </a:r>
+          </a:p>
+        </p:txBody>
+      </p:sp>
+      <p:cxnSp>
+        <p:nvCxnSpPr>
+          <p:cNvPr id="8" name="Straight Arrow Connector 7"/>
+          <p:cNvCxnSpPr/>
+          <p:nvPr/>
+        </p:nvCxnSpPr>
+        <p:spPr>
+          <a:xfrm flipH="1">
+            <a:off x="7861852" y="3061252"/>
+            <a:ext cx="2136913" cy="1769165"/>
+          </a:xfrm>
+          <a:prstGeom prst="straightConnector1">
+            <a:avLst/>
+          </a:prstGeom>
+          <a:ln w="76200">
+            <a:tailEnd type="triangle"/>
+          </a:ln>
+        </p:spPr>
+        <p:style>
+          <a:lnRef idx="1">
+            <a:schemeClr val="accent1"/>
+          </a:lnRef>
+          <a:fillRef idx="0">
+            <a:schemeClr val="accent1"/>
+          </a:fillRef>
+          <a:effectRef idx="0">
+            <a:schemeClr val="accent1"/>
+          </a:effectRef>
+          <a:fontRef idx="minor">
+            <a:schemeClr val="tx1"/>
+          </a:fontRef>
+        </p:style>
+      </p:cxnSp>
     </p:spTree>
     <p:extLst>
       <p:ext uri="{BB962C8B-B14F-4D97-AF65-F5344CB8AC3E}">
-        <p14:creationId xmlns:p14="http://schemas.microsoft.com/office/powerpoint/2010/main" val="1060301785"/>
+        <p14:creationId xmlns:p14="http://schemas.microsoft.com/office/powerpoint/2010/main" val="1440512545"/>
       </p:ext>
     </p:extLst>
   </p:cSld>
@@ -11318,13 +12936,7 @@
       </p:grpSpPr>
       <p:sp>
         <p:nvSpPr>
-          <p:cNvPr id="2" name="Content Placeholder 1">
-            <a:extLst>
-              <a:ext uri="{FF2B5EF4-FFF2-40B4-BE49-F238E27FC236}">
-                <a16:creationId xmlns:a16="http://schemas.microsoft.com/office/drawing/2014/main" id="{9ACC7AD5-9759-4794-8447-7D74D11ADA52}"/>
-              </a:ext>
-            </a:extLst>
-          </p:cNvPr>
+          <p:cNvPr id="2" name="Content Placeholder 1"/>
           <p:cNvSpPr>
             <a:spLocks noGrp="1"/>
           </p:cNvSpPr>
@@ -11338,30 +12950,15 @@
           <a:lstStyle/>
           <a:p>
             <a:r>
-              <a:rPr lang="nb-NO" dirty="0">
-                <a:hlinkClick r:id="rId2"/>
-              </a:rPr>
-              <a:t>https://github.com/Azure/azure-quickstart-templates</a:t>
-            </a:r>
-            <a:endParaRPr lang="nb-NO" dirty="0"/>
-          </a:p>
-          <a:p>
-            <a:endParaRPr lang="nb-NO" dirty="0"/>
-          </a:p>
-          <a:p>
-            <a:endParaRPr lang="nb-NO" dirty="0"/>
-          </a:p>
-        </p:txBody>
-      </p:sp>
-      <p:sp>
-        <p:nvSpPr>
-          <p:cNvPr id="3" name="Title 2">
-            <a:extLst>
-              <a:ext uri="{FF2B5EF4-FFF2-40B4-BE49-F238E27FC236}">
-                <a16:creationId xmlns:a16="http://schemas.microsoft.com/office/drawing/2014/main" id="{6DF109DB-F753-405D-BE67-C0E56871CE35}"/>
-              </a:ext>
-            </a:extLst>
-          </p:cNvPr>
+              <a:rPr lang="nb-NO" dirty="0"/>
+              <a:t>Et samlebegrep for kultur, prosess og verktøy for å kontinuerlig forbedre måten vi gjør om ideer til programvare som skaper verdi</a:t>
+            </a:r>
+          </a:p>
+        </p:txBody>
+      </p:sp>
+      <p:sp>
+        <p:nvSpPr>
+          <p:cNvPr id="3" name="Title 2"/>
           <p:cNvSpPr>
             <a:spLocks noGrp="1"/>
           </p:cNvSpPr>
@@ -11375,16 +12972,12 @@
           <a:lstStyle/>
           <a:p>
             <a:r>
+              <a:rPr lang="nb-NO" dirty="0" err="1"/>
+              <a:t>DevOps</a:t>
+            </a:r>
+            <a:r>
               <a:rPr lang="nb-NO" dirty="0"/>
-              <a:t>ARM-</a:t>
-            </a:r>
-            <a:r>
-              <a:rPr lang="nb-NO" dirty="0" err="1"/>
-              <a:t>templates</a:t>
-            </a:r>
-            <a:r>
-              <a:rPr lang="nb-NO" dirty="0"/>
-              <a:t> ressurser</a:t>
+              <a:t> er..</a:t>
             </a:r>
           </a:p>
         </p:txBody>
@@ -11392,7 +12985,114 @@
     </p:spTree>
     <p:extLst>
       <p:ext uri="{BB962C8B-B14F-4D97-AF65-F5344CB8AC3E}">
-        <p14:creationId xmlns:p14="http://schemas.microsoft.com/office/powerpoint/2010/main" val="72647585"/>
+        <p14:creationId xmlns:p14="http://schemas.microsoft.com/office/powerpoint/2010/main" val="989989884"/>
+      </p:ext>
+    </p:extLst>
+  </p:cSld>
+  <p:clrMapOvr>
+    <a:masterClrMapping/>
+  </p:clrMapOvr>
+</p:sld>
+</file>
+
+<file path=ppt/slides/slide9.xml><?xml version="1.0" encoding="utf-8"?>
+<p:sld xmlns:a="http://schemas.openxmlformats.org/drawingml/2006/main" xmlns:r="http://schemas.openxmlformats.org/officeDocument/2006/relationships" xmlns:p="http://schemas.openxmlformats.org/presentationml/2006/main">
+  <p:cSld>
+    <p:spTree>
+      <p:nvGrpSpPr>
+        <p:cNvPr id="1" name=""/>
+        <p:cNvGrpSpPr/>
+        <p:nvPr/>
+      </p:nvGrpSpPr>
+      <p:grpSpPr>
+        <a:xfrm>
+          <a:off x="0" y="0"/>
+          <a:ext cx="0" cy="0"/>
+          <a:chOff x="0" y="0"/>
+          <a:chExt cx="0" cy="0"/>
+        </a:xfrm>
+      </p:grpSpPr>
+      <p:sp>
+        <p:nvSpPr>
+          <p:cNvPr id="2" name="Content Placeholder 1"/>
+          <p:cNvSpPr>
+            <a:spLocks noGrp="1"/>
+          </p:cNvSpPr>
+          <p:nvPr>
+            <p:ph idx="1"/>
+          </p:nvPr>
+        </p:nvSpPr>
+        <p:spPr/>
+        <p:txBody>
+          <a:bodyPr/>
+          <a:lstStyle/>
+          <a:p>
+            <a:r>
+              <a:rPr lang="nb-NO" dirty="0"/>
+              <a:t>Vi definerer «flyt» som et systems evne til å gjøre om behov til gevinst</a:t>
+            </a:r>
+          </a:p>
+          <a:p>
+            <a:endParaRPr lang="nb-NO" dirty="0"/>
+          </a:p>
+          <a:p>
+            <a:pPr lvl="1"/>
+            <a:endParaRPr lang="nb-NO" dirty="0"/>
+          </a:p>
+        </p:txBody>
+      </p:sp>
+      <p:sp>
+        <p:nvSpPr>
+          <p:cNvPr id="3" name="Title 2"/>
+          <p:cNvSpPr>
+            <a:spLocks noGrp="1"/>
+          </p:cNvSpPr>
+          <p:nvPr>
+            <p:ph type="title"/>
+          </p:nvPr>
+        </p:nvSpPr>
+        <p:spPr/>
+        <p:txBody>
+          <a:bodyPr/>
+          <a:lstStyle/>
+          <a:p>
+            <a:r>
+              <a:rPr lang="nb-NO" dirty="0"/>
+              <a:t>Flyt	</a:t>
+            </a:r>
+          </a:p>
+        </p:txBody>
+      </p:sp>
+      <p:pic>
+        <p:nvPicPr>
+          <p:cNvPr id="5" name="Bilde 5">
+            <a:extLst/>
+          </p:cNvPr>
+          <p:cNvPicPr>
+            <a:picLocks noChangeAspect="1"/>
+          </p:cNvPicPr>
+          <p:nvPr/>
+        </p:nvPicPr>
+        <p:blipFill>
+          <a:blip r:embed="rId3"/>
+          <a:stretch>
+            <a:fillRect/>
+          </a:stretch>
+        </p:blipFill>
+        <p:spPr>
+          <a:xfrm>
+            <a:off x="3243557" y="3278170"/>
+            <a:ext cx="6061476" cy="1446247"/>
+          </a:xfrm>
+          <a:prstGeom prst="rect">
+            <a:avLst/>
+          </a:prstGeom>
+        </p:spPr>
+      </p:pic>
+    </p:spTree>
+    <p:extLst>
+      <p:ext uri="{BB962C8B-B14F-4D97-AF65-F5344CB8AC3E}">
+        <p14:creationId xmlns:p14="http://schemas.microsoft.com/office/powerpoint/2010/main" val="1032995515"/>
       </p:ext>
     </p:extLst>
   </p:cSld>
@@ -12934,21 +14634,6 @@
 </file>
 
 <file path=customXml/item1.xml><?xml version="1.0" encoding="utf-8"?>
-<p:properties xmlns:p="http://schemas.microsoft.com/office/2006/metadata/properties" xmlns:xsi="http://www.w3.org/2001/XMLSchema-instance" xmlns:pc="http://schemas.microsoft.com/office/infopath/2007/PartnerControls">
-  <documentManagement/>
-</p:properties>
-</file>
-
-<file path=customXml/item2.xml><?xml version="1.0" encoding="utf-8"?>
-<?mso-contentType ?>
-<FormTemplates xmlns="http://schemas.microsoft.com/sharepoint/v3/contenttype/forms">
-  <Display>DocumentLibraryForm</Display>
-  <Edit>DocumentLibraryForm</Edit>
-  <New>DocumentLibraryForm</New>
-</FormTemplates>
-</file>
-
-<file path=customXml/item3.xml><?xml version="1.0" encoding="utf-8"?>
 <ct:contentTypeSchema xmlns:ct="http://schemas.microsoft.com/office/2006/metadata/contentType" xmlns:ma="http://schemas.microsoft.com/office/2006/metadata/properties/metaAttributes" ct:_="" ma:_="" ma:contentTypeName="Document" ma:contentTypeID="0x0101005D3CE5A03C88D04F8FE0CC8617320B29" ma:contentTypeVersion="2" ma:contentTypeDescription="Create a new document." ma:contentTypeScope="" ma:versionID="23c508fadb5761cd27fdc7efc393bb78">
   <xsd:schema xmlns:xsd="http://www.w3.org/2001/XMLSchema" xmlns:xs="http://www.w3.org/2001/XMLSchema" xmlns:p="http://schemas.microsoft.com/office/2006/metadata/properties" xmlns:ns2="323bcd62-7d27-4513-9df1-9bc20f03554b" targetNamespace="http://schemas.microsoft.com/office/2006/metadata/properties" ma:root="true" ma:fieldsID="4120a6a9df7c81c23a4d646d2ccf1355" ns2:_="">
     <xsd:import namespace="323bcd62-7d27-4513-9df1-9bc20f03554b"/>
@@ -13080,32 +14765,22 @@
 </ct:contentTypeSchema>
 </file>
 
-<file path=customXml/itemProps1.xml><?xml version="1.0" encoding="utf-8"?>
-<ds:datastoreItem xmlns:ds="http://schemas.openxmlformats.org/officeDocument/2006/customXml" ds:itemID="{9D2CB842-18D5-4EEF-9009-B0CAFCE7AC3E}">
-  <ds:schemaRefs>
-    <ds:schemaRef ds:uri="http://schemas.microsoft.com/office/2006/documentManagement/types"/>
-    <ds:schemaRef ds:uri="http://schemas.microsoft.com/office/infopath/2007/PartnerControls"/>
-    <ds:schemaRef ds:uri="cd7095a3-97f1-4663-a71f-a762e9d8a5de"/>
-    <ds:schemaRef ds:uri="http://purl.org/dc/elements/1.1/"/>
-    <ds:schemaRef ds:uri="http://schemas.microsoft.com/office/2006/metadata/properties"/>
-    <ds:schemaRef ds:uri="http://schemas.microsoft.com/sharepoint/v3"/>
-    <ds:schemaRef ds:uri="http://purl.org/dc/terms/"/>
-    <ds:schemaRef ds:uri="http://schemas.openxmlformats.org/package/2006/metadata/core-properties"/>
-    <ds:schemaRef ds:uri="http://www.w3.org/XML/1998/namespace"/>
-    <ds:schemaRef ds:uri="http://purl.org/dc/dcmitype/"/>
-  </ds:schemaRefs>
-</ds:datastoreItem>
+<file path=customXml/item2.xml><?xml version="1.0" encoding="utf-8"?>
+<?mso-contentType ?>
+<FormTemplates xmlns="http://schemas.microsoft.com/sharepoint/v3/contenttype/forms">
+  <Display>DocumentLibraryForm</Display>
+  <Edit>DocumentLibraryForm</Edit>
+  <New>DocumentLibraryForm</New>
+</FormTemplates>
 </file>
 
-<file path=customXml/itemProps2.xml><?xml version="1.0" encoding="utf-8"?>
-<ds:datastoreItem xmlns:ds="http://schemas.openxmlformats.org/officeDocument/2006/customXml" ds:itemID="{BB82CC63-55FC-4D22-9ED3-DB88AF6228E1}">
-  <ds:schemaRefs>
-    <ds:schemaRef ds:uri="http://schemas.microsoft.com/sharepoint/v3/contenttype/forms"/>
-  </ds:schemaRefs>
-</ds:datastoreItem>
+<file path=customXml/item3.xml><?xml version="1.0" encoding="utf-8"?>
+<p:properties xmlns:p="http://schemas.microsoft.com/office/2006/metadata/properties" xmlns:xsi="http://www.w3.org/2001/XMLSchema-instance" xmlns:pc="http://schemas.microsoft.com/office/infopath/2007/PartnerControls">
+  <documentManagement/>
+</p:properties>
 </file>
 
-<file path=customXml/itemProps3.xml><?xml version="1.0" encoding="utf-8"?>
+<file path=customXml/itemProps1.xml><?xml version="1.0" encoding="utf-8"?>
 <ds:datastoreItem xmlns:ds="http://schemas.openxmlformats.org/officeDocument/2006/customXml" ds:itemID="{0377EA4A-9170-43AD-A052-6EABC948F73F}">
   <ds:schemaRefs>
     <ds:schemaRef ds:uri="http://schemas.microsoft.com/office/2006/metadata/contentType"/>
@@ -13121,4 +14796,29 @@
     <ds:schemaRef ds:uri="http://schemas.microsoft.com/internal/obd"/>
   </ds:schemaRefs>
 </ds:datastoreItem>
+</file>
+
+<file path=customXml/itemProps2.xml><?xml version="1.0" encoding="utf-8"?>
+<ds:datastoreItem xmlns:ds="http://schemas.openxmlformats.org/officeDocument/2006/customXml" ds:itemID="{BB82CC63-55FC-4D22-9ED3-DB88AF6228E1}">
+  <ds:schemaRefs>
+    <ds:schemaRef ds:uri="http://schemas.microsoft.com/sharepoint/v3/contenttype/forms"/>
+  </ds:schemaRefs>
+</ds:datastoreItem>
+</file>
+
+<file path=customXml/itemProps3.xml><?xml version="1.0" encoding="utf-8"?>
+<ds:datastoreItem xmlns:ds="http://schemas.openxmlformats.org/officeDocument/2006/customXml" ds:itemID="{9D2CB842-18D5-4EEF-9009-B0CAFCE7AC3E}">
+  <ds:schemaRefs>
+    <ds:schemaRef ds:uri="http://schemas.microsoft.com/office/2006/documentManagement/types"/>
+    <ds:schemaRef ds:uri="http://schemas.microsoft.com/office/infopath/2007/PartnerControls"/>
+    <ds:schemaRef ds:uri="cd7095a3-97f1-4663-a71f-a762e9d8a5de"/>
+    <ds:schemaRef ds:uri="http://purl.org/dc/elements/1.1/"/>
+    <ds:schemaRef ds:uri="http://schemas.microsoft.com/office/2006/metadata/properties"/>
+    <ds:schemaRef ds:uri="http://schemas.microsoft.com/sharepoint/v3"/>
+    <ds:schemaRef ds:uri="http://purl.org/dc/terms/"/>
+    <ds:schemaRef ds:uri="http://schemas.openxmlformats.org/package/2006/metadata/core-properties"/>
+    <ds:schemaRef ds:uri="http://www.w3.org/XML/1998/namespace"/>
+    <ds:schemaRef ds:uri="http://purl.org/dc/dcmitype/"/>
+  </ds:schemaRefs>
+</ds:datastoreItem>
 </file>
</xml_diff>

<commit_message>
Oppdaterte leksjon 2, arm templates og presentasjon
</commit_message>
<xml_diff>
--- a/Workshop_2/Presentasjon/Azureskolen-Workshop#2.pptx
+++ b/Workshop_2/Presentasjon/Azureskolen-Workshop#2.pptx
@@ -7,10 +7,10 @@
     <p:sldMasterId id="2147483705" r:id="rId6"/>
   </p:sldMasterIdLst>
   <p:notesMasterIdLst>
-    <p:notesMasterId r:id="rId24"/>
+    <p:notesMasterId r:id="rId26"/>
   </p:notesMasterIdLst>
   <p:handoutMasterIdLst>
-    <p:handoutMasterId r:id="rId25"/>
+    <p:handoutMasterId r:id="rId27"/>
   </p:handoutMasterIdLst>
   <p:sldIdLst>
     <p:sldId id="256" r:id="rId7"/>
@@ -26,10 +26,12 @@
     <p:sldId id="271" r:id="rId17"/>
     <p:sldId id="272" r:id="rId18"/>
     <p:sldId id="273" r:id="rId19"/>
-    <p:sldId id="264" r:id="rId20"/>
-    <p:sldId id="261" r:id="rId21"/>
-    <p:sldId id="262" r:id="rId22"/>
-    <p:sldId id="263" r:id="rId23"/>
+    <p:sldId id="274" r:id="rId20"/>
+    <p:sldId id="275" r:id="rId21"/>
+    <p:sldId id="264" r:id="rId22"/>
+    <p:sldId id="261" r:id="rId23"/>
+    <p:sldId id="262" r:id="rId24"/>
+    <p:sldId id="263" r:id="rId25"/>
   </p:sldIdLst>
   <p:sldSz cx="12192000" cy="6858000"/>
   <p:notesSz cx="6858000" cy="9144000"/>
@@ -592,7 +594,7 @@
           <a:p>
             <a:fld id="{54C52192-B826-4AE0-9CD6-BEA9467D12B3}" type="datetimeFigureOut">
               <a:rPr lang="nb-NO" smtClean="0"/>
-              <a:t>15.01.2019</a:t>
+              <a:t>16.01.2019</a:t>
             </a:fld>
             <a:endParaRPr lang="nb-NO"/>
           </a:p>
@@ -757,7 +759,7 @@
           <a:p>
             <a:fld id="{2696BCB2-2760-41B1-A1BE-7886EF110FCB}" type="datetimeFigureOut">
               <a:rPr lang="nb-NO" smtClean="0"/>
-              <a:t>15.01.2019</a:t>
+              <a:t>16.01.2019</a:t>
             </a:fld>
             <a:endParaRPr lang="nb-NO"/>
           </a:p>
@@ -11681,7 +11683,7 @@
           <p:cNvPr id="2" name="Content Placeholder 1">
             <a:extLst>
               <a:ext uri="{FF2B5EF4-FFF2-40B4-BE49-F238E27FC236}">
-                <a16:creationId xmlns:a16="http://schemas.microsoft.com/office/drawing/2014/main" id="{13200DE8-44F3-48A3-BBC9-63173A6CF0B0}"/>
+                <a16:creationId xmlns:a16="http://schemas.microsoft.com/office/drawing/2014/main" id="{98078FD0-E258-4A30-9BA6-C3ADB80AB627}"/>
               </a:ext>
             </a:extLst>
           </p:cNvPr>
@@ -11699,7 +11701,7 @@
           <a:p>
             <a:r>
               <a:rPr lang="nb-NO" dirty="0"/>
-              <a:t>Forutsigbarhet</a:t>
+              <a:t>TFS Online -&gt; Visual Studio Team Services -&gt; Azure DevOps</a:t>
             </a:r>
           </a:p>
           <a:p>
@@ -11708,7 +11710,7 @@
           <a:p>
             <a:r>
               <a:rPr lang="nb-NO" dirty="0"/>
-              <a:t>Mulighet til å opprette konsistente miljøer</a:t>
+              <a:t>Eget produkt, ikke en del av Azure</a:t>
             </a:r>
           </a:p>
           <a:p>
@@ -11717,17 +11719,17 @@
           <a:p>
             <a:r>
               <a:rPr lang="nb-NO" dirty="0"/>
-              <a:t>God dokumentasjon av infrastrukturen.</a:t>
+              <a:t>Nærere og nærere knyttet til Azure</a:t>
             </a:r>
           </a:p>
           <a:p>
             <a:endParaRPr lang="nb-NO" dirty="0"/>
           </a:p>
           <a:p>
-            <a:endParaRPr lang="nb-NO" dirty="0"/>
-          </a:p>
-          <a:p>
-            <a:endParaRPr lang="nb-NO" dirty="0"/>
+            <a:r>
+              <a:rPr lang="nb-NO" dirty="0"/>
+              <a:t>Skytjeneste, men kommer også som On-Premise løsning</a:t>
+            </a:r>
           </a:p>
         </p:txBody>
       </p:sp>
@@ -11736,7 +11738,7 @@
           <p:cNvPr id="3" name="Title 2">
             <a:extLst>
               <a:ext uri="{FF2B5EF4-FFF2-40B4-BE49-F238E27FC236}">
-                <a16:creationId xmlns:a16="http://schemas.microsoft.com/office/drawing/2014/main" id="{1B6B6ACF-EB8D-4510-A862-5848A8884C84}"/>
+                <a16:creationId xmlns:a16="http://schemas.microsoft.com/office/drawing/2014/main" id="{09318DEF-109E-4E73-A9A9-EAD2DD879DFD}"/>
               </a:ext>
             </a:extLst>
           </p:cNvPr>
@@ -11753,12 +11755,8 @@
           <a:lstStyle/>
           <a:p>
             <a:r>
-              <a:rPr lang="nb-NO" dirty="0" err="1"/>
-              <a:t>Infrastructure</a:t>
-            </a:r>
-            <a:r>
               <a:rPr lang="nb-NO" dirty="0"/>
-              <a:t> as Code</a:t>
+              <a:t>Azure DevOps</a:t>
             </a:r>
           </a:p>
         </p:txBody>
@@ -11766,7 +11764,7 @@
     </p:spTree>
     <p:extLst>
       <p:ext uri="{BB962C8B-B14F-4D97-AF65-F5344CB8AC3E}">
-        <p14:creationId xmlns:p14="http://schemas.microsoft.com/office/powerpoint/2010/main" val="2750714282"/>
+        <p14:creationId xmlns:p14="http://schemas.microsoft.com/office/powerpoint/2010/main" val="1076466315"/>
       </p:ext>
     </p:extLst>
   </p:cSld>
@@ -11798,7 +11796,7 @@
           <p:cNvPr id="2" name="Content Placeholder 1">
             <a:extLst>
               <a:ext uri="{FF2B5EF4-FFF2-40B4-BE49-F238E27FC236}">
-                <a16:creationId xmlns:a16="http://schemas.microsoft.com/office/drawing/2014/main" id="{31783B1B-5095-4966-B826-4F541467D784}"/>
+                <a16:creationId xmlns:a16="http://schemas.microsoft.com/office/drawing/2014/main" id="{94B98822-8368-4C2D-B1AB-DBC5C478A3C8}"/>
               </a:ext>
             </a:extLst>
           </p:cNvPr>
@@ -11809,94 +11807,12 @@
             <p:ph idx="1"/>
           </p:nvPr>
         </p:nvSpPr>
-        <p:spPr>
-          <a:xfrm>
-            <a:off x="1193237" y="1841211"/>
-            <a:ext cx="8382613" cy="4351338"/>
-          </a:xfrm>
-        </p:spPr>
+        <p:spPr/>
         <p:txBody>
           <a:bodyPr/>
           <a:lstStyle/>
           <a:p>
-            <a:r>
-              <a:rPr lang="nb-NO" dirty="0"/>
-              <a:t>Deklarativ beskrivelse av infrastruktur i Azure</a:t>
-            </a:r>
-          </a:p>
-          <a:p>
-            <a:pPr marL="0" indent="0">
-              <a:buNone/>
-            </a:pPr>
-            <a:endParaRPr lang="nb-NO" dirty="0"/>
-          </a:p>
-          <a:p>
-            <a:r>
-              <a:rPr lang="nb-NO" dirty="0"/>
-              <a:t>JSON-struktur</a:t>
-            </a:r>
-          </a:p>
-          <a:p>
-            <a:endParaRPr lang="nb-NO" dirty="0"/>
-          </a:p>
-          <a:p>
-            <a:r>
-              <a:rPr lang="nb-NO" dirty="0"/>
-              <a:t>Filer</a:t>
-            </a:r>
-          </a:p>
-          <a:p>
-            <a:pPr lvl="1"/>
-            <a:r>
-              <a:rPr lang="nb-NO" dirty="0" err="1">
-                <a:latin typeface="Courier New" panose="02070309020205020404" pitchFamily="49" charset="0"/>
-                <a:cs typeface="Courier New" panose="02070309020205020404" pitchFamily="49" charset="0"/>
-              </a:rPr>
-              <a:t>azuredeploy.json</a:t>
-            </a:r>
-            <a:endParaRPr lang="nb-NO" dirty="0">
-              <a:latin typeface="Courier New" panose="02070309020205020404" pitchFamily="49" charset="0"/>
-              <a:cs typeface="Courier New" panose="02070309020205020404" pitchFamily="49" charset="0"/>
-            </a:endParaRPr>
-          </a:p>
-          <a:p>
-            <a:pPr lvl="1"/>
-            <a:r>
-              <a:rPr lang="nb-NO" dirty="0" err="1">
-                <a:latin typeface="Courier New" panose="02070309020205020404" pitchFamily="49" charset="0"/>
-                <a:cs typeface="Courier New" panose="02070309020205020404" pitchFamily="49" charset="0"/>
-              </a:rPr>
-              <a:t>azuredeploy.parameters.json</a:t>
-            </a:r>
-            <a:endParaRPr lang="nb-NO" dirty="0"/>
-          </a:p>
-          <a:p>
-            <a:pPr lvl="1"/>
-            <a:endParaRPr lang="nb-NO" dirty="0"/>
-          </a:p>
-          <a:p>
-            <a:pPr lvl="1"/>
-            <a:endParaRPr lang="nb-NO" dirty="0"/>
-          </a:p>
-          <a:p>
-            <a:r>
-              <a:rPr lang="nb-NO" dirty="0"/>
-              <a:t>To moduser:</a:t>
-            </a:r>
-          </a:p>
-          <a:p>
-            <a:pPr lvl="1"/>
-            <a:r>
-              <a:rPr lang="nb-NO" dirty="0"/>
-              <a:t>Inkrementell – oppretter kun det som er endret</a:t>
-            </a:r>
-          </a:p>
-          <a:p>
-            <a:pPr lvl="1"/>
-            <a:r>
-              <a:rPr lang="nb-NO" dirty="0"/>
-              <a:t>Komplett – sletter alt og oppretter alt på nytt</a:t>
-            </a:r>
+            <a:endParaRPr lang="nb-NO"/>
           </a:p>
         </p:txBody>
       </p:sp>
@@ -11905,7 +11821,7 @@
           <p:cNvPr id="3" name="Title 2">
             <a:extLst>
               <a:ext uri="{FF2B5EF4-FFF2-40B4-BE49-F238E27FC236}">
-                <a16:creationId xmlns:a16="http://schemas.microsoft.com/office/drawing/2014/main" id="{3D15BAEB-1545-45BA-9496-F3F45C1F50EB}"/>
+                <a16:creationId xmlns:a16="http://schemas.microsoft.com/office/drawing/2014/main" id="{6E551990-3A9C-43DC-8E56-7146D7720E17}"/>
               </a:ext>
             </a:extLst>
           </p:cNvPr>
@@ -11921,14 +11837,6 @@
           <a:bodyPr/>
           <a:lstStyle/>
           <a:p>
-            <a:r>
-              <a:rPr lang="nb-NO" dirty="0"/>
-              <a:t>ARM-</a:t>
-            </a:r>
-            <a:r>
-              <a:rPr lang="nb-NO" dirty="0" err="1"/>
-              <a:t>templates</a:t>
-            </a:r>
             <a:endParaRPr lang="nb-NO" dirty="0"/>
           </a:p>
         </p:txBody>
@@ -11936,7 +11844,7 @@
     </p:spTree>
     <p:extLst>
       <p:ext uri="{BB962C8B-B14F-4D97-AF65-F5344CB8AC3E}">
-        <p14:creationId xmlns:p14="http://schemas.microsoft.com/office/powerpoint/2010/main" val="2548185199"/>
+        <p14:creationId xmlns:p14="http://schemas.microsoft.com/office/powerpoint/2010/main" val="2246517485"/>
       </p:ext>
     </p:extLst>
   </p:cSld>
@@ -11968,6 +11876,293 @@
           <p:cNvPr id="2" name="Content Placeholder 1">
             <a:extLst>
               <a:ext uri="{FF2B5EF4-FFF2-40B4-BE49-F238E27FC236}">
+                <a16:creationId xmlns:a16="http://schemas.microsoft.com/office/drawing/2014/main" id="{13200DE8-44F3-48A3-BBC9-63173A6CF0B0}"/>
+              </a:ext>
+            </a:extLst>
+          </p:cNvPr>
+          <p:cNvSpPr>
+            <a:spLocks noGrp="1"/>
+          </p:cNvSpPr>
+          <p:nvPr>
+            <p:ph idx="1"/>
+          </p:nvPr>
+        </p:nvSpPr>
+        <p:spPr/>
+        <p:txBody>
+          <a:bodyPr/>
+          <a:lstStyle/>
+          <a:p>
+            <a:r>
+              <a:rPr lang="nb-NO" dirty="0"/>
+              <a:t>Forutsigbarhet</a:t>
+            </a:r>
+          </a:p>
+          <a:p>
+            <a:endParaRPr lang="nb-NO" dirty="0"/>
+          </a:p>
+          <a:p>
+            <a:r>
+              <a:rPr lang="nb-NO" dirty="0"/>
+              <a:t>Mulighet til å opprette konsistente miljøer</a:t>
+            </a:r>
+          </a:p>
+          <a:p>
+            <a:endParaRPr lang="nb-NO" dirty="0"/>
+          </a:p>
+          <a:p>
+            <a:r>
+              <a:rPr lang="nb-NO" dirty="0"/>
+              <a:t>God dokumentasjon av infrastrukturen.</a:t>
+            </a:r>
+          </a:p>
+          <a:p>
+            <a:endParaRPr lang="nb-NO" dirty="0"/>
+          </a:p>
+          <a:p>
+            <a:endParaRPr lang="nb-NO" dirty="0"/>
+          </a:p>
+          <a:p>
+            <a:endParaRPr lang="nb-NO" dirty="0"/>
+          </a:p>
+        </p:txBody>
+      </p:sp>
+      <p:sp>
+        <p:nvSpPr>
+          <p:cNvPr id="3" name="Title 2">
+            <a:extLst>
+              <a:ext uri="{FF2B5EF4-FFF2-40B4-BE49-F238E27FC236}">
+                <a16:creationId xmlns:a16="http://schemas.microsoft.com/office/drawing/2014/main" id="{1B6B6ACF-EB8D-4510-A862-5848A8884C84}"/>
+              </a:ext>
+            </a:extLst>
+          </p:cNvPr>
+          <p:cNvSpPr>
+            <a:spLocks noGrp="1"/>
+          </p:cNvSpPr>
+          <p:nvPr>
+            <p:ph type="title"/>
+          </p:nvPr>
+        </p:nvSpPr>
+        <p:spPr/>
+        <p:txBody>
+          <a:bodyPr/>
+          <a:lstStyle/>
+          <a:p>
+            <a:r>
+              <a:rPr lang="nb-NO" dirty="0" err="1"/>
+              <a:t>Infrastructure</a:t>
+            </a:r>
+            <a:r>
+              <a:rPr lang="nb-NO" dirty="0"/>
+              <a:t> as Code</a:t>
+            </a:r>
+          </a:p>
+        </p:txBody>
+      </p:sp>
+    </p:spTree>
+    <p:extLst>
+      <p:ext uri="{BB962C8B-B14F-4D97-AF65-F5344CB8AC3E}">
+        <p14:creationId xmlns:p14="http://schemas.microsoft.com/office/powerpoint/2010/main" val="2750714282"/>
+      </p:ext>
+    </p:extLst>
+  </p:cSld>
+  <p:clrMapOvr>
+    <a:masterClrMapping/>
+  </p:clrMapOvr>
+</p:sld>
+</file>
+
+<file path=ppt/slides/slide17.xml><?xml version="1.0" encoding="utf-8"?>
+<p:sld xmlns:a="http://schemas.openxmlformats.org/drawingml/2006/main" xmlns:r="http://schemas.openxmlformats.org/officeDocument/2006/relationships" xmlns:p="http://schemas.openxmlformats.org/presentationml/2006/main">
+  <p:cSld>
+    <p:spTree>
+      <p:nvGrpSpPr>
+        <p:cNvPr id="1" name=""/>
+        <p:cNvGrpSpPr/>
+        <p:nvPr/>
+      </p:nvGrpSpPr>
+      <p:grpSpPr>
+        <a:xfrm>
+          <a:off x="0" y="0"/>
+          <a:ext cx="0" cy="0"/>
+          <a:chOff x="0" y="0"/>
+          <a:chExt cx="0" cy="0"/>
+        </a:xfrm>
+      </p:grpSpPr>
+      <p:sp>
+        <p:nvSpPr>
+          <p:cNvPr id="2" name="Content Placeholder 1">
+            <a:extLst>
+              <a:ext uri="{FF2B5EF4-FFF2-40B4-BE49-F238E27FC236}">
+                <a16:creationId xmlns:a16="http://schemas.microsoft.com/office/drawing/2014/main" id="{31783B1B-5095-4966-B826-4F541467D784}"/>
+              </a:ext>
+            </a:extLst>
+          </p:cNvPr>
+          <p:cNvSpPr>
+            <a:spLocks noGrp="1"/>
+          </p:cNvSpPr>
+          <p:nvPr>
+            <p:ph idx="1"/>
+          </p:nvPr>
+        </p:nvSpPr>
+        <p:spPr>
+          <a:xfrm>
+            <a:off x="1193237" y="1841211"/>
+            <a:ext cx="8382613" cy="4351338"/>
+          </a:xfrm>
+        </p:spPr>
+        <p:txBody>
+          <a:bodyPr/>
+          <a:lstStyle/>
+          <a:p>
+            <a:r>
+              <a:rPr lang="nb-NO" dirty="0"/>
+              <a:t>Deklarativ beskrivelse av infrastruktur i Azure</a:t>
+            </a:r>
+          </a:p>
+          <a:p>
+            <a:pPr marL="0" indent="0">
+              <a:buNone/>
+            </a:pPr>
+            <a:endParaRPr lang="nb-NO" dirty="0"/>
+          </a:p>
+          <a:p>
+            <a:r>
+              <a:rPr lang="nb-NO" dirty="0"/>
+              <a:t>JSON-struktur</a:t>
+            </a:r>
+          </a:p>
+          <a:p>
+            <a:endParaRPr lang="nb-NO" dirty="0"/>
+          </a:p>
+          <a:p>
+            <a:r>
+              <a:rPr lang="nb-NO" dirty="0"/>
+              <a:t>Filer</a:t>
+            </a:r>
+          </a:p>
+          <a:p>
+            <a:pPr lvl="1"/>
+            <a:r>
+              <a:rPr lang="nb-NO" dirty="0" err="1">
+                <a:latin typeface="Courier New" panose="02070309020205020404" pitchFamily="49" charset="0"/>
+                <a:cs typeface="Courier New" panose="02070309020205020404" pitchFamily="49" charset="0"/>
+              </a:rPr>
+              <a:t>azuredeploy.json</a:t>
+            </a:r>
+            <a:endParaRPr lang="nb-NO" dirty="0">
+              <a:latin typeface="Courier New" panose="02070309020205020404" pitchFamily="49" charset="0"/>
+              <a:cs typeface="Courier New" panose="02070309020205020404" pitchFamily="49" charset="0"/>
+            </a:endParaRPr>
+          </a:p>
+          <a:p>
+            <a:pPr lvl="1"/>
+            <a:r>
+              <a:rPr lang="nb-NO" dirty="0" err="1">
+                <a:latin typeface="Courier New" panose="02070309020205020404" pitchFamily="49" charset="0"/>
+                <a:cs typeface="Courier New" panose="02070309020205020404" pitchFamily="49" charset="0"/>
+              </a:rPr>
+              <a:t>azuredeploy.parameters.json</a:t>
+            </a:r>
+            <a:endParaRPr lang="nb-NO" dirty="0"/>
+          </a:p>
+          <a:p>
+            <a:pPr lvl="1"/>
+            <a:endParaRPr lang="nb-NO" dirty="0"/>
+          </a:p>
+          <a:p>
+            <a:pPr lvl="1"/>
+            <a:endParaRPr lang="nb-NO" dirty="0"/>
+          </a:p>
+          <a:p>
+            <a:r>
+              <a:rPr lang="nb-NO" dirty="0"/>
+              <a:t>To moduser:</a:t>
+            </a:r>
+          </a:p>
+          <a:p>
+            <a:pPr lvl="1"/>
+            <a:r>
+              <a:rPr lang="nb-NO" dirty="0"/>
+              <a:t>Inkrementell – oppretter kun det som er endret</a:t>
+            </a:r>
+          </a:p>
+          <a:p>
+            <a:pPr lvl="1"/>
+            <a:r>
+              <a:rPr lang="nb-NO" dirty="0"/>
+              <a:t>Komplett – sletter alt og oppretter alt på nytt</a:t>
+            </a:r>
+          </a:p>
+        </p:txBody>
+      </p:sp>
+      <p:sp>
+        <p:nvSpPr>
+          <p:cNvPr id="3" name="Title 2">
+            <a:extLst>
+              <a:ext uri="{FF2B5EF4-FFF2-40B4-BE49-F238E27FC236}">
+                <a16:creationId xmlns:a16="http://schemas.microsoft.com/office/drawing/2014/main" id="{3D15BAEB-1545-45BA-9496-F3F45C1F50EB}"/>
+              </a:ext>
+            </a:extLst>
+          </p:cNvPr>
+          <p:cNvSpPr>
+            <a:spLocks noGrp="1"/>
+          </p:cNvSpPr>
+          <p:nvPr>
+            <p:ph type="title"/>
+          </p:nvPr>
+        </p:nvSpPr>
+        <p:spPr/>
+        <p:txBody>
+          <a:bodyPr/>
+          <a:lstStyle/>
+          <a:p>
+            <a:r>
+              <a:rPr lang="nb-NO" dirty="0"/>
+              <a:t>ARM-</a:t>
+            </a:r>
+            <a:r>
+              <a:rPr lang="nb-NO" dirty="0" err="1"/>
+              <a:t>templates</a:t>
+            </a:r>
+            <a:endParaRPr lang="nb-NO" dirty="0"/>
+          </a:p>
+        </p:txBody>
+      </p:sp>
+    </p:spTree>
+    <p:extLst>
+      <p:ext uri="{BB962C8B-B14F-4D97-AF65-F5344CB8AC3E}">
+        <p14:creationId xmlns:p14="http://schemas.microsoft.com/office/powerpoint/2010/main" val="2548185199"/>
+      </p:ext>
+    </p:extLst>
+  </p:cSld>
+  <p:clrMapOvr>
+    <a:masterClrMapping/>
+  </p:clrMapOvr>
+</p:sld>
+</file>
+
+<file path=ppt/slides/slide18.xml><?xml version="1.0" encoding="utf-8"?>
+<p:sld xmlns:a="http://schemas.openxmlformats.org/drawingml/2006/main" xmlns:r="http://schemas.openxmlformats.org/officeDocument/2006/relationships" xmlns:p="http://schemas.openxmlformats.org/presentationml/2006/main">
+  <p:cSld>
+    <p:spTree>
+      <p:nvGrpSpPr>
+        <p:cNvPr id="1" name=""/>
+        <p:cNvGrpSpPr/>
+        <p:nvPr/>
+      </p:nvGrpSpPr>
+      <p:grpSpPr>
+        <a:xfrm>
+          <a:off x="0" y="0"/>
+          <a:ext cx="0" cy="0"/>
+          <a:chOff x="0" y="0"/>
+          <a:chExt cx="0" cy="0"/>
+        </a:xfrm>
+      </p:grpSpPr>
+      <p:sp>
+        <p:nvSpPr>
+          <p:cNvPr id="2" name="Content Placeholder 1">
+            <a:extLst>
+              <a:ext uri="{FF2B5EF4-FFF2-40B4-BE49-F238E27FC236}">
                 <a16:creationId xmlns:a16="http://schemas.microsoft.com/office/drawing/2014/main" id="{787ACE07-237C-4EEF-A335-325E5DEAFB8A}"/>
               </a:ext>
             </a:extLst>
@@ -12182,7 +12377,7 @@
 </p:sld>
 </file>
 
-<file path=ppt/slides/slide17.xml><?xml version="1.0" encoding="utf-8"?>
+<file path=ppt/slides/slide19.xml><?xml version="1.0" encoding="utf-8"?>
 <p:sld xmlns:a="http://schemas.openxmlformats.org/drawingml/2006/main" xmlns:r="http://schemas.openxmlformats.org/officeDocument/2006/relationships" xmlns:p="http://schemas.openxmlformats.org/presentationml/2006/main">
   <p:cSld>
     <p:spTree>
@@ -14634,6 +14829,15 @@
 </file>
 
 <file path=customXml/item1.xml><?xml version="1.0" encoding="utf-8"?>
+<?mso-contentType ?>
+<FormTemplates xmlns="http://schemas.microsoft.com/sharepoint/v3/contenttype/forms">
+  <Display>DocumentLibraryForm</Display>
+  <Edit>DocumentLibraryForm</Edit>
+  <New>DocumentLibraryForm</New>
+</FormTemplates>
+</file>
+
+<file path=customXml/item2.xml><?xml version="1.0" encoding="utf-8"?>
 <ct:contentTypeSchema xmlns:ct="http://schemas.microsoft.com/office/2006/metadata/contentType" xmlns:ma="http://schemas.microsoft.com/office/2006/metadata/properties/metaAttributes" ct:_="" ma:_="" ma:contentTypeName="Document" ma:contentTypeID="0x0101005D3CE5A03C88D04F8FE0CC8617320B29" ma:contentTypeVersion="2" ma:contentTypeDescription="Create a new document." ma:contentTypeScope="" ma:versionID="23c508fadb5761cd27fdc7efc393bb78">
   <xsd:schema xmlns:xsd="http://www.w3.org/2001/XMLSchema" xmlns:xs="http://www.w3.org/2001/XMLSchema" xmlns:p="http://schemas.microsoft.com/office/2006/metadata/properties" xmlns:ns2="323bcd62-7d27-4513-9df1-9bc20f03554b" targetNamespace="http://schemas.microsoft.com/office/2006/metadata/properties" ma:root="true" ma:fieldsID="4120a6a9df7c81c23a4d646d2ccf1355" ns2:_="">
     <xsd:import namespace="323bcd62-7d27-4513-9df1-9bc20f03554b"/>
@@ -14765,15 +14969,6 @@
 </ct:contentTypeSchema>
 </file>
 
-<file path=customXml/item2.xml><?xml version="1.0" encoding="utf-8"?>
-<?mso-contentType ?>
-<FormTemplates xmlns="http://schemas.microsoft.com/sharepoint/v3/contenttype/forms">
-  <Display>DocumentLibraryForm</Display>
-  <Edit>DocumentLibraryForm</Edit>
-  <New>DocumentLibraryForm</New>
-</FormTemplates>
-</file>
-
 <file path=customXml/item3.xml><?xml version="1.0" encoding="utf-8"?>
 <p:properties xmlns:p="http://schemas.microsoft.com/office/2006/metadata/properties" xmlns:xsi="http://www.w3.org/2001/XMLSchema-instance" xmlns:pc="http://schemas.microsoft.com/office/infopath/2007/PartnerControls">
   <documentManagement/>
@@ -14781,6 +14976,14 @@
 </file>
 
 <file path=customXml/itemProps1.xml><?xml version="1.0" encoding="utf-8"?>
+<ds:datastoreItem xmlns:ds="http://schemas.openxmlformats.org/officeDocument/2006/customXml" ds:itemID="{BB82CC63-55FC-4D22-9ED3-DB88AF6228E1}">
+  <ds:schemaRefs>
+    <ds:schemaRef ds:uri="http://schemas.microsoft.com/sharepoint/v3/contenttype/forms"/>
+  </ds:schemaRefs>
+</ds:datastoreItem>
+</file>
+
+<file path=customXml/itemProps2.xml><?xml version="1.0" encoding="utf-8"?>
 <ds:datastoreItem xmlns:ds="http://schemas.openxmlformats.org/officeDocument/2006/customXml" ds:itemID="{0377EA4A-9170-43AD-A052-6EABC948F73F}">
   <ds:schemaRefs>
     <ds:schemaRef ds:uri="http://schemas.microsoft.com/office/2006/metadata/contentType"/>
@@ -14794,14 +14997,6 @@
     <ds:schemaRef ds:uri="http://purl.org/dc/elements/1.1/"/>
     <ds:schemaRef ds:uri="http://purl.org/dc/terms/"/>
     <ds:schemaRef ds:uri="http://schemas.microsoft.com/internal/obd"/>
-  </ds:schemaRefs>
-</ds:datastoreItem>
-</file>
-
-<file path=customXml/itemProps2.xml><?xml version="1.0" encoding="utf-8"?>
-<ds:datastoreItem xmlns:ds="http://schemas.openxmlformats.org/officeDocument/2006/customXml" ds:itemID="{BB82CC63-55FC-4D22-9ED3-DB88AF6228E1}">
-  <ds:schemaRefs>
-    <ds:schemaRef ds:uri="http://schemas.microsoft.com/sharepoint/v3/contenttype/forms"/>
   </ds:schemaRefs>
 </ds:datastoreItem>
 </file>

</xml_diff>

<commit_message>
La til tekst på Leksjon 2, oppdaterte komponent
</commit_message>
<xml_diff>
--- a/Workshop_2/Presentasjon/Azureskolen-Workshop#2.pptx
+++ b/Workshop_2/Presentasjon/Azureskolen-Workshop#2.pptx
@@ -7,10 +7,10 @@
     <p:sldMasterId id="2147483705" r:id="rId6"/>
   </p:sldMasterIdLst>
   <p:notesMasterIdLst>
-    <p:notesMasterId r:id="rId26"/>
+    <p:notesMasterId r:id="rId31"/>
   </p:notesMasterIdLst>
   <p:handoutMasterIdLst>
-    <p:handoutMasterId r:id="rId27"/>
+    <p:handoutMasterId r:id="rId32"/>
   </p:handoutMasterIdLst>
   <p:sldIdLst>
     <p:sldId id="256" r:id="rId7"/>
@@ -29,9 +29,14 @@
     <p:sldId id="274" r:id="rId20"/>
     <p:sldId id="275" r:id="rId21"/>
     <p:sldId id="264" r:id="rId22"/>
-    <p:sldId id="261" r:id="rId23"/>
-    <p:sldId id="262" r:id="rId24"/>
-    <p:sldId id="263" r:id="rId25"/>
+    <p:sldId id="278" r:id="rId23"/>
+    <p:sldId id="261" r:id="rId24"/>
+    <p:sldId id="262" r:id="rId25"/>
+    <p:sldId id="276" r:id="rId26"/>
+    <p:sldId id="263" r:id="rId27"/>
+    <p:sldId id="279" r:id="rId28"/>
+    <p:sldId id="277" r:id="rId29"/>
+    <p:sldId id="280" r:id="rId30"/>
   </p:sldIdLst>
   <p:sldSz cx="12192000" cy="6858000"/>
   <p:notesSz cx="6858000" cy="9144000"/>
@@ -594,7 +599,7 @@
           <a:p>
             <a:fld id="{54C52192-B826-4AE0-9CD6-BEA9467D12B3}" type="datetimeFigureOut">
               <a:rPr lang="nb-NO" smtClean="0"/>
-              <a:t>16.01.2019</a:t>
+              <a:t>24.01.2019</a:t>
             </a:fld>
             <a:endParaRPr lang="nb-NO"/>
           </a:p>
@@ -759,7 +764,7 @@
           <a:p>
             <a:fld id="{2696BCB2-2760-41B1-A1BE-7886EF110FCB}" type="datetimeFigureOut">
               <a:rPr lang="nb-NO" smtClean="0"/>
-              <a:t>16.01.2019</a:t>
+              <a:t>24.01.2019</a:t>
             </a:fld>
             <a:endParaRPr lang="nb-NO"/>
           </a:p>
@@ -1652,6 +1657,101 @@
     <p:extLst>
       <p:ext uri="{BB962C8B-B14F-4D97-AF65-F5344CB8AC3E}">
         <p14:creationId xmlns:p14="http://schemas.microsoft.com/office/powerpoint/2010/main" val="1628035474"/>
+      </p:ext>
+    </p:extLst>
+  </p:cSld>
+  <p:clrMapOvr>
+    <a:masterClrMapping/>
+  </p:clrMapOvr>
+</p:notes>
+</file>
+
+<file path=ppt/notesSlides/notesSlide8.xml><?xml version="1.0" encoding="utf-8"?>
+<p:notes xmlns:a="http://schemas.openxmlformats.org/drawingml/2006/main" xmlns:r="http://schemas.openxmlformats.org/officeDocument/2006/relationships" xmlns:p="http://schemas.openxmlformats.org/presentationml/2006/main">
+  <p:cSld>
+    <p:spTree>
+      <p:nvGrpSpPr>
+        <p:cNvPr id="1" name=""/>
+        <p:cNvGrpSpPr/>
+        <p:nvPr/>
+      </p:nvGrpSpPr>
+      <p:grpSpPr>
+        <a:xfrm>
+          <a:off x="0" y="0"/>
+          <a:ext cx="0" cy="0"/>
+          <a:chOff x="0" y="0"/>
+          <a:chExt cx="0" cy="0"/>
+        </a:xfrm>
+      </p:grpSpPr>
+      <p:sp>
+        <p:nvSpPr>
+          <p:cNvPr id="2" name="Slide Image Placeholder 1"/>
+          <p:cNvSpPr>
+            <a:spLocks noGrp="1" noRot="1" noChangeAspect="1"/>
+          </p:cNvSpPr>
+          <p:nvPr>
+            <p:ph type="sldImg"/>
+          </p:nvPr>
+        </p:nvSpPr>
+        <p:spPr/>
+      </p:sp>
+      <p:sp>
+        <p:nvSpPr>
+          <p:cNvPr id="3" name="Notes Placeholder 2"/>
+          <p:cNvSpPr>
+            <a:spLocks noGrp="1"/>
+          </p:cNvSpPr>
+          <p:nvPr>
+            <p:ph type="body" idx="1"/>
+          </p:nvPr>
+        </p:nvSpPr>
+        <p:spPr/>
+        <p:txBody>
+          <a:bodyPr/>
+          <a:lstStyle/>
+          <a:p>
+            <a:r>
+              <a:rPr lang="nb-NO" dirty="0"/>
+              <a:t>Vise </a:t>
+            </a:r>
+            <a:r>
+              <a:rPr lang="nb-NO" dirty="0" err="1"/>
+              <a:t>deployment</a:t>
+            </a:r>
+            <a:r>
+              <a:rPr lang="nb-NO" dirty="0"/>
+              <a:t> av </a:t>
+            </a:r>
+          </a:p>
+        </p:txBody>
+      </p:sp>
+      <p:sp>
+        <p:nvSpPr>
+          <p:cNvPr id="4" name="Slide Number Placeholder 3"/>
+          <p:cNvSpPr>
+            <a:spLocks noGrp="1"/>
+          </p:cNvSpPr>
+          <p:nvPr>
+            <p:ph type="sldNum" sz="quarter" idx="5"/>
+          </p:nvPr>
+        </p:nvSpPr>
+        <p:spPr/>
+        <p:txBody>
+          <a:bodyPr/>
+          <a:lstStyle/>
+          <a:p>
+            <a:fld id="{180377DB-C4B0-49B2-8838-0F01BA83B7C4}" type="slidenum">
+              <a:rPr lang="nb-NO" smtClean="0"/>
+              <a:t>24</a:t>
+            </a:fld>
+            <a:endParaRPr lang="nb-NO"/>
+          </a:p>
+        </p:txBody>
+      </p:sp>
+    </p:spTree>
+    <p:extLst>
+      <p:ext uri="{BB962C8B-B14F-4D97-AF65-F5344CB8AC3E}">
+        <p14:creationId xmlns:p14="http://schemas.microsoft.com/office/powerpoint/2010/main" val="2906306431"/>
       </p:ext>
     </p:extLst>
   </p:cSld>
@@ -11728,7 +11828,24 @@
           <a:p>
             <a:r>
               <a:rPr lang="nb-NO" dirty="0"/>
-              <a:t>Skytjeneste, men kommer også som On-Premise løsning</a:t>
+              <a:t>Skytjeneste, men kommer også som On-</a:t>
+            </a:r>
+            <a:r>
+              <a:rPr lang="nb-NO" dirty="0" err="1"/>
+              <a:t>Premise</a:t>
+            </a:r>
+            <a:r>
+              <a:rPr lang="nb-NO" dirty="0"/>
+              <a:t> løsning</a:t>
+            </a:r>
+          </a:p>
+          <a:p>
+            <a:endParaRPr lang="nb-NO" dirty="0"/>
+          </a:p>
+          <a:p>
+            <a:r>
+              <a:rPr lang="nb-NO" dirty="0"/>
+              <a:t>Gratis å bruke med opptil 5 brukere</a:t>
             </a:r>
           </a:p>
         </p:txBody>
@@ -11919,6 +12036,15 @@
             <a:endParaRPr lang="nb-NO" dirty="0"/>
           </a:p>
           <a:p>
+            <a:r>
+              <a:rPr lang="nb-NO" dirty="0"/>
+              <a:t>Sporbarhet</a:t>
+            </a:r>
+          </a:p>
+          <a:p>
+            <a:endParaRPr lang="nb-NO" dirty="0"/>
+          </a:p>
+          <a:p>
             <a:endParaRPr lang="nb-NO" dirty="0"/>
           </a:p>
           <a:p>
@@ -11993,7 +12119,7 @@
           <p:cNvPr id="2" name="Content Placeholder 1">
             <a:extLst>
               <a:ext uri="{FF2B5EF4-FFF2-40B4-BE49-F238E27FC236}">
-                <a16:creationId xmlns:a16="http://schemas.microsoft.com/office/drawing/2014/main" id="{31783B1B-5095-4966-B826-4F541467D784}"/>
+                <a16:creationId xmlns:a16="http://schemas.microsoft.com/office/drawing/2014/main" id="{3039A250-95F5-43C9-AD88-AF73CE2E5889}"/>
               </a:ext>
             </a:extLst>
           </p:cNvPr>
@@ -12004,31 +12130,51 @@
             <p:ph idx="1"/>
           </p:nvPr>
         </p:nvSpPr>
-        <p:spPr>
-          <a:xfrm>
-            <a:off x="1193237" y="1841211"/>
-            <a:ext cx="8382613" cy="4351338"/>
-          </a:xfrm>
-        </p:spPr>
+        <p:spPr/>
         <p:txBody>
           <a:bodyPr/>
           <a:lstStyle/>
           <a:p>
             <a:r>
               <a:rPr lang="nb-NO" dirty="0"/>
-              <a:t>Deklarativ beskrivelse av infrastruktur i Azure</a:t>
-            </a:r>
-          </a:p>
-          <a:p>
-            <a:pPr marL="0" indent="0">
-              <a:buNone/>
-            </a:pPr>
+              <a:t>Flere forskjellige rammeverk:</a:t>
+            </a:r>
+          </a:p>
+          <a:p>
             <a:endParaRPr lang="nb-NO" dirty="0"/>
           </a:p>
           <a:p>
             <a:r>
+              <a:rPr lang="nb-NO" dirty="0" err="1"/>
+              <a:t>TerraForm</a:t>
+            </a:r>
+            <a:r>
               <a:rPr lang="nb-NO" dirty="0"/>
-              <a:t>JSON-struktur</a:t>
+              <a:t>, </a:t>
+            </a:r>
+            <a:r>
+              <a:rPr lang="nb-NO" dirty="0" err="1"/>
+              <a:t>Chef</a:t>
+            </a:r>
+            <a:r>
+              <a:rPr lang="nb-NO" dirty="0"/>
+              <a:t>, </a:t>
+            </a:r>
+            <a:r>
+              <a:rPr lang="nb-NO" dirty="0" err="1"/>
+              <a:t>Puppet</a:t>
+            </a:r>
+            <a:r>
+              <a:rPr lang="nb-NO" dirty="0"/>
+              <a:t>, </a:t>
+            </a:r>
+            <a:r>
+              <a:rPr lang="nb-NO" dirty="0" err="1"/>
+              <a:t>Ansible</a:t>
+            </a:r>
+            <a:r>
+              <a:rPr lang="nb-NO" dirty="0"/>
+              <a:t>, </a:t>
             </a:r>
           </a:p>
           <a:p>
@@ -12037,61 +12183,49 @@
           <a:p>
             <a:r>
               <a:rPr lang="nb-NO" dirty="0"/>
-              <a:t>Filer</a:t>
-            </a:r>
-          </a:p>
-          <a:p>
-            <a:pPr lvl="1"/>
-            <a:r>
-              <a:rPr lang="nb-NO" dirty="0" err="1">
-                <a:latin typeface="Courier New" panose="02070309020205020404" pitchFamily="49" charset="0"/>
-                <a:cs typeface="Courier New" panose="02070309020205020404" pitchFamily="49" charset="0"/>
-              </a:rPr>
-              <a:t>azuredeploy.json</a:t>
-            </a:r>
-            <a:endParaRPr lang="nb-NO" dirty="0">
-              <a:latin typeface="Courier New" panose="02070309020205020404" pitchFamily="49" charset="0"/>
-              <a:cs typeface="Courier New" panose="02070309020205020404" pitchFamily="49" charset="0"/>
-            </a:endParaRPr>
-          </a:p>
-          <a:p>
-            <a:pPr lvl="1"/>
-            <a:r>
-              <a:rPr lang="nb-NO" dirty="0" err="1">
-                <a:latin typeface="Courier New" panose="02070309020205020404" pitchFamily="49" charset="0"/>
-                <a:cs typeface="Courier New" panose="02070309020205020404" pitchFamily="49" charset="0"/>
-              </a:rPr>
-              <a:t>azuredeploy.parameters.json</a:t>
-            </a:r>
+              <a:t>Microsoft: </a:t>
+            </a:r>
+            <a:r>
+              <a:rPr lang="nb-NO" dirty="0" err="1"/>
+              <a:t>Desired</a:t>
+            </a:r>
+            <a:r>
+              <a:rPr lang="nb-NO" dirty="0"/>
+              <a:t> State </a:t>
+            </a:r>
+            <a:r>
+              <a:rPr lang="nb-NO" dirty="0" err="1"/>
+              <a:t>Configuration</a:t>
+            </a:r>
+            <a:r>
+              <a:rPr lang="nb-NO" dirty="0"/>
+              <a:t> (</a:t>
+            </a:r>
+            <a:r>
+              <a:rPr lang="nb-NO" dirty="0" err="1"/>
+              <a:t>Powershell</a:t>
+            </a:r>
+            <a:r>
+              <a:rPr lang="nb-NO" dirty="0"/>
+              <a:t>)</a:t>
+            </a:r>
+          </a:p>
+          <a:p>
             <a:endParaRPr lang="nb-NO" dirty="0"/>
           </a:p>
           <a:p>
-            <a:pPr lvl="1"/>
+            <a:r>
+              <a:rPr lang="nb-NO" dirty="0"/>
+              <a:t>Microsoft: ARM-</a:t>
+            </a:r>
+            <a:r>
+              <a:rPr lang="nb-NO" dirty="0" err="1"/>
+              <a:t>templates</a:t>
+            </a:r>
             <a:endParaRPr lang="nb-NO" dirty="0"/>
           </a:p>
           <a:p>
-            <a:pPr lvl="1"/>
             <a:endParaRPr lang="nb-NO" dirty="0"/>
-          </a:p>
-          <a:p>
-            <a:r>
-              <a:rPr lang="nb-NO" dirty="0"/>
-              <a:t>To moduser:</a:t>
-            </a:r>
-          </a:p>
-          <a:p>
-            <a:pPr lvl="1"/>
-            <a:r>
-              <a:rPr lang="nb-NO" dirty="0"/>
-              <a:t>Inkrementell – oppretter kun det som er endret</a:t>
-            </a:r>
-          </a:p>
-          <a:p>
-            <a:pPr lvl="1"/>
-            <a:r>
-              <a:rPr lang="nb-NO" dirty="0"/>
-              <a:t>Komplett – sletter alt og oppretter alt på nytt</a:t>
-            </a:r>
           </a:p>
         </p:txBody>
       </p:sp>
@@ -12100,7 +12234,7 @@
           <p:cNvPr id="3" name="Title 2">
             <a:extLst>
               <a:ext uri="{FF2B5EF4-FFF2-40B4-BE49-F238E27FC236}">
-                <a16:creationId xmlns:a16="http://schemas.microsoft.com/office/drawing/2014/main" id="{3D15BAEB-1545-45BA-9496-F3F45C1F50EB}"/>
+                <a16:creationId xmlns:a16="http://schemas.microsoft.com/office/drawing/2014/main" id="{F78198BC-1D9A-496A-808E-757F45CBB51B}"/>
               </a:ext>
             </a:extLst>
           </p:cNvPr>
@@ -12117,21 +12251,20 @@
           <a:lstStyle/>
           <a:p>
             <a:r>
+              <a:rPr lang="nb-NO" dirty="0" err="1"/>
+              <a:t>Infrastructure</a:t>
+            </a:r>
+            <a:r>
               <a:rPr lang="nb-NO" dirty="0"/>
-              <a:t>ARM-</a:t>
-            </a:r>
-            <a:r>
-              <a:rPr lang="nb-NO" dirty="0" err="1"/>
-              <a:t>templates</a:t>
-            </a:r>
-            <a:endParaRPr lang="nb-NO" dirty="0"/>
+              <a:t> as Code</a:t>
+            </a:r>
           </a:p>
         </p:txBody>
       </p:sp>
     </p:spTree>
     <p:extLst>
       <p:ext uri="{BB962C8B-B14F-4D97-AF65-F5344CB8AC3E}">
-        <p14:creationId xmlns:p14="http://schemas.microsoft.com/office/powerpoint/2010/main" val="2548185199"/>
+        <p14:creationId xmlns:p14="http://schemas.microsoft.com/office/powerpoint/2010/main" val="2411712004"/>
       </p:ext>
     </p:extLst>
   </p:cSld>
@@ -12163,7 +12296,7 @@
           <p:cNvPr id="2" name="Content Placeholder 1">
             <a:extLst>
               <a:ext uri="{FF2B5EF4-FFF2-40B4-BE49-F238E27FC236}">
-                <a16:creationId xmlns:a16="http://schemas.microsoft.com/office/drawing/2014/main" id="{787ACE07-237C-4EEF-A335-325E5DEAFB8A}"/>
+                <a16:creationId xmlns:a16="http://schemas.microsoft.com/office/drawing/2014/main" id="{31783B1B-5095-4966-B826-4F541467D784}"/>
               </a:ext>
             </a:extLst>
           </p:cNvPr>
@@ -12174,157 +12307,101 @@
             <p:ph idx="1"/>
           </p:nvPr>
         </p:nvSpPr>
-        <p:spPr/>
+        <p:spPr>
+          <a:xfrm>
+            <a:off x="1193237" y="1841211"/>
+            <a:ext cx="8382613" cy="4351338"/>
+          </a:xfrm>
+        </p:spPr>
         <p:txBody>
           <a:bodyPr/>
           <a:lstStyle/>
+          <a:p>
+            <a:r>
+              <a:rPr lang="nb-NO" dirty="0"/>
+              <a:t>Deklarativ beskrivelse av infrastruktur i Azure</a:t>
+            </a:r>
+          </a:p>
           <a:p>
             <a:pPr marL="0" indent="0">
               <a:buNone/>
             </a:pPr>
-            <a:r>
-              <a:rPr lang="nb-NO" sz="1600" dirty="0">
+            <a:endParaRPr lang="nb-NO" dirty="0"/>
+          </a:p>
+          <a:p>
+            <a:r>
+              <a:rPr lang="nb-NO" dirty="0"/>
+              <a:t>JSON-struktur</a:t>
+            </a:r>
+          </a:p>
+          <a:p>
+            <a:endParaRPr lang="nb-NO" dirty="0"/>
+          </a:p>
+          <a:p>
+            <a:r>
+              <a:rPr lang="nb-NO" dirty="0"/>
+              <a:t>Filer</a:t>
+            </a:r>
+          </a:p>
+          <a:p>
+            <a:pPr lvl="1"/>
+            <a:r>
+              <a:rPr lang="nb-NO" dirty="0" err="1">
                 <a:latin typeface="Courier New" panose="02070309020205020404" pitchFamily="49" charset="0"/>
                 <a:cs typeface="Courier New" panose="02070309020205020404" pitchFamily="49" charset="0"/>
               </a:rPr>
-              <a:t>{ </a:t>
-            </a:r>
-          </a:p>
-          <a:p>
-            <a:pPr marL="0" indent="0">
-              <a:buNone/>
-            </a:pPr>
-            <a:r>
-              <a:rPr lang="nb-NO" sz="1600" dirty="0">
+              <a:t>azuredeploy.json</a:t>
+            </a:r>
+            <a:endParaRPr lang="nb-NO" dirty="0">
+              <a:latin typeface="Courier New" panose="02070309020205020404" pitchFamily="49" charset="0"/>
+              <a:cs typeface="Courier New" panose="02070309020205020404" pitchFamily="49" charset="0"/>
+            </a:endParaRPr>
+          </a:p>
+          <a:p>
+            <a:pPr lvl="1"/>
+            <a:r>
+              <a:rPr lang="nb-NO" dirty="0" err="1">
                 <a:latin typeface="Courier New" panose="02070309020205020404" pitchFamily="49" charset="0"/>
                 <a:cs typeface="Courier New" panose="02070309020205020404" pitchFamily="49" charset="0"/>
               </a:rPr>
-              <a:t>	"$</a:t>
-            </a:r>
-            <a:r>
-              <a:rPr lang="nb-NO" sz="1600" dirty="0" err="1">
-                <a:latin typeface="Courier New" panose="02070309020205020404" pitchFamily="49" charset="0"/>
-                <a:cs typeface="Courier New" panose="02070309020205020404" pitchFamily="49" charset="0"/>
-              </a:rPr>
-              <a:t>schema</a:t>
-            </a:r>
-            <a:r>
-              <a:rPr lang="nb-NO" sz="1600" dirty="0">
-                <a:latin typeface="Courier New" panose="02070309020205020404" pitchFamily="49" charset="0"/>
-                <a:cs typeface="Courier New" panose="02070309020205020404" pitchFamily="49" charset="0"/>
-              </a:rPr>
-              <a:t>": "", </a:t>
-            </a:r>
-          </a:p>
-          <a:p>
-            <a:pPr marL="0" indent="0">
-              <a:buNone/>
-            </a:pPr>
-            <a:r>
-              <a:rPr lang="nb-NO" sz="1600" dirty="0">
-                <a:latin typeface="Courier New" panose="02070309020205020404" pitchFamily="49" charset="0"/>
-                <a:cs typeface="Courier New" panose="02070309020205020404" pitchFamily="49" charset="0"/>
-              </a:rPr>
-              <a:t>	"contentVersion": "", </a:t>
-            </a:r>
-          </a:p>
-          <a:p>
-            <a:pPr marL="0" indent="0">
-              <a:buNone/>
-            </a:pPr>
-            <a:r>
-              <a:rPr lang="nb-NO" sz="1600" dirty="0">
-                <a:latin typeface="Courier New" panose="02070309020205020404" pitchFamily="49" charset="0"/>
-                <a:cs typeface="Courier New" panose="02070309020205020404" pitchFamily="49" charset="0"/>
-              </a:rPr>
-              <a:t>	"parameters": { }, </a:t>
-            </a:r>
-          </a:p>
-          <a:p>
-            <a:pPr marL="0" indent="0">
-              <a:buNone/>
-            </a:pPr>
-            <a:r>
-              <a:rPr lang="nb-NO" sz="1600" dirty="0">
-                <a:latin typeface="Courier New" panose="02070309020205020404" pitchFamily="49" charset="0"/>
-                <a:cs typeface="Courier New" panose="02070309020205020404" pitchFamily="49" charset="0"/>
-              </a:rPr>
-              <a:t>	"variables": { }, </a:t>
-            </a:r>
-          </a:p>
-          <a:p>
-            <a:pPr marL="0" indent="0">
-              <a:buNone/>
-            </a:pPr>
-            <a:r>
-              <a:rPr lang="nb-NO" sz="1600" dirty="0">
-                <a:latin typeface="Courier New" panose="02070309020205020404" pitchFamily="49" charset="0"/>
-                <a:cs typeface="Courier New" panose="02070309020205020404" pitchFamily="49" charset="0"/>
-              </a:rPr>
-              <a:t>	"functions": [ ], </a:t>
-            </a:r>
-          </a:p>
-          <a:p>
-            <a:pPr marL="0" indent="0">
-              <a:buNone/>
-            </a:pPr>
-            <a:r>
-              <a:rPr lang="nb-NO" sz="1600" dirty="0">
-                <a:latin typeface="Courier New" panose="02070309020205020404" pitchFamily="49" charset="0"/>
-                <a:cs typeface="Courier New" panose="02070309020205020404" pitchFamily="49" charset="0"/>
-              </a:rPr>
-              <a:t>	"resources": [ ], </a:t>
-            </a:r>
-          </a:p>
-          <a:p>
-            <a:pPr marL="0" indent="0">
-              <a:buNone/>
-            </a:pPr>
-            <a:r>
-              <a:rPr lang="nb-NO" sz="1600" dirty="0">
-                <a:latin typeface="Courier New" panose="02070309020205020404" pitchFamily="49" charset="0"/>
-                <a:cs typeface="Courier New" panose="02070309020205020404" pitchFamily="49" charset="0"/>
-              </a:rPr>
-              <a:t>	"outputs": { } </a:t>
-            </a:r>
-          </a:p>
-          <a:p>
-            <a:pPr marL="0" indent="0">
-              <a:buNone/>
-            </a:pPr>
-            <a:r>
-              <a:rPr lang="nb-NO" sz="1600" dirty="0">
-                <a:latin typeface="Courier New" panose="02070309020205020404" pitchFamily="49" charset="0"/>
-                <a:cs typeface="Courier New" panose="02070309020205020404" pitchFamily="49" charset="0"/>
-              </a:rPr>
-              <a:t>}</a:t>
-            </a:r>
-          </a:p>
-          <a:p>
-            <a:pPr marL="0" indent="0">
-              <a:buNone/>
-            </a:pPr>
-            <a:endParaRPr lang="nb-NO" sz="1600" dirty="0">
-              <a:latin typeface="Courier New" panose="02070309020205020404" pitchFamily="49" charset="0"/>
-              <a:cs typeface="Courier New" panose="02070309020205020404" pitchFamily="49" charset="0"/>
-            </a:endParaRPr>
-          </a:p>
-          <a:p>
-            <a:r>
-              <a:rPr lang="nb-NO" sz="2000" dirty="0">
-                <a:cs typeface="Courier New" panose="02070309020205020404" pitchFamily="49" charset="0"/>
-                <a:hlinkClick r:id="rId2"/>
-              </a:rPr>
-              <a:t>https://docs.microsoft.com/en-us/azure/azure-resource-manager/resource-group-authoring-templates</a:t>
-            </a:r>
-            <a:endParaRPr lang="nb-NO" sz="2000" dirty="0">
-              <a:cs typeface="Courier New" panose="02070309020205020404" pitchFamily="49" charset="0"/>
-            </a:endParaRPr>
-          </a:p>
-          <a:p>
-            <a:endParaRPr lang="nb-NO" sz="2000" dirty="0">
-              <a:cs typeface="Courier New" panose="02070309020205020404" pitchFamily="49" charset="0"/>
-            </a:endParaRPr>
+              <a:t>azuredeploy.parameters.json</a:t>
+            </a:r>
+            <a:endParaRPr lang="nb-NO" dirty="0"/>
+          </a:p>
+          <a:p>
+            <a:pPr lvl="1"/>
+            <a:endParaRPr lang="nb-NO" dirty="0"/>
+          </a:p>
+          <a:p>
+            <a:pPr lvl="1"/>
+            <a:endParaRPr lang="nb-NO" dirty="0"/>
+          </a:p>
+          <a:p>
+            <a:r>
+              <a:rPr lang="nb-NO" dirty="0"/>
+              <a:t>To moduser:</a:t>
+            </a:r>
+          </a:p>
+          <a:p>
+            <a:pPr lvl="1"/>
+            <a:r>
+              <a:rPr lang="nb-NO" dirty="0"/>
+              <a:t>Inkrementell – oppretter kun det som er endret</a:t>
+            </a:r>
+          </a:p>
+          <a:p>
+            <a:pPr lvl="1"/>
+            <a:r>
+              <a:rPr lang="nb-NO" dirty="0"/>
+              <a:t>Komplett – sletter alt og oppretter alt på nytt</a:t>
+            </a:r>
+          </a:p>
+          <a:p>
+            <a:pPr lvl="1"/>
+            <a:r>
+              <a:rPr lang="nb-NO" dirty="0"/>
+              <a:t>NB! Ting man fjerner blir </a:t>
+            </a:r>
           </a:p>
         </p:txBody>
       </p:sp>
@@ -12333,7 +12410,7 @@
           <p:cNvPr id="3" name="Title 2">
             <a:extLst>
               <a:ext uri="{FF2B5EF4-FFF2-40B4-BE49-F238E27FC236}">
-                <a16:creationId xmlns:a16="http://schemas.microsoft.com/office/drawing/2014/main" id="{CCF727E1-176E-4A6B-8896-92949B40C349}"/>
+                <a16:creationId xmlns:a16="http://schemas.microsoft.com/office/drawing/2014/main" id="{3D15BAEB-1545-45BA-9496-F3F45C1F50EB}"/>
               </a:ext>
             </a:extLst>
           </p:cNvPr>
@@ -12357,17 +12434,14 @@
               <a:rPr lang="nb-NO" dirty="0" err="1"/>
               <a:t>templates</a:t>
             </a:r>
-            <a:r>
-              <a:rPr lang="nb-NO" dirty="0"/>
-              <a:t> struktur </a:t>
-            </a:r>
+            <a:endParaRPr lang="nb-NO" dirty="0"/>
           </a:p>
         </p:txBody>
       </p:sp>
     </p:spTree>
     <p:extLst>
       <p:ext uri="{BB962C8B-B14F-4D97-AF65-F5344CB8AC3E}">
-        <p14:creationId xmlns:p14="http://schemas.microsoft.com/office/powerpoint/2010/main" val="1060301785"/>
+        <p14:creationId xmlns:p14="http://schemas.microsoft.com/office/powerpoint/2010/main" val="2548185199"/>
       </p:ext>
     </p:extLst>
   </p:cSld>
@@ -12399,7 +12473,7 @@
           <p:cNvPr id="2" name="Content Placeholder 1">
             <a:extLst>
               <a:ext uri="{FF2B5EF4-FFF2-40B4-BE49-F238E27FC236}">
-                <a16:creationId xmlns:a16="http://schemas.microsoft.com/office/drawing/2014/main" id="{9ACC7AD5-9759-4794-8447-7D74D11ADA52}"/>
+                <a16:creationId xmlns:a16="http://schemas.microsoft.com/office/drawing/2014/main" id="{787ACE07-237C-4EEF-A335-325E5DEAFB8A}"/>
               </a:ext>
             </a:extLst>
           </p:cNvPr>
@@ -12415,19 +12489,152 @@
           <a:bodyPr/>
           <a:lstStyle/>
           <a:p>
-            <a:r>
-              <a:rPr lang="nb-NO" dirty="0">
+            <a:pPr marL="0" indent="0">
+              <a:buNone/>
+            </a:pPr>
+            <a:r>
+              <a:rPr lang="nb-NO" sz="1600" dirty="0">
+                <a:latin typeface="Courier New" panose="02070309020205020404" pitchFamily="49" charset="0"/>
+                <a:cs typeface="Courier New" panose="02070309020205020404" pitchFamily="49" charset="0"/>
+              </a:rPr>
+              <a:t>{ </a:t>
+            </a:r>
+          </a:p>
+          <a:p>
+            <a:pPr marL="0" indent="0">
+              <a:buNone/>
+            </a:pPr>
+            <a:r>
+              <a:rPr lang="nb-NO" sz="1600" dirty="0">
+                <a:latin typeface="Courier New" panose="02070309020205020404" pitchFamily="49" charset="0"/>
+                <a:cs typeface="Courier New" panose="02070309020205020404" pitchFamily="49" charset="0"/>
+              </a:rPr>
+              <a:t>	"$</a:t>
+            </a:r>
+            <a:r>
+              <a:rPr lang="nb-NO" sz="1600" dirty="0" err="1">
+                <a:latin typeface="Courier New" panose="02070309020205020404" pitchFamily="49" charset="0"/>
+                <a:cs typeface="Courier New" panose="02070309020205020404" pitchFamily="49" charset="0"/>
+              </a:rPr>
+              <a:t>schema</a:t>
+            </a:r>
+            <a:r>
+              <a:rPr lang="nb-NO" sz="1600" dirty="0">
+                <a:latin typeface="Courier New" panose="02070309020205020404" pitchFamily="49" charset="0"/>
+                <a:cs typeface="Courier New" panose="02070309020205020404" pitchFamily="49" charset="0"/>
+              </a:rPr>
+              <a:t>": "", </a:t>
+            </a:r>
+          </a:p>
+          <a:p>
+            <a:pPr marL="0" indent="0">
+              <a:buNone/>
+            </a:pPr>
+            <a:r>
+              <a:rPr lang="nb-NO" sz="1600" dirty="0">
+                <a:latin typeface="Courier New" panose="02070309020205020404" pitchFamily="49" charset="0"/>
+                <a:cs typeface="Courier New" panose="02070309020205020404" pitchFamily="49" charset="0"/>
+              </a:rPr>
+              <a:t>	"contentVersion": "", </a:t>
+            </a:r>
+          </a:p>
+          <a:p>
+            <a:pPr marL="0" indent="0">
+              <a:buNone/>
+            </a:pPr>
+            <a:r>
+              <a:rPr lang="nb-NO" sz="1600" dirty="0">
+                <a:latin typeface="Courier New" panose="02070309020205020404" pitchFamily="49" charset="0"/>
+                <a:cs typeface="Courier New" panose="02070309020205020404" pitchFamily="49" charset="0"/>
+              </a:rPr>
+              <a:t>	"parameters": { }, </a:t>
+            </a:r>
+          </a:p>
+          <a:p>
+            <a:pPr marL="0" indent="0">
+              <a:buNone/>
+            </a:pPr>
+            <a:r>
+              <a:rPr lang="nb-NO" sz="1600" dirty="0">
+                <a:latin typeface="Courier New" panose="02070309020205020404" pitchFamily="49" charset="0"/>
+                <a:cs typeface="Courier New" panose="02070309020205020404" pitchFamily="49" charset="0"/>
+              </a:rPr>
+              <a:t>	"variables": { }, </a:t>
+            </a:r>
+          </a:p>
+          <a:p>
+            <a:pPr marL="0" indent="0">
+              <a:buNone/>
+            </a:pPr>
+            <a:r>
+              <a:rPr lang="nb-NO" sz="1600" dirty="0">
+                <a:latin typeface="Courier New" panose="02070309020205020404" pitchFamily="49" charset="0"/>
+                <a:cs typeface="Courier New" panose="02070309020205020404" pitchFamily="49" charset="0"/>
+              </a:rPr>
+              <a:t>	"functions": [ ], </a:t>
+            </a:r>
+          </a:p>
+          <a:p>
+            <a:pPr marL="0" indent="0">
+              <a:buNone/>
+            </a:pPr>
+            <a:r>
+              <a:rPr lang="nb-NO" sz="1600" dirty="0">
+                <a:latin typeface="Courier New" panose="02070309020205020404" pitchFamily="49" charset="0"/>
+                <a:cs typeface="Courier New" panose="02070309020205020404" pitchFamily="49" charset="0"/>
+              </a:rPr>
+              <a:t>	"resources": [ ], </a:t>
+            </a:r>
+          </a:p>
+          <a:p>
+            <a:pPr marL="0" indent="0">
+              <a:buNone/>
+            </a:pPr>
+            <a:r>
+              <a:rPr lang="nb-NO" sz="1600" dirty="0">
+                <a:latin typeface="Courier New" panose="02070309020205020404" pitchFamily="49" charset="0"/>
+                <a:cs typeface="Courier New" panose="02070309020205020404" pitchFamily="49" charset="0"/>
+              </a:rPr>
+              <a:t>	"outputs": { } </a:t>
+            </a:r>
+          </a:p>
+          <a:p>
+            <a:pPr marL="0" indent="0">
+              <a:buNone/>
+            </a:pPr>
+            <a:r>
+              <a:rPr lang="nb-NO" sz="1600" dirty="0">
+                <a:latin typeface="Courier New" panose="02070309020205020404" pitchFamily="49" charset="0"/>
+                <a:cs typeface="Courier New" panose="02070309020205020404" pitchFamily="49" charset="0"/>
+              </a:rPr>
+              <a:t>}</a:t>
+            </a:r>
+          </a:p>
+          <a:p>
+            <a:pPr marL="0" indent="0">
+              <a:buNone/>
+            </a:pPr>
+            <a:endParaRPr lang="nb-NO" sz="1600" dirty="0">
+              <a:latin typeface="Courier New" panose="02070309020205020404" pitchFamily="49" charset="0"/>
+              <a:cs typeface="Courier New" panose="02070309020205020404" pitchFamily="49" charset="0"/>
+            </a:endParaRPr>
+          </a:p>
+          <a:p>
+            <a:r>
+              <a:rPr lang="nb-NO" sz="2000" dirty="0">
+                <a:cs typeface="Courier New" panose="02070309020205020404" pitchFamily="49" charset="0"/>
                 <a:hlinkClick r:id="rId2"/>
               </a:rPr>
-              <a:t>https://github.com/Azure/azure-quickstart-templates</a:t>
-            </a:r>
-            <a:endParaRPr lang="nb-NO" dirty="0"/>
-          </a:p>
-          <a:p>
-            <a:endParaRPr lang="nb-NO" dirty="0"/>
-          </a:p>
-          <a:p>
-            <a:endParaRPr lang="nb-NO" dirty="0"/>
+              <a:t>https://docs.microsoft.com/en-us/azure/azure-resource-manager/resource-group-authoring-templates</a:t>
+            </a:r>
+            <a:endParaRPr lang="nb-NO" sz="2000" dirty="0">
+              <a:cs typeface="Courier New" panose="02070309020205020404" pitchFamily="49" charset="0"/>
+            </a:endParaRPr>
+          </a:p>
+          <a:p>
+            <a:endParaRPr lang="nb-NO" sz="2000" dirty="0">
+              <a:cs typeface="Courier New" panose="02070309020205020404" pitchFamily="49" charset="0"/>
+            </a:endParaRPr>
           </a:p>
         </p:txBody>
       </p:sp>
@@ -12436,7 +12643,7 @@
           <p:cNvPr id="3" name="Title 2">
             <a:extLst>
               <a:ext uri="{FF2B5EF4-FFF2-40B4-BE49-F238E27FC236}">
-                <a16:creationId xmlns:a16="http://schemas.microsoft.com/office/drawing/2014/main" id="{6DF109DB-F753-405D-BE67-C0E56871CE35}"/>
+                <a16:creationId xmlns:a16="http://schemas.microsoft.com/office/drawing/2014/main" id="{CCF727E1-176E-4A6B-8896-92949B40C349}"/>
               </a:ext>
             </a:extLst>
           </p:cNvPr>
@@ -12462,7 +12669,7 @@
             </a:r>
             <a:r>
               <a:rPr lang="nb-NO" dirty="0"/>
-              <a:t> ressurser</a:t>
+              <a:t> struktur </a:t>
             </a:r>
           </a:p>
         </p:txBody>
@@ -12470,7 +12677,7 @@
     </p:spTree>
     <p:extLst>
       <p:ext uri="{BB962C8B-B14F-4D97-AF65-F5344CB8AC3E}">
-        <p14:creationId xmlns:p14="http://schemas.microsoft.com/office/powerpoint/2010/main" val="72647585"/>
+        <p14:creationId xmlns:p14="http://schemas.microsoft.com/office/powerpoint/2010/main" val="1060301785"/>
       </p:ext>
     </p:extLst>
   </p:cSld>
@@ -12550,6 +12757,500 @@
     <p:extLst>
       <p:ext uri="{BB962C8B-B14F-4D97-AF65-F5344CB8AC3E}">
         <p14:creationId xmlns:p14="http://schemas.microsoft.com/office/powerpoint/2010/main" val="402582954"/>
+      </p:ext>
+    </p:extLst>
+  </p:cSld>
+  <p:clrMapOvr>
+    <a:masterClrMapping/>
+  </p:clrMapOvr>
+</p:sld>
+</file>
+
+<file path=ppt/slides/slide20.xml><?xml version="1.0" encoding="utf-8"?>
+<p:sld xmlns:a="http://schemas.openxmlformats.org/drawingml/2006/main" xmlns:r="http://schemas.openxmlformats.org/officeDocument/2006/relationships" xmlns:p="http://schemas.openxmlformats.org/presentationml/2006/main">
+  <p:cSld>
+    <p:spTree>
+      <p:nvGrpSpPr>
+        <p:cNvPr id="1" name=""/>
+        <p:cNvGrpSpPr/>
+        <p:nvPr/>
+      </p:nvGrpSpPr>
+      <p:grpSpPr>
+        <a:xfrm>
+          <a:off x="0" y="0"/>
+          <a:ext cx="0" cy="0"/>
+          <a:chOff x="0" y="0"/>
+          <a:chExt cx="0" cy="0"/>
+        </a:xfrm>
+      </p:grpSpPr>
+      <p:sp>
+        <p:nvSpPr>
+          <p:cNvPr id="2" name="Content Placeholder 1">
+            <a:extLst>
+              <a:ext uri="{FF2B5EF4-FFF2-40B4-BE49-F238E27FC236}">
+                <a16:creationId xmlns:a16="http://schemas.microsoft.com/office/drawing/2014/main" id="{7CC4BEF9-F6DD-42FF-97A0-6F9C5FDFA81E}"/>
+              </a:ext>
+            </a:extLst>
+          </p:cNvPr>
+          <p:cNvSpPr>
+            <a:spLocks noGrp="1"/>
+          </p:cNvSpPr>
+          <p:nvPr>
+            <p:ph idx="1"/>
+          </p:nvPr>
+        </p:nvSpPr>
+        <p:spPr/>
+        <p:txBody>
+          <a:bodyPr/>
+          <a:lstStyle/>
+          <a:p>
+            <a:endParaRPr lang="nb-NO" dirty="0"/>
+          </a:p>
+        </p:txBody>
+      </p:sp>
+      <p:sp>
+        <p:nvSpPr>
+          <p:cNvPr id="3" name="Title 2">
+            <a:extLst>
+              <a:ext uri="{FF2B5EF4-FFF2-40B4-BE49-F238E27FC236}">
+                <a16:creationId xmlns:a16="http://schemas.microsoft.com/office/drawing/2014/main" id="{13DF4BB5-FBD5-4F92-9DC3-594BFA209A2E}"/>
+              </a:ext>
+            </a:extLst>
+          </p:cNvPr>
+          <p:cNvSpPr>
+            <a:spLocks noGrp="1"/>
+          </p:cNvSpPr>
+          <p:nvPr>
+            <p:ph type="title"/>
+          </p:nvPr>
+        </p:nvSpPr>
+        <p:spPr/>
+        <p:txBody>
+          <a:bodyPr/>
+          <a:lstStyle/>
+          <a:p>
+            <a:r>
+              <a:rPr lang="nb-NO" dirty="0"/>
+              <a:t>ARM: Expression &amp; </a:t>
+            </a:r>
+            <a:r>
+              <a:rPr lang="nb-NO" dirty="0" err="1"/>
+              <a:t>functions</a:t>
+            </a:r>
+            <a:endParaRPr lang="nb-NO" dirty="0"/>
+          </a:p>
+        </p:txBody>
+      </p:sp>
+    </p:spTree>
+    <p:extLst>
+      <p:ext uri="{BB962C8B-B14F-4D97-AF65-F5344CB8AC3E}">
+        <p14:creationId xmlns:p14="http://schemas.microsoft.com/office/powerpoint/2010/main" val="211061650"/>
+      </p:ext>
+    </p:extLst>
+  </p:cSld>
+  <p:clrMapOvr>
+    <a:masterClrMapping/>
+  </p:clrMapOvr>
+</p:sld>
+</file>
+
+<file path=ppt/slides/slide21.xml><?xml version="1.0" encoding="utf-8"?>
+<p:sld xmlns:a="http://schemas.openxmlformats.org/drawingml/2006/main" xmlns:r="http://schemas.openxmlformats.org/officeDocument/2006/relationships" xmlns:p="http://schemas.openxmlformats.org/presentationml/2006/main">
+  <p:cSld>
+    <p:spTree>
+      <p:nvGrpSpPr>
+        <p:cNvPr id="1" name=""/>
+        <p:cNvGrpSpPr/>
+        <p:nvPr/>
+      </p:nvGrpSpPr>
+      <p:grpSpPr>
+        <a:xfrm>
+          <a:off x="0" y="0"/>
+          <a:ext cx="0" cy="0"/>
+          <a:chOff x="0" y="0"/>
+          <a:chExt cx="0" cy="0"/>
+        </a:xfrm>
+      </p:grpSpPr>
+      <p:sp>
+        <p:nvSpPr>
+          <p:cNvPr id="2" name="Content Placeholder 1">
+            <a:extLst>
+              <a:ext uri="{FF2B5EF4-FFF2-40B4-BE49-F238E27FC236}">
+                <a16:creationId xmlns:a16="http://schemas.microsoft.com/office/drawing/2014/main" id="{9ACC7AD5-9759-4794-8447-7D74D11ADA52}"/>
+              </a:ext>
+            </a:extLst>
+          </p:cNvPr>
+          <p:cNvSpPr>
+            <a:spLocks noGrp="1"/>
+          </p:cNvSpPr>
+          <p:nvPr>
+            <p:ph idx="1"/>
+          </p:nvPr>
+        </p:nvSpPr>
+        <p:spPr/>
+        <p:txBody>
+          <a:bodyPr/>
+          <a:lstStyle/>
+          <a:p>
+            <a:r>
+              <a:rPr lang="nb-NO" dirty="0">
+                <a:hlinkClick r:id="rId2"/>
+              </a:rPr>
+              <a:t>https://github.com/Azure/azure-quickstart-templates</a:t>
+            </a:r>
+            <a:endParaRPr lang="nb-NO" dirty="0"/>
+          </a:p>
+          <a:p>
+            <a:endParaRPr lang="nb-NO" dirty="0"/>
+          </a:p>
+          <a:p>
+            <a:endParaRPr lang="nb-NO" dirty="0"/>
+          </a:p>
+        </p:txBody>
+      </p:sp>
+      <p:sp>
+        <p:nvSpPr>
+          <p:cNvPr id="3" name="Title 2">
+            <a:extLst>
+              <a:ext uri="{FF2B5EF4-FFF2-40B4-BE49-F238E27FC236}">
+                <a16:creationId xmlns:a16="http://schemas.microsoft.com/office/drawing/2014/main" id="{6DF109DB-F753-405D-BE67-C0E56871CE35}"/>
+              </a:ext>
+            </a:extLst>
+          </p:cNvPr>
+          <p:cNvSpPr>
+            <a:spLocks noGrp="1"/>
+          </p:cNvSpPr>
+          <p:nvPr>
+            <p:ph type="title"/>
+          </p:nvPr>
+        </p:nvSpPr>
+        <p:spPr/>
+        <p:txBody>
+          <a:bodyPr/>
+          <a:lstStyle/>
+          <a:p>
+            <a:r>
+              <a:rPr lang="nb-NO" dirty="0"/>
+              <a:t>ARM-</a:t>
+            </a:r>
+            <a:r>
+              <a:rPr lang="nb-NO" dirty="0" err="1"/>
+              <a:t>templates</a:t>
+            </a:r>
+            <a:r>
+              <a:rPr lang="nb-NO" dirty="0"/>
+              <a:t> ressurser</a:t>
+            </a:r>
+          </a:p>
+        </p:txBody>
+      </p:sp>
+    </p:spTree>
+    <p:extLst>
+      <p:ext uri="{BB962C8B-B14F-4D97-AF65-F5344CB8AC3E}">
+        <p14:creationId xmlns:p14="http://schemas.microsoft.com/office/powerpoint/2010/main" val="72647585"/>
+      </p:ext>
+    </p:extLst>
+  </p:cSld>
+  <p:clrMapOvr>
+    <a:masterClrMapping/>
+  </p:clrMapOvr>
+</p:sld>
+</file>
+
+<file path=ppt/slides/slide22.xml><?xml version="1.0" encoding="utf-8"?>
+<p:sld xmlns:a="http://schemas.openxmlformats.org/drawingml/2006/main" xmlns:r="http://schemas.openxmlformats.org/officeDocument/2006/relationships" xmlns:p="http://schemas.openxmlformats.org/presentationml/2006/main">
+  <p:cSld>
+    <p:spTree>
+      <p:nvGrpSpPr>
+        <p:cNvPr id="1" name=""/>
+        <p:cNvGrpSpPr/>
+        <p:nvPr/>
+      </p:nvGrpSpPr>
+      <p:grpSpPr>
+        <a:xfrm>
+          <a:off x="0" y="0"/>
+          <a:ext cx="0" cy="0"/>
+          <a:chOff x="0" y="0"/>
+          <a:chExt cx="0" cy="0"/>
+        </a:xfrm>
+      </p:grpSpPr>
+      <p:sp>
+        <p:nvSpPr>
+          <p:cNvPr id="2" name="Content Placeholder 1">
+            <a:extLst>
+              <a:ext uri="{FF2B5EF4-FFF2-40B4-BE49-F238E27FC236}">
+                <a16:creationId xmlns:a16="http://schemas.microsoft.com/office/drawing/2014/main" id="{3032C2CA-FC99-4959-9790-0815B0B765B5}"/>
+              </a:ext>
+            </a:extLst>
+          </p:cNvPr>
+          <p:cNvSpPr>
+            <a:spLocks noGrp="1"/>
+          </p:cNvSpPr>
+          <p:nvPr>
+            <p:ph idx="1"/>
+          </p:nvPr>
+        </p:nvSpPr>
+        <p:spPr/>
+        <p:txBody>
+          <a:bodyPr/>
+          <a:lstStyle/>
+          <a:p>
+            <a:endParaRPr lang="nb-NO"/>
+          </a:p>
+        </p:txBody>
+      </p:sp>
+      <p:sp>
+        <p:nvSpPr>
+          <p:cNvPr id="3" name="Title 2">
+            <a:extLst>
+              <a:ext uri="{FF2B5EF4-FFF2-40B4-BE49-F238E27FC236}">
+                <a16:creationId xmlns:a16="http://schemas.microsoft.com/office/drawing/2014/main" id="{024FB255-2490-431B-9E24-7266B29B930A}"/>
+              </a:ext>
+            </a:extLst>
+          </p:cNvPr>
+          <p:cNvSpPr>
+            <a:spLocks noGrp="1"/>
+          </p:cNvSpPr>
+          <p:nvPr>
+            <p:ph type="title"/>
+          </p:nvPr>
+        </p:nvSpPr>
+        <p:spPr/>
+        <p:txBody>
+          <a:bodyPr/>
+          <a:lstStyle/>
+          <a:p>
+            <a:r>
+              <a:rPr lang="nb-NO" dirty="0"/>
+              <a:t>ARM-</a:t>
+            </a:r>
+            <a:r>
+              <a:rPr lang="nb-NO" dirty="0" err="1"/>
+              <a:t>template</a:t>
+            </a:r>
+            <a:endParaRPr lang="nb-NO" dirty="0"/>
+          </a:p>
+        </p:txBody>
+      </p:sp>
+    </p:spTree>
+    <p:extLst>
+      <p:ext uri="{BB962C8B-B14F-4D97-AF65-F5344CB8AC3E}">
+        <p14:creationId xmlns:p14="http://schemas.microsoft.com/office/powerpoint/2010/main" val="597641437"/>
+      </p:ext>
+    </p:extLst>
+  </p:cSld>
+  <p:clrMapOvr>
+    <a:masterClrMapping/>
+  </p:clrMapOvr>
+</p:sld>
+</file>
+
+<file path=ppt/slides/slide23.xml><?xml version="1.0" encoding="utf-8"?>
+<p:sld xmlns:a="http://schemas.openxmlformats.org/drawingml/2006/main" xmlns:r="http://schemas.openxmlformats.org/officeDocument/2006/relationships" xmlns:p="http://schemas.openxmlformats.org/presentationml/2006/main">
+  <p:cSld>
+    <p:spTree>
+      <p:nvGrpSpPr>
+        <p:cNvPr id="1" name=""/>
+        <p:cNvGrpSpPr/>
+        <p:nvPr/>
+      </p:nvGrpSpPr>
+      <p:grpSpPr>
+        <a:xfrm>
+          <a:off x="0" y="0"/>
+          <a:ext cx="0" cy="0"/>
+          <a:chOff x="0" y="0"/>
+          <a:chExt cx="0" cy="0"/>
+        </a:xfrm>
+      </p:grpSpPr>
+      <p:sp>
+        <p:nvSpPr>
+          <p:cNvPr id="2" name="Content Placeholder 1">
+            <a:extLst>
+              <a:ext uri="{FF2B5EF4-FFF2-40B4-BE49-F238E27FC236}">
+                <a16:creationId xmlns:a16="http://schemas.microsoft.com/office/drawing/2014/main" id="{F461989C-9BAB-4C09-B1F5-654ECA3A52D3}"/>
+              </a:ext>
+            </a:extLst>
+          </p:cNvPr>
+          <p:cNvSpPr>
+            <a:spLocks noGrp="1"/>
+          </p:cNvSpPr>
+          <p:nvPr>
+            <p:ph idx="1"/>
+          </p:nvPr>
+        </p:nvSpPr>
+        <p:spPr/>
+        <p:txBody>
+          <a:bodyPr/>
+          <a:lstStyle/>
+          <a:p>
+            <a:r>
+              <a:rPr lang="nb-NO" dirty="0"/>
+              <a:t>Portal</a:t>
+            </a:r>
+          </a:p>
+          <a:p>
+            <a:endParaRPr lang="nb-NO" dirty="0"/>
+          </a:p>
+          <a:p>
+            <a:r>
+              <a:rPr lang="nb-NO" dirty="0" err="1"/>
+              <a:t>Powershell</a:t>
+            </a:r>
+            <a:endParaRPr lang="nb-NO" dirty="0"/>
+          </a:p>
+          <a:p>
+            <a:endParaRPr lang="nb-NO" dirty="0"/>
+          </a:p>
+          <a:p>
+            <a:r>
+              <a:rPr lang="nb-NO" dirty="0"/>
+              <a:t>Visual Studio</a:t>
+            </a:r>
+          </a:p>
+          <a:p>
+            <a:endParaRPr lang="nb-NO" dirty="0"/>
+          </a:p>
+          <a:p>
+            <a:r>
+              <a:rPr lang="nb-NO" dirty="0" err="1"/>
+              <a:t>Azure</a:t>
+            </a:r>
+            <a:r>
+              <a:rPr lang="nb-NO" dirty="0"/>
+              <a:t> </a:t>
+            </a:r>
+            <a:r>
+              <a:rPr lang="nb-NO" dirty="0" err="1"/>
+              <a:t>DevOps</a:t>
+            </a:r>
+            <a:endParaRPr lang="nb-NO" dirty="0"/>
+          </a:p>
+        </p:txBody>
+      </p:sp>
+      <p:sp>
+        <p:nvSpPr>
+          <p:cNvPr id="3" name="Title 2">
+            <a:extLst>
+              <a:ext uri="{FF2B5EF4-FFF2-40B4-BE49-F238E27FC236}">
+                <a16:creationId xmlns:a16="http://schemas.microsoft.com/office/drawing/2014/main" id="{EF3AEE9B-393F-4223-A7F7-8C19489DFB77}"/>
+              </a:ext>
+            </a:extLst>
+          </p:cNvPr>
+          <p:cNvSpPr>
+            <a:spLocks noGrp="1"/>
+          </p:cNvSpPr>
+          <p:nvPr>
+            <p:ph type="title"/>
+          </p:nvPr>
+        </p:nvSpPr>
+        <p:spPr/>
+        <p:txBody>
+          <a:bodyPr/>
+          <a:lstStyle/>
+          <a:p>
+            <a:r>
+              <a:rPr lang="nb-NO" dirty="0"/>
+              <a:t>ARM: Deployment</a:t>
+            </a:r>
+          </a:p>
+        </p:txBody>
+      </p:sp>
+    </p:spTree>
+    <p:extLst>
+      <p:ext uri="{BB962C8B-B14F-4D97-AF65-F5344CB8AC3E}">
+        <p14:creationId xmlns:p14="http://schemas.microsoft.com/office/powerpoint/2010/main" val="3936335324"/>
+      </p:ext>
+    </p:extLst>
+  </p:cSld>
+  <p:clrMapOvr>
+    <a:masterClrMapping/>
+  </p:clrMapOvr>
+</p:sld>
+</file>
+
+<file path=ppt/slides/slide24.xml><?xml version="1.0" encoding="utf-8"?>
+<p:sld xmlns:a="http://schemas.openxmlformats.org/drawingml/2006/main" xmlns:r="http://schemas.openxmlformats.org/officeDocument/2006/relationships" xmlns:p="http://schemas.openxmlformats.org/presentationml/2006/main">
+  <p:cSld>
+    <p:spTree>
+      <p:nvGrpSpPr>
+        <p:cNvPr id="1" name=""/>
+        <p:cNvGrpSpPr/>
+        <p:nvPr/>
+      </p:nvGrpSpPr>
+      <p:grpSpPr>
+        <a:xfrm>
+          <a:off x="0" y="0"/>
+          <a:ext cx="0" cy="0"/>
+          <a:chOff x="0" y="0"/>
+          <a:chExt cx="0" cy="0"/>
+        </a:xfrm>
+      </p:grpSpPr>
+      <p:sp>
+        <p:nvSpPr>
+          <p:cNvPr id="2" name="Content Placeholder 1">
+            <a:extLst>
+              <a:ext uri="{FF2B5EF4-FFF2-40B4-BE49-F238E27FC236}">
+                <a16:creationId xmlns:a16="http://schemas.microsoft.com/office/drawing/2014/main" id="{01C6EDC8-A815-4F7B-95FE-5E19DA0863EE}"/>
+              </a:ext>
+            </a:extLst>
+          </p:cNvPr>
+          <p:cNvSpPr>
+            <a:spLocks noGrp="1"/>
+          </p:cNvSpPr>
+          <p:nvPr>
+            <p:ph idx="1"/>
+          </p:nvPr>
+        </p:nvSpPr>
+        <p:spPr/>
+        <p:txBody>
+          <a:bodyPr/>
+          <a:lstStyle/>
+          <a:p>
+            <a:r>
+              <a:rPr lang="nb-NO" dirty="0"/>
+              <a:t>Portal</a:t>
+            </a:r>
+          </a:p>
+          <a:p>
+            <a:r>
+              <a:rPr lang="nb-NO" dirty="0"/>
+              <a:t>Visual Studio</a:t>
+            </a:r>
+          </a:p>
+        </p:txBody>
+      </p:sp>
+      <p:sp>
+        <p:nvSpPr>
+          <p:cNvPr id="3" name="Title 2">
+            <a:extLst>
+              <a:ext uri="{FF2B5EF4-FFF2-40B4-BE49-F238E27FC236}">
+                <a16:creationId xmlns:a16="http://schemas.microsoft.com/office/drawing/2014/main" id="{9616A1BB-BF26-4AFE-905C-E67197F226A0}"/>
+              </a:ext>
+            </a:extLst>
+          </p:cNvPr>
+          <p:cNvSpPr>
+            <a:spLocks noGrp="1"/>
+          </p:cNvSpPr>
+          <p:nvPr>
+            <p:ph type="title"/>
+          </p:nvPr>
+        </p:nvSpPr>
+        <p:spPr/>
+        <p:txBody>
+          <a:bodyPr/>
+          <a:lstStyle/>
+          <a:p>
+            <a:r>
+              <a:rPr lang="nb-NO" dirty="0"/>
+              <a:t>ARM: Demo</a:t>
+            </a:r>
+          </a:p>
+        </p:txBody>
+      </p:sp>
+    </p:spTree>
+    <p:extLst>
+      <p:ext uri="{BB962C8B-B14F-4D97-AF65-F5344CB8AC3E}">
+        <p14:creationId xmlns:p14="http://schemas.microsoft.com/office/powerpoint/2010/main" val="2607850202"/>
       </p:ext>
     </p:extLst>
   </p:cSld>
@@ -14829,15 +15530,6 @@
 </file>
 
 <file path=customXml/item1.xml><?xml version="1.0" encoding="utf-8"?>
-<?mso-contentType ?>
-<FormTemplates xmlns="http://schemas.microsoft.com/sharepoint/v3/contenttype/forms">
-  <Display>DocumentLibraryForm</Display>
-  <Edit>DocumentLibraryForm</Edit>
-  <New>DocumentLibraryForm</New>
-</FormTemplates>
-</file>
-
-<file path=customXml/item2.xml><?xml version="1.0" encoding="utf-8"?>
 <ct:contentTypeSchema xmlns:ct="http://schemas.microsoft.com/office/2006/metadata/contentType" xmlns:ma="http://schemas.microsoft.com/office/2006/metadata/properties/metaAttributes" ct:_="" ma:_="" ma:contentTypeName="Document" ma:contentTypeID="0x0101005D3CE5A03C88D04F8FE0CC8617320B29" ma:contentTypeVersion="2" ma:contentTypeDescription="Create a new document." ma:contentTypeScope="" ma:versionID="23c508fadb5761cd27fdc7efc393bb78">
   <xsd:schema xmlns:xsd="http://www.w3.org/2001/XMLSchema" xmlns:xs="http://www.w3.org/2001/XMLSchema" xmlns:p="http://schemas.microsoft.com/office/2006/metadata/properties" xmlns:ns2="323bcd62-7d27-4513-9df1-9bc20f03554b" targetNamespace="http://schemas.microsoft.com/office/2006/metadata/properties" ma:root="true" ma:fieldsID="4120a6a9df7c81c23a4d646d2ccf1355" ns2:_="">
     <xsd:import namespace="323bcd62-7d27-4513-9df1-9bc20f03554b"/>
@@ -14969,6 +15661,15 @@
 </ct:contentTypeSchema>
 </file>
 
+<file path=customXml/item2.xml><?xml version="1.0" encoding="utf-8"?>
+<?mso-contentType ?>
+<FormTemplates xmlns="http://schemas.microsoft.com/sharepoint/v3/contenttype/forms">
+  <Display>DocumentLibraryForm</Display>
+  <Edit>DocumentLibraryForm</Edit>
+  <New>DocumentLibraryForm</New>
+</FormTemplates>
+</file>
+
 <file path=customXml/item3.xml><?xml version="1.0" encoding="utf-8"?>
 <p:properties xmlns:p="http://schemas.microsoft.com/office/2006/metadata/properties" xmlns:xsi="http://www.w3.org/2001/XMLSchema-instance" xmlns:pc="http://schemas.microsoft.com/office/infopath/2007/PartnerControls">
   <documentManagement/>
@@ -14976,14 +15677,6 @@
 </file>
 
 <file path=customXml/itemProps1.xml><?xml version="1.0" encoding="utf-8"?>
-<ds:datastoreItem xmlns:ds="http://schemas.openxmlformats.org/officeDocument/2006/customXml" ds:itemID="{BB82CC63-55FC-4D22-9ED3-DB88AF6228E1}">
-  <ds:schemaRefs>
-    <ds:schemaRef ds:uri="http://schemas.microsoft.com/sharepoint/v3/contenttype/forms"/>
-  </ds:schemaRefs>
-</ds:datastoreItem>
-</file>
-
-<file path=customXml/itemProps2.xml><?xml version="1.0" encoding="utf-8"?>
 <ds:datastoreItem xmlns:ds="http://schemas.openxmlformats.org/officeDocument/2006/customXml" ds:itemID="{0377EA4A-9170-43AD-A052-6EABC948F73F}">
   <ds:schemaRefs>
     <ds:schemaRef ds:uri="http://schemas.microsoft.com/office/2006/metadata/contentType"/>
@@ -14997,6 +15690,14 @@
     <ds:schemaRef ds:uri="http://purl.org/dc/elements/1.1/"/>
     <ds:schemaRef ds:uri="http://purl.org/dc/terms/"/>
     <ds:schemaRef ds:uri="http://schemas.microsoft.com/internal/obd"/>
+  </ds:schemaRefs>
+</ds:datastoreItem>
+</file>
+
+<file path=customXml/itemProps2.xml><?xml version="1.0" encoding="utf-8"?>
+<ds:datastoreItem xmlns:ds="http://schemas.openxmlformats.org/officeDocument/2006/customXml" ds:itemID="{BB82CC63-55FC-4D22-9ED3-DB88AF6228E1}">
+  <ds:schemaRefs>
+    <ds:schemaRef ds:uri="http://schemas.microsoft.com/sharepoint/v3/contenttype/forms"/>
   </ds:schemaRefs>
 </ds:datastoreItem>
 </file>

</xml_diff>

<commit_message>
Oppdaterte templates med app insights
</commit_message>
<xml_diff>
--- a/Workshop_2/Presentasjon/Azureskolen-Workshop#2.pptx
+++ b/Workshop_2/Presentasjon/Azureskolen-Workshop#2.pptx
@@ -599,7 +599,7 @@
           <a:p>
             <a:fld id="{54C52192-B826-4AE0-9CD6-BEA9467D12B3}" type="datetimeFigureOut">
               <a:rPr lang="nb-NO" smtClean="0"/>
-              <a:t>24.01.2019</a:t>
+              <a:t>25.01.2019</a:t>
             </a:fld>
             <a:endParaRPr lang="nb-NO"/>
           </a:p>
@@ -764,7 +764,7 @@
           <a:p>
             <a:fld id="{2696BCB2-2760-41B1-A1BE-7886EF110FCB}" type="datetimeFigureOut">
               <a:rPr lang="nb-NO" smtClean="0"/>
-              <a:t>24.01.2019</a:t>
+              <a:t>25.01.2019</a:t>
             </a:fld>
             <a:endParaRPr lang="nb-NO"/>
           </a:p>
@@ -15530,6 +15530,15 @@
 </file>
 
 <file path=customXml/item1.xml><?xml version="1.0" encoding="utf-8"?>
+<?mso-contentType ?>
+<FormTemplates xmlns="http://schemas.microsoft.com/sharepoint/v3/contenttype/forms">
+  <Display>DocumentLibraryForm</Display>
+  <Edit>DocumentLibraryForm</Edit>
+  <New>DocumentLibraryForm</New>
+</FormTemplates>
+</file>
+
+<file path=customXml/item2.xml><?xml version="1.0" encoding="utf-8"?>
 <ct:contentTypeSchema xmlns:ct="http://schemas.microsoft.com/office/2006/metadata/contentType" xmlns:ma="http://schemas.microsoft.com/office/2006/metadata/properties/metaAttributes" ct:_="" ma:_="" ma:contentTypeName="Document" ma:contentTypeID="0x0101005D3CE5A03C88D04F8FE0CC8617320B29" ma:contentTypeVersion="2" ma:contentTypeDescription="Create a new document." ma:contentTypeScope="" ma:versionID="23c508fadb5761cd27fdc7efc393bb78">
   <xsd:schema xmlns:xsd="http://www.w3.org/2001/XMLSchema" xmlns:xs="http://www.w3.org/2001/XMLSchema" xmlns:p="http://schemas.microsoft.com/office/2006/metadata/properties" xmlns:ns2="323bcd62-7d27-4513-9df1-9bc20f03554b" targetNamespace="http://schemas.microsoft.com/office/2006/metadata/properties" ma:root="true" ma:fieldsID="4120a6a9df7c81c23a4d646d2ccf1355" ns2:_="">
     <xsd:import namespace="323bcd62-7d27-4513-9df1-9bc20f03554b"/>
@@ -15661,15 +15670,6 @@
 </ct:contentTypeSchema>
 </file>
 
-<file path=customXml/item2.xml><?xml version="1.0" encoding="utf-8"?>
-<?mso-contentType ?>
-<FormTemplates xmlns="http://schemas.microsoft.com/sharepoint/v3/contenttype/forms">
-  <Display>DocumentLibraryForm</Display>
-  <Edit>DocumentLibraryForm</Edit>
-  <New>DocumentLibraryForm</New>
-</FormTemplates>
-</file>
-
 <file path=customXml/item3.xml><?xml version="1.0" encoding="utf-8"?>
 <p:properties xmlns:p="http://schemas.microsoft.com/office/2006/metadata/properties" xmlns:xsi="http://www.w3.org/2001/XMLSchema-instance" xmlns:pc="http://schemas.microsoft.com/office/infopath/2007/PartnerControls">
   <documentManagement/>
@@ -15677,6 +15677,14 @@
 </file>
 
 <file path=customXml/itemProps1.xml><?xml version="1.0" encoding="utf-8"?>
+<ds:datastoreItem xmlns:ds="http://schemas.openxmlformats.org/officeDocument/2006/customXml" ds:itemID="{BB82CC63-55FC-4D22-9ED3-DB88AF6228E1}">
+  <ds:schemaRefs>
+    <ds:schemaRef ds:uri="http://schemas.microsoft.com/sharepoint/v3/contenttype/forms"/>
+  </ds:schemaRefs>
+</ds:datastoreItem>
+</file>
+
+<file path=customXml/itemProps2.xml><?xml version="1.0" encoding="utf-8"?>
 <ds:datastoreItem xmlns:ds="http://schemas.openxmlformats.org/officeDocument/2006/customXml" ds:itemID="{0377EA4A-9170-43AD-A052-6EABC948F73F}">
   <ds:schemaRefs>
     <ds:schemaRef ds:uri="http://schemas.microsoft.com/office/2006/metadata/contentType"/>
@@ -15690,14 +15698,6 @@
     <ds:schemaRef ds:uri="http://purl.org/dc/elements/1.1/"/>
     <ds:schemaRef ds:uri="http://purl.org/dc/terms/"/>
     <ds:schemaRef ds:uri="http://schemas.microsoft.com/internal/obd"/>
-  </ds:schemaRefs>
-</ds:datastoreItem>
-</file>
-
-<file path=customXml/itemProps2.xml><?xml version="1.0" encoding="utf-8"?>
-<ds:datastoreItem xmlns:ds="http://schemas.openxmlformats.org/officeDocument/2006/customXml" ds:itemID="{BB82CC63-55FC-4D22-9ED3-DB88AF6228E1}">
-  <ds:schemaRefs>
-    <ds:schemaRef ds:uri="http://schemas.microsoft.com/sharepoint/v3/contenttype/forms"/>
   </ds:schemaRefs>
 </ds:datastoreItem>
 </file>

</xml_diff>

<commit_message>
La til tekst på leksjon 2
</commit_message>
<xml_diff>
--- a/Workshop_2/Presentasjon/Azureskolen-Workshop#2.pptx
+++ b/Workshop_2/Presentasjon/Azureskolen-Workshop#2.pptx
@@ -7,10 +7,10 @@
     <p:sldMasterId id="2147483705" r:id="rId6"/>
   </p:sldMasterIdLst>
   <p:notesMasterIdLst>
-    <p:notesMasterId r:id="rId33"/>
+    <p:notesMasterId r:id="rId34"/>
   </p:notesMasterIdLst>
   <p:handoutMasterIdLst>
-    <p:handoutMasterId r:id="rId34"/>
+    <p:handoutMasterId r:id="rId35"/>
   </p:handoutMasterIdLst>
   <p:sldIdLst>
     <p:sldId id="256" r:id="rId7"/>
@@ -36,9 +36,10 @@
     <p:sldId id="262" r:id="rId27"/>
     <p:sldId id="276" r:id="rId28"/>
     <p:sldId id="263" r:id="rId29"/>
-    <p:sldId id="279" r:id="rId30"/>
-    <p:sldId id="277" r:id="rId31"/>
-    <p:sldId id="280" r:id="rId32"/>
+    <p:sldId id="277" r:id="rId30"/>
+    <p:sldId id="280" r:id="rId31"/>
+    <p:sldId id="285" r:id="rId32"/>
+    <p:sldId id="286" r:id="rId33"/>
   </p:sldIdLst>
   <p:sldSz cx="12192000" cy="6858000"/>
   <p:notesSz cx="6858000" cy="9144000"/>
@@ -1365,7 +1366,7 @@
           <a:p>
             <a:fld id="{180377DB-C4B0-49B2-8838-0F01BA83B7C4}" type="slidenum">
               <a:rPr lang="nb-NO" smtClean="0"/>
-              <a:t>26</a:t>
+              <a:t>25</a:t>
             </a:fld>
             <a:endParaRPr lang="nb-NO"/>
           </a:p>
@@ -12224,7 +12225,6 @@
               <a:rPr lang="nb-NO" dirty="0"/>
               <a:t>Læring og eksperimentering</a:t>
             </a:r>
-            <a:endParaRPr lang="nb-NO" dirty="0"/>
           </a:p>
         </p:txBody>
       </p:sp>
@@ -12801,12 +12801,20 @@
             <p:ph type="title"/>
           </p:nvPr>
         </p:nvSpPr>
-        <p:spPr/>
+        <p:spPr>
+          <a:xfrm>
+            <a:off x="1328585" y="376848"/>
+            <a:ext cx="10078991" cy="1325563"/>
+          </a:xfrm>
+        </p:spPr>
         <p:txBody>
           <a:bodyPr/>
           <a:lstStyle/>
           <a:p>
-            <a:endParaRPr lang="nb-NO" dirty="0"/>
+            <a:r>
+              <a:rPr lang="nb-NO" dirty="0"/>
+              <a:t>Demo og leksjon 1</a:t>
+            </a:r>
           </a:p>
         </p:txBody>
       </p:sp>
@@ -13656,6 +13664,15 @@
           <a:bodyPr/>
           <a:lstStyle/>
           <a:p>
+            <a:r>
+              <a:rPr lang="nb-NO" dirty="0">
+                <a:hlinkClick r:id="rId2"/>
+              </a:rPr>
+              <a:t>https://docs.microsoft.com/en-us/azure/azure-resource-manager/resource-group-template-functions</a:t>
+            </a:r>
+            <a:endParaRPr lang="nb-NO" dirty="0"/>
+          </a:p>
+          <a:p>
             <a:endParaRPr lang="nb-NO" dirty="0"/>
           </a:p>
         </p:txBody>
@@ -13676,7 +13693,12 @@
             <p:ph type="title"/>
           </p:nvPr>
         </p:nvSpPr>
-        <p:spPr/>
+        <p:spPr>
+          <a:xfrm>
+            <a:off x="1234800" y="403225"/>
+            <a:ext cx="10078991" cy="1325563"/>
+          </a:xfrm>
+        </p:spPr>
         <p:txBody>
           <a:bodyPr/>
           <a:lstStyle/>
@@ -13831,7 +13853,7 @@
           <p:cNvPr id="2" name="Content Placeholder 1">
             <a:extLst>
               <a:ext uri="{FF2B5EF4-FFF2-40B4-BE49-F238E27FC236}">
-                <a16:creationId xmlns:a16="http://schemas.microsoft.com/office/drawing/2014/main" id="{3032C2CA-FC99-4959-9790-0815B0B765B5}"/>
+                <a16:creationId xmlns:a16="http://schemas.microsoft.com/office/drawing/2014/main" id="{F461989C-9BAB-4C09-B1F5-654ECA3A52D3}"/>
               </a:ext>
             </a:extLst>
           </p:cNvPr>
@@ -13847,7 +13869,47 @@
           <a:bodyPr/>
           <a:lstStyle/>
           <a:p>
-            <a:endParaRPr lang="nb-NO"/>
+            <a:r>
+              <a:rPr lang="nb-NO" dirty="0"/>
+              <a:t>Portal</a:t>
+            </a:r>
+          </a:p>
+          <a:p>
+            <a:endParaRPr lang="nb-NO" dirty="0"/>
+          </a:p>
+          <a:p>
+            <a:r>
+              <a:rPr lang="nb-NO" dirty="0" err="1"/>
+              <a:t>Powershell</a:t>
+            </a:r>
+            <a:endParaRPr lang="nb-NO" dirty="0"/>
+          </a:p>
+          <a:p>
+            <a:endParaRPr lang="nb-NO" dirty="0"/>
+          </a:p>
+          <a:p>
+            <a:r>
+              <a:rPr lang="nb-NO" dirty="0"/>
+              <a:t>Visual Studio</a:t>
+            </a:r>
+          </a:p>
+          <a:p>
+            <a:endParaRPr lang="nb-NO" dirty="0"/>
+          </a:p>
+          <a:p>
+            <a:r>
+              <a:rPr lang="nb-NO" dirty="0" err="1"/>
+              <a:t>Azure</a:t>
+            </a:r>
+            <a:r>
+              <a:rPr lang="nb-NO" dirty="0"/>
+              <a:t> </a:t>
+            </a:r>
+            <a:r>
+              <a:rPr lang="nb-NO" dirty="0" err="1"/>
+              <a:t>DevOps</a:t>
+            </a:r>
+            <a:endParaRPr lang="nb-NO" dirty="0"/>
           </a:p>
         </p:txBody>
       </p:sp>
@@ -13856,7 +13918,7 @@
           <p:cNvPr id="3" name="Title 2">
             <a:extLst>
               <a:ext uri="{FF2B5EF4-FFF2-40B4-BE49-F238E27FC236}">
-                <a16:creationId xmlns:a16="http://schemas.microsoft.com/office/drawing/2014/main" id="{024FB255-2490-431B-9E24-7266B29B930A}"/>
+                <a16:creationId xmlns:a16="http://schemas.microsoft.com/office/drawing/2014/main" id="{EF3AEE9B-393F-4223-A7F7-8C19489DFB77}"/>
               </a:ext>
             </a:extLst>
           </p:cNvPr>
@@ -13874,20 +13936,15 @@
           <a:p>
             <a:r>
               <a:rPr lang="nb-NO" dirty="0"/>
-              <a:t>ARM-</a:t>
-            </a:r>
-            <a:r>
-              <a:rPr lang="nb-NO" dirty="0" err="1"/>
-              <a:t>template</a:t>
-            </a:r>
-            <a:endParaRPr lang="nb-NO" dirty="0"/>
+              <a:t>ARM: Deployment</a:t>
+            </a:r>
           </a:p>
         </p:txBody>
       </p:sp>
     </p:spTree>
     <p:extLst>
       <p:ext uri="{BB962C8B-B14F-4D97-AF65-F5344CB8AC3E}">
-        <p14:creationId xmlns:p14="http://schemas.microsoft.com/office/powerpoint/2010/main" val="597641437"/>
+        <p14:creationId xmlns:p14="http://schemas.microsoft.com/office/powerpoint/2010/main" val="3936335324"/>
       </p:ext>
     </p:extLst>
   </p:cSld>
@@ -13919,7 +13976,7 @@
           <p:cNvPr id="2" name="Content Placeholder 1">
             <a:extLst>
               <a:ext uri="{FF2B5EF4-FFF2-40B4-BE49-F238E27FC236}">
-                <a16:creationId xmlns:a16="http://schemas.microsoft.com/office/drawing/2014/main" id="{F461989C-9BAB-4C09-B1F5-654ECA3A52D3}"/>
+                <a16:creationId xmlns:a16="http://schemas.microsoft.com/office/drawing/2014/main" id="{01C6EDC8-A815-4F7B-95FE-5E19DA0863EE}"/>
               </a:ext>
             </a:extLst>
           </p:cNvPr>
@@ -13941,41 +13998,10 @@
             </a:r>
           </a:p>
           <a:p>
-            <a:endParaRPr lang="nb-NO" dirty="0"/>
-          </a:p>
-          <a:p>
-            <a:r>
-              <a:rPr lang="nb-NO" dirty="0" err="1"/>
-              <a:t>Powershell</a:t>
-            </a:r>
-            <a:endParaRPr lang="nb-NO" dirty="0"/>
-          </a:p>
-          <a:p>
-            <a:endParaRPr lang="nb-NO" dirty="0"/>
-          </a:p>
-          <a:p>
             <a:r>
               <a:rPr lang="nb-NO" dirty="0"/>
               <a:t>Visual Studio</a:t>
             </a:r>
-          </a:p>
-          <a:p>
-            <a:endParaRPr lang="nb-NO" dirty="0"/>
-          </a:p>
-          <a:p>
-            <a:r>
-              <a:rPr lang="nb-NO" dirty="0" err="1"/>
-              <a:t>Azure</a:t>
-            </a:r>
-            <a:r>
-              <a:rPr lang="nb-NO" dirty="0"/>
-              <a:t> </a:t>
-            </a:r>
-            <a:r>
-              <a:rPr lang="nb-NO" dirty="0" err="1"/>
-              <a:t>DevOps</a:t>
-            </a:r>
-            <a:endParaRPr lang="nb-NO" dirty="0"/>
           </a:p>
         </p:txBody>
       </p:sp>
@@ -13984,7 +14010,7 @@
           <p:cNvPr id="3" name="Title 2">
             <a:extLst>
               <a:ext uri="{FF2B5EF4-FFF2-40B4-BE49-F238E27FC236}">
-                <a16:creationId xmlns:a16="http://schemas.microsoft.com/office/drawing/2014/main" id="{EF3AEE9B-393F-4223-A7F7-8C19489DFB77}"/>
+                <a16:creationId xmlns:a16="http://schemas.microsoft.com/office/drawing/2014/main" id="{9616A1BB-BF26-4AFE-905C-E67197F226A0}"/>
               </a:ext>
             </a:extLst>
           </p:cNvPr>
@@ -14002,7 +14028,7 @@
           <a:p>
             <a:r>
               <a:rPr lang="nb-NO" dirty="0"/>
-              <a:t>ARM: Deployment</a:t>
+              <a:t>Demo og Leksjon 2.</a:t>
             </a:r>
           </a:p>
         </p:txBody>
@@ -14010,7 +14036,7 @@
     </p:spTree>
     <p:extLst>
       <p:ext uri="{BB962C8B-B14F-4D97-AF65-F5344CB8AC3E}">
-        <p14:creationId xmlns:p14="http://schemas.microsoft.com/office/powerpoint/2010/main" val="3936335324"/>
+        <p14:creationId xmlns:p14="http://schemas.microsoft.com/office/powerpoint/2010/main" val="2607850202"/>
       </p:ext>
     </p:extLst>
   </p:cSld>
@@ -14042,7 +14068,7 @@
           <p:cNvPr id="2" name="Content Placeholder 1">
             <a:extLst>
               <a:ext uri="{FF2B5EF4-FFF2-40B4-BE49-F238E27FC236}">
-                <a16:creationId xmlns:a16="http://schemas.microsoft.com/office/drawing/2014/main" id="{01C6EDC8-A815-4F7B-95FE-5E19DA0863EE}"/>
+                <a16:creationId xmlns:a16="http://schemas.microsoft.com/office/drawing/2014/main" id="{3032C2CA-FC99-4959-9790-0815B0B765B5}"/>
               </a:ext>
             </a:extLst>
           </p:cNvPr>
@@ -14060,14 +14086,20 @@
           <a:p>
             <a:r>
               <a:rPr lang="nb-NO" dirty="0"/>
-              <a:t>Portal</a:t>
-            </a:r>
+              <a:t>Samler logger og telemetri</a:t>
+            </a:r>
+          </a:p>
+          <a:p>
+            <a:endParaRPr lang="nb-NO" dirty="0"/>
           </a:p>
           <a:p>
             <a:r>
               <a:rPr lang="nb-NO" dirty="0"/>
-              <a:t>Visual Studio</a:t>
-            </a:r>
+              <a:t>Data blir beholdt i 3 måneder.</a:t>
+            </a:r>
+          </a:p>
+          <a:p>
+            <a:endParaRPr lang="nb-NO" dirty="0"/>
           </a:p>
         </p:txBody>
       </p:sp>
@@ -14076,7 +14108,7 @@
           <p:cNvPr id="3" name="Title 2">
             <a:extLst>
               <a:ext uri="{FF2B5EF4-FFF2-40B4-BE49-F238E27FC236}">
-                <a16:creationId xmlns:a16="http://schemas.microsoft.com/office/drawing/2014/main" id="{9616A1BB-BF26-4AFE-905C-E67197F226A0}"/>
+                <a16:creationId xmlns:a16="http://schemas.microsoft.com/office/drawing/2014/main" id="{024FB255-2490-431B-9E24-7266B29B930A}"/>
               </a:ext>
             </a:extLst>
           </p:cNvPr>
@@ -14094,7 +14126,7 @@
           <a:p>
             <a:r>
               <a:rPr lang="nb-NO" dirty="0"/>
-              <a:t>ARM: Demo</a:t>
+              <a:t>Applications Insights</a:t>
             </a:r>
           </a:p>
         </p:txBody>
@@ -14102,7 +14134,90 @@
     </p:spTree>
     <p:extLst>
       <p:ext uri="{BB962C8B-B14F-4D97-AF65-F5344CB8AC3E}">
-        <p14:creationId xmlns:p14="http://schemas.microsoft.com/office/powerpoint/2010/main" val="2607850202"/>
+        <p14:creationId xmlns:p14="http://schemas.microsoft.com/office/powerpoint/2010/main" val="1987869984"/>
+      </p:ext>
+    </p:extLst>
+  </p:cSld>
+  <p:clrMapOvr>
+    <a:masterClrMapping/>
+  </p:clrMapOvr>
+</p:sld>
+</file>
+
+<file path=ppt/slides/slide27.xml><?xml version="1.0" encoding="utf-8"?>
+<p:sld xmlns:a="http://schemas.openxmlformats.org/drawingml/2006/main" xmlns:r="http://schemas.openxmlformats.org/officeDocument/2006/relationships" xmlns:p="http://schemas.openxmlformats.org/presentationml/2006/main">
+  <p:cSld>
+    <p:spTree>
+      <p:nvGrpSpPr>
+        <p:cNvPr id="1" name=""/>
+        <p:cNvGrpSpPr/>
+        <p:nvPr/>
+      </p:nvGrpSpPr>
+      <p:grpSpPr>
+        <a:xfrm>
+          <a:off x="0" y="0"/>
+          <a:ext cx="0" cy="0"/>
+          <a:chOff x="0" y="0"/>
+          <a:chExt cx="0" cy="0"/>
+        </a:xfrm>
+      </p:grpSpPr>
+      <p:sp>
+        <p:nvSpPr>
+          <p:cNvPr id="2" name="Content Placeholder 1">
+            <a:extLst>
+              <a:ext uri="{FF2B5EF4-FFF2-40B4-BE49-F238E27FC236}">
+                <a16:creationId xmlns:a16="http://schemas.microsoft.com/office/drawing/2014/main" id="{DB0223AE-910A-4F0A-8FD5-0DF9471B82DB}"/>
+              </a:ext>
+            </a:extLst>
+          </p:cNvPr>
+          <p:cNvSpPr>
+            <a:spLocks noGrp="1"/>
+          </p:cNvSpPr>
+          <p:nvPr>
+            <p:ph idx="1"/>
+          </p:nvPr>
+        </p:nvSpPr>
+        <p:spPr/>
+        <p:txBody>
+          <a:bodyPr/>
+          <a:lstStyle/>
+          <a:p>
+            <a:endParaRPr lang="nb-NO"/>
+          </a:p>
+        </p:txBody>
+      </p:sp>
+      <p:sp>
+        <p:nvSpPr>
+          <p:cNvPr id="3" name="Title 2">
+            <a:extLst>
+              <a:ext uri="{FF2B5EF4-FFF2-40B4-BE49-F238E27FC236}">
+                <a16:creationId xmlns:a16="http://schemas.microsoft.com/office/drawing/2014/main" id="{1830904A-EAB2-4AB5-8816-AAC477CD96E8}"/>
+              </a:ext>
+            </a:extLst>
+          </p:cNvPr>
+          <p:cNvSpPr>
+            <a:spLocks noGrp="1"/>
+          </p:cNvSpPr>
+          <p:nvPr>
+            <p:ph type="title"/>
+          </p:nvPr>
+        </p:nvSpPr>
+        <p:spPr/>
+        <p:txBody>
+          <a:bodyPr/>
+          <a:lstStyle/>
+          <a:p>
+            <a:r>
+              <a:rPr lang="nb-NO" dirty="0"/>
+              <a:t>Demo og leksjon 3</a:t>
+            </a:r>
+          </a:p>
+        </p:txBody>
+      </p:sp>
+    </p:spTree>
+    <p:extLst>
+      <p:ext uri="{BB962C8B-B14F-4D97-AF65-F5344CB8AC3E}">
+        <p14:creationId xmlns:p14="http://schemas.microsoft.com/office/powerpoint/2010/main" val="2993526678"/>
       </p:ext>
     </p:extLst>
   </p:cSld>
@@ -16350,12 +16465,6 @@
 </file>
 
 <file path=customXml/item1.xml><?xml version="1.0" encoding="utf-8"?>
-<p:properties xmlns:p="http://schemas.microsoft.com/office/2006/metadata/properties" xmlns:xsi="http://www.w3.org/2001/XMLSchema-instance" xmlns:pc="http://schemas.microsoft.com/office/infopath/2007/PartnerControls">
-  <documentManagement/>
-</p:properties>
-</file>
-
-<file path=customXml/item2.xml><?xml version="1.0" encoding="utf-8"?>
 <ct:contentTypeSchema xmlns:ct="http://schemas.microsoft.com/office/2006/metadata/contentType" xmlns:ma="http://schemas.microsoft.com/office/2006/metadata/properties/metaAttributes" ct:_="" ma:_="" ma:contentTypeName="Document" ma:contentTypeID="0x0101005D3CE5A03C88D04F8FE0CC8617320B29" ma:contentTypeVersion="2" ma:contentTypeDescription="Create a new document." ma:contentTypeScope="" ma:versionID="23c508fadb5761cd27fdc7efc393bb78">
   <xsd:schema xmlns:xsd="http://www.w3.org/2001/XMLSchema" xmlns:xs="http://www.w3.org/2001/XMLSchema" xmlns:p="http://schemas.microsoft.com/office/2006/metadata/properties" xmlns:ns2="323bcd62-7d27-4513-9df1-9bc20f03554b" targetNamespace="http://schemas.microsoft.com/office/2006/metadata/properties" ma:root="true" ma:fieldsID="4120a6a9df7c81c23a4d646d2ccf1355" ns2:_="">
     <xsd:import namespace="323bcd62-7d27-4513-9df1-9bc20f03554b"/>
@@ -16487,6 +16596,12 @@
 </ct:contentTypeSchema>
 </file>
 
+<file path=customXml/item2.xml><?xml version="1.0" encoding="utf-8"?>
+<p:properties xmlns:p="http://schemas.microsoft.com/office/2006/metadata/properties" xmlns:xsi="http://www.w3.org/2001/XMLSchema-instance" xmlns:pc="http://schemas.microsoft.com/office/infopath/2007/PartnerControls">
+  <documentManagement/>
+</p:properties>
+</file>
+
 <file path=customXml/item3.xml><?xml version="1.0" encoding="utf-8"?>
 <?mso-contentType ?>
 <FormTemplates xmlns="http://schemas.microsoft.com/sharepoint/v3/contenttype/forms">
@@ -16497,23 +16612,6 @@
 </file>
 
 <file path=customXml/itemProps1.xml><?xml version="1.0" encoding="utf-8"?>
-<ds:datastoreItem xmlns:ds="http://schemas.openxmlformats.org/officeDocument/2006/customXml" ds:itemID="{9D2CB842-18D5-4EEF-9009-B0CAFCE7AC3E}">
-  <ds:schemaRefs>
-    <ds:schemaRef ds:uri="http://schemas.microsoft.com/office/2006/documentManagement/types"/>
-    <ds:schemaRef ds:uri="http://schemas.microsoft.com/office/infopath/2007/PartnerControls"/>
-    <ds:schemaRef ds:uri="cd7095a3-97f1-4663-a71f-a762e9d8a5de"/>
-    <ds:schemaRef ds:uri="http://purl.org/dc/elements/1.1/"/>
-    <ds:schemaRef ds:uri="http://schemas.microsoft.com/office/2006/metadata/properties"/>
-    <ds:schemaRef ds:uri="http://schemas.microsoft.com/sharepoint/v3"/>
-    <ds:schemaRef ds:uri="http://purl.org/dc/terms/"/>
-    <ds:schemaRef ds:uri="http://schemas.openxmlformats.org/package/2006/metadata/core-properties"/>
-    <ds:schemaRef ds:uri="http://www.w3.org/XML/1998/namespace"/>
-    <ds:schemaRef ds:uri="http://purl.org/dc/dcmitype/"/>
-  </ds:schemaRefs>
-</ds:datastoreItem>
-</file>
-
-<file path=customXml/itemProps2.xml><?xml version="1.0" encoding="utf-8"?>
 <ds:datastoreItem xmlns:ds="http://schemas.openxmlformats.org/officeDocument/2006/customXml" ds:itemID="{0377EA4A-9170-43AD-A052-6EABC948F73F}">
   <ds:schemaRefs>
     <ds:schemaRef ds:uri="http://schemas.microsoft.com/office/2006/metadata/contentType"/>
@@ -16531,6 +16629,23 @@
 </ds:datastoreItem>
 </file>
 
+<file path=customXml/itemProps2.xml><?xml version="1.0" encoding="utf-8"?>
+<ds:datastoreItem xmlns:ds="http://schemas.openxmlformats.org/officeDocument/2006/customXml" ds:itemID="{9D2CB842-18D5-4EEF-9009-B0CAFCE7AC3E}">
+  <ds:schemaRefs>
+    <ds:schemaRef ds:uri="http://schemas.microsoft.com/office/2006/documentManagement/types"/>
+    <ds:schemaRef ds:uri="http://schemas.microsoft.com/office/infopath/2007/PartnerControls"/>
+    <ds:schemaRef ds:uri="cd7095a3-97f1-4663-a71f-a762e9d8a5de"/>
+    <ds:schemaRef ds:uri="http://purl.org/dc/elements/1.1/"/>
+    <ds:schemaRef ds:uri="http://schemas.microsoft.com/office/2006/metadata/properties"/>
+    <ds:schemaRef ds:uri="http://schemas.microsoft.com/sharepoint/v3"/>
+    <ds:schemaRef ds:uri="http://purl.org/dc/terms/"/>
+    <ds:schemaRef ds:uri="http://schemas.openxmlformats.org/package/2006/metadata/core-properties"/>
+    <ds:schemaRef ds:uri="http://www.w3.org/XML/1998/namespace"/>
+    <ds:schemaRef ds:uri="http://purl.org/dc/dcmitype/"/>
+  </ds:schemaRefs>
+</ds:datastoreItem>
+</file>
+
 <file path=customXml/itemProps3.xml><?xml version="1.0" encoding="utf-8"?>
 <ds:datastoreItem xmlns:ds="http://schemas.openxmlformats.org/officeDocument/2006/customXml" ds:itemID="{BB82CC63-55FC-4D22-9ED3-DB88AF6228E1}">
   <ds:schemaRefs>

</xml_diff>